<commit_message>
Texte oral + slide sommaire
</commit_message>
<xml_diff>
--- a/Presentation.pptx
+++ b/Presentation.pptx
@@ -6,15 +6,16 @@
   </p:sldMasterIdLst>
   <p:sldIdLst>
     <p:sldId id="256" r:id="rId2"/>
-    <p:sldId id="257" r:id="rId3"/>
-    <p:sldId id="258" r:id="rId4"/>
-    <p:sldId id="259" r:id="rId5"/>
-    <p:sldId id="261" r:id="rId6"/>
-    <p:sldId id="265" r:id="rId7"/>
-    <p:sldId id="260" r:id="rId8"/>
-    <p:sldId id="262" r:id="rId9"/>
-    <p:sldId id="263" r:id="rId10"/>
-    <p:sldId id="264" r:id="rId11"/>
+    <p:sldId id="266" r:id="rId3"/>
+    <p:sldId id="257" r:id="rId4"/>
+    <p:sldId id="258" r:id="rId5"/>
+    <p:sldId id="259" r:id="rId6"/>
+    <p:sldId id="261" r:id="rId7"/>
+    <p:sldId id="265" r:id="rId8"/>
+    <p:sldId id="260" r:id="rId9"/>
+    <p:sldId id="262" r:id="rId10"/>
+    <p:sldId id="263" r:id="rId11"/>
+    <p:sldId id="264" r:id="rId12"/>
   </p:sldIdLst>
   <p:sldSz cx="12192000" cy="6858000"/>
   <p:notesSz cx="6858000" cy="9144000"/>
@@ -3288,6 +3289,359 @@
       </p:grpSpPr>
       <p:pic>
         <p:nvPicPr>
+          <p:cNvPr id="6" name="Image 5"/>
+          <p:cNvPicPr>
+            <a:picLocks noChangeAspect="1"/>
+          </p:cNvPicPr>
+          <p:nvPr/>
+        </p:nvPicPr>
+        <p:blipFill>
+          <a:blip r:embed="rId2"/>
+          <a:stretch>
+            <a:fillRect/>
+          </a:stretch>
+        </p:blipFill>
+        <p:spPr>
+          <a:xfrm>
+            <a:off x="0" y="0"/>
+            <a:ext cx="12192000" cy="6858000"/>
+          </a:xfrm>
+          <a:prstGeom prst="rect">
+            <a:avLst/>
+          </a:prstGeom>
+        </p:spPr>
+      </p:pic>
+      <p:sp>
+        <p:nvSpPr>
+          <p:cNvPr id="4" name="ZoneTexte 3"/>
+          <p:cNvSpPr txBox="1"/>
+          <p:nvPr/>
+        </p:nvSpPr>
+        <p:spPr>
+          <a:xfrm>
+            <a:off x="723569" y="1173172"/>
+            <a:ext cx="7545788" cy="400110"/>
+          </a:xfrm>
+          <a:prstGeom prst="rect">
+            <a:avLst/>
+          </a:prstGeom>
+          <a:noFill/>
+        </p:spPr>
+        <p:txBody>
+          <a:bodyPr wrap="square" rtlCol="0">
+            <a:spAutoFit/>
+          </a:bodyPr>
+          <a:lstStyle/>
+          <a:p>
+            <a:r>
+              <a:rPr lang="fr-FR" sz="2000" dirty="0">
+                <a:solidFill>
+                  <a:schemeClr val="bg1"/>
+                </a:solidFill>
+              </a:rPr>
+              <a:t>3</a:t>
+            </a:r>
+            <a:r>
+              <a:rPr lang="fr-FR" sz="2000" dirty="0" smtClean="0">
+                <a:solidFill>
+                  <a:schemeClr val="bg1"/>
+                </a:solidFill>
+              </a:rPr>
+              <a:t> – Classification avec SVM</a:t>
+            </a:r>
+            <a:endParaRPr lang="fr-FR" sz="2000" dirty="0">
+              <a:solidFill>
+                <a:schemeClr val="bg1"/>
+              </a:solidFill>
+            </a:endParaRPr>
+          </a:p>
+        </p:txBody>
+      </p:sp>
+      <p:sp>
+        <p:nvSpPr>
+          <p:cNvPr id="5" name="ZoneTexte 4"/>
+          <p:cNvSpPr txBox="1"/>
+          <p:nvPr/>
+        </p:nvSpPr>
+        <p:spPr>
+          <a:xfrm>
+            <a:off x="723569" y="588397"/>
+            <a:ext cx="7545788" cy="584775"/>
+          </a:xfrm>
+          <a:prstGeom prst="rect">
+            <a:avLst/>
+          </a:prstGeom>
+          <a:noFill/>
+        </p:spPr>
+        <p:txBody>
+          <a:bodyPr wrap="square" rtlCol="0">
+            <a:spAutoFit/>
+          </a:bodyPr>
+          <a:lstStyle/>
+          <a:p>
+            <a:r>
+              <a:rPr lang="fr-FR" sz="3200" dirty="0" smtClean="0">
+                <a:solidFill>
+                  <a:schemeClr val="bg1"/>
+                </a:solidFill>
+              </a:rPr>
+              <a:t>APLICATION DES MODELES AUX DONNEES</a:t>
+            </a:r>
+            <a:endParaRPr lang="fr-FR" sz="3200" dirty="0">
+              <a:solidFill>
+                <a:schemeClr val="bg1"/>
+              </a:solidFill>
+            </a:endParaRPr>
+          </a:p>
+        </p:txBody>
+      </p:sp>
+      <p:pic>
+        <p:nvPicPr>
+          <p:cNvPr id="7" name="Image 6"/>
+          <p:cNvPicPr/>
+          <p:nvPr/>
+        </p:nvPicPr>
+        <p:blipFill rotWithShape="1">
+          <a:blip r:embed="rId3">
+            <a:extLst>
+              <a:ext uri="{28A0092B-C50C-407E-A947-70E740481C1C}">
+                <a14:useLocalDpi xmlns:a14="http://schemas.microsoft.com/office/drawing/2010/main" val="0"/>
+              </a:ext>
+            </a:extLst>
+          </a:blip>
+          <a:srcRect r="15234"/>
+          <a:stretch/>
+        </p:blipFill>
+        <p:spPr bwMode="auto">
+          <a:xfrm>
+            <a:off x="723569" y="2776068"/>
+            <a:ext cx="6543923" cy="2463842"/>
+          </a:xfrm>
+          <a:prstGeom prst="rect">
+            <a:avLst/>
+          </a:prstGeom>
+          <a:noFill/>
+          <a:ln>
+            <a:noFill/>
+          </a:ln>
+          <a:extLst>
+            <a:ext uri="{53640926-AAD7-44D8-BBD7-CCE9431645EC}">
+              <a14:shadowObscured xmlns:a14="http://schemas.microsoft.com/office/drawing/2010/main"/>
+            </a:ext>
+          </a:extLst>
+        </p:spPr>
+      </p:pic>
+      <p:sp>
+        <p:nvSpPr>
+          <p:cNvPr id="8" name="ZoneTexte 7"/>
+          <p:cNvSpPr txBox="1"/>
+          <p:nvPr/>
+        </p:nvSpPr>
+        <p:spPr>
+          <a:xfrm>
+            <a:off x="7991061" y="3130518"/>
+            <a:ext cx="3625795" cy="400110"/>
+          </a:xfrm>
+          <a:prstGeom prst="rect">
+            <a:avLst/>
+          </a:prstGeom>
+          <a:noFill/>
+        </p:spPr>
+        <p:txBody>
+          <a:bodyPr wrap="square" rtlCol="0">
+            <a:spAutoFit/>
+          </a:bodyPr>
+          <a:lstStyle/>
+          <a:p>
+            <a:r>
+              <a:rPr lang="fr-FR" sz="2000" dirty="0" smtClean="0">
+                <a:solidFill>
+                  <a:schemeClr val="bg1"/>
+                </a:solidFill>
+              </a:rPr>
+              <a:t>Temps d’exécution = 11heures</a:t>
+            </a:r>
+            <a:endParaRPr lang="fr-FR" sz="2000" dirty="0">
+              <a:solidFill>
+                <a:schemeClr val="bg1"/>
+              </a:solidFill>
+            </a:endParaRPr>
+          </a:p>
+        </p:txBody>
+      </p:sp>
+      <p:sp>
+        <p:nvSpPr>
+          <p:cNvPr id="9" name="ZoneTexte 8"/>
+          <p:cNvSpPr txBox="1"/>
+          <p:nvPr/>
+        </p:nvSpPr>
+        <p:spPr>
+          <a:xfrm>
+            <a:off x="7991061" y="4103635"/>
+            <a:ext cx="3625795" cy="400110"/>
+          </a:xfrm>
+          <a:prstGeom prst="rect">
+            <a:avLst/>
+          </a:prstGeom>
+          <a:noFill/>
+        </p:spPr>
+        <p:txBody>
+          <a:bodyPr wrap="square" rtlCol="0">
+            <a:spAutoFit/>
+          </a:bodyPr>
+          <a:lstStyle/>
+          <a:p>
+            <a:r>
+              <a:rPr lang="fr-FR" sz="2000" dirty="0" smtClean="0">
+                <a:solidFill>
+                  <a:schemeClr val="bg1"/>
+                </a:solidFill>
+              </a:rPr>
+              <a:t>Précision = 86.4%</a:t>
+            </a:r>
+            <a:endParaRPr lang="fr-FR" sz="2000" dirty="0">
+              <a:solidFill>
+                <a:schemeClr val="bg1"/>
+              </a:solidFill>
+            </a:endParaRPr>
+          </a:p>
+        </p:txBody>
+      </p:sp>
+      <p:sp>
+        <p:nvSpPr>
+          <p:cNvPr id="2" name="Ellipse 1"/>
+          <p:cNvSpPr/>
+          <p:nvPr/>
+        </p:nvSpPr>
+        <p:spPr>
+          <a:xfrm>
+            <a:off x="7649155" y="3275937"/>
+            <a:ext cx="108000" cy="108000"/>
+          </a:xfrm>
+          <a:prstGeom prst="ellipse">
+            <a:avLst/>
+          </a:prstGeom>
+          <a:solidFill>
+            <a:srgbClr val="C2C923"/>
+          </a:solidFill>
+          <a:ln>
+            <a:solidFill>
+              <a:srgbClr val="C2C923"/>
+            </a:solidFill>
+          </a:ln>
+        </p:spPr>
+        <p:style>
+          <a:lnRef idx="2">
+            <a:schemeClr val="accent1">
+              <a:shade val="50000"/>
+            </a:schemeClr>
+          </a:lnRef>
+          <a:fillRef idx="1">
+            <a:schemeClr val="accent1"/>
+          </a:fillRef>
+          <a:effectRef idx="0">
+            <a:schemeClr val="accent1"/>
+          </a:effectRef>
+          <a:fontRef idx="minor">
+            <a:schemeClr val="lt1"/>
+          </a:fontRef>
+        </p:style>
+        <p:txBody>
+          <a:bodyPr rtlCol="0" anchor="ctr"/>
+          <a:lstStyle/>
+          <a:p>
+            <a:pPr algn="ctr"/>
+            <a:endParaRPr lang="fr-FR"/>
+          </a:p>
+        </p:txBody>
+      </p:sp>
+      <p:sp>
+        <p:nvSpPr>
+          <p:cNvPr id="10" name="Ellipse 9"/>
+          <p:cNvSpPr/>
+          <p:nvPr/>
+        </p:nvSpPr>
+        <p:spPr>
+          <a:xfrm>
+            <a:off x="7649155" y="4249690"/>
+            <a:ext cx="108000" cy="108000"/>
+          </a:xfrm>
+          <a:prstGeom prst="ellipse">
+            <a:avLst/>
+          </a:prstGeom>
+          <a:solidFill>
+            <a:srgbClr val="CB1B4A"/>
+          </a:solidFill>
+          <a:ln>
+            <a:solidFill>
+              <a:srgbClr val="CB1B4A"/>
+            </a:solidFill>
+          </a:ln>
+        </p:spPr>
+        <p:style>
+          <a:lnRef idx="2">
+            <a:schemeClr val="accent1">
+              <a:shade val="50000"/>
+            </a:schemeClr>
+          </a:lnRef>
+          <a:fillRef idx="1">
+            <a:schemeClr val="accent1"/>
+          </a:fillRef>
+          <a:effectRef idx="0">
+            <a:schemeClr val="accent1"/>
+          </a:effectRef>
+          <a:fontRef idx="minor">
+            <a:schemeClr val="lt1"/>
+          </a:fontRef>
+        </p:style>
+        <p:txBody>
+          <a:bodyPr rtlCol="0" anchor="ctr"/>
+          <a:lstStyle/>
+          <a:p>
+            <a:pPr algn="ctr"/>
+            <a:endParaRPr lang="fr-FR"/>
+          </a:p>
+        </p:txBody>
+      </p:sp>
+    </p:spTree>
+    <p:extLst>
+      <p:ext uri="{BB962C8B-B14F-4D97-AF65-F5344CB8AC3E}">
+        <p14:creationId xmlns:p14="http://schemas.microsoft.com/office/powerpoint/2010/main" val="1818521200"/>
+      </p:ext>
+    </p:extLst>
+  </p:cSld>
+  <p:clrMapOvr>
+    <a:masterClrMapping/>
+  </p:clrMapOvr>
+  <p:timing>
+    <p:tnLst>
+      <p:par>
+        <p:cTn id="1" dur="indefinite" restart="never" nodeType="tmRoot"/>
+      </p:par>
+    </p:tnLst>
+  </p:timing>
+</p:sld>
+</file>
+
+<file path=ppt/slides/slide11.xml><?xml version="1.0" encoding="utf-8"?>
+<p:sld xmlns:a="http://schemas.openxmlformats.org/drawingml/2006/main" xmlns:r="http://schemas.openxmlformats.org/officeDocument/2006/relationships" xmlns:p="http://schemas.openxmlformats.org/presentationml/2006/main">
+  <p:cSld>
+    <p:spTree>
+      <p:nvGrpSpPr>
+        <p:cNvPr id="1" name=""/>
+        <p:cNvGrpSpPr/>
+        <p:nvPr/>
+      </p:nvGrpSpPr>
+      <p:grpSpPr>
+        <a:xfrm>
+          <a:off x="0" y="0"/>
+          <a:ext cx="0" cy="0"/>
+          <a:chOff x="0" y="0"/>
+          <a:chExt cx="0" cy="0"/>
+        </a:xfrm>
+      </p:grpSpPr>
+      <p:pic>
+        <p:nvPicPr>
           <p:cNvPr id="5" name="Image 4"/>
           <p:cNvPicPr>
             <a:picLocks noChangeAspect="1"/>
@@ -4063,7 +4417,7 @@
       </p:grpSpPr>
       <p:pic>
         <p:nvPicPr>
-          <p:cNvPr id="6" name="Image 5"/>
+          <p:cNvPr id="4" name="Image 3"/>
           <p:cNvPicPr>
             <a:picLocks noChangeAspect="1"/>
           </p:cNvPicPr>
@@ -4087,7 +4441,7 @@
       </p:pic>
       <p:sp>
         <p:nvSpPr>
-          <p:cNvPr id="4" name="ZoneTexte 3"/>
+          <p:cNvPr id="5" name="ZoneTexte 4"/>
           <p:cNvSpPr txBox="1"/>
           <p:nvPr/>
         </p:nvSpPr>
@@ -4113,7 +4467,7 @@
                   <a:schemeClr val="bg1"/>
                 </a:solidFill>
               </a:rPr>
-              <a:t>IDENTIFIER ET DEFINIR LE PROBLEME</a:t>
+              <a:t>SOMMAIRE</a:t>
             </a:r>
             <a:endParaRPr lang="fr-FR" sz="3200" dirty="0">
               <a:solidFill>
@@ -4125,7 +4479,7 @@
       </p:sp>
       <p:pic>
         <p:nvPicPr>
-          <p:cNvPr id="8" name="Image 7"/>
+          <p:cNvPr id="6" name="Image 5"/>
           <p:cNvPicPr>
             <a:picLocks noChangeAspect="1"/>
           </p:cNvPicPr>
@@ -4139,48 +4493,24 @@
         </p:blipFill>
         <p:spPr>
           <a:xfrm>
-            <a:off x="6432606" y="1188412"/>
-            <a:ext cx="5002488" cy="4774652"/>
+            <a:off x="2048869" y="1284342"/>
+            <a:ext cx="8094262" cy="4741134"/>
           </a:xfrm>
           <a:prstGeom prst="rect">
             <a:avLst/>
           </a:prstGeom>
         </p:spPr>
       </p:pic>
-      <p:pic>
-        <p:nvPicPr>
-          <p:cNvPr id="10" name="Image 9"/>
-          <p:cNvPicPr>
-            <a:picLocks noChangeAspect="1"/>
-          </p:cNvPicPr>
-          <p:nvPr/>
-        </p:nvPicPr>
-        <p:blipFill>
-          <a:blip r:embed="rId4"/>
-          <a:stretch>
-            <a:fillRect/>
-          </a:stretch>
-        </p:blipFill>
-        <p:spPr>
-          <a:xfrm>
-            <a:off x="1270220" y="1809502"/>
-            <a:ext cx="762149" cy="2953329"/>
-          </a:xfrm>
-          <a:prstGeom prst="rect">
-            <a:avLst/>
-          </a:prstGeom>
-        </p:spPr>
-      </p:pic>
-      <p:sp>
-        <p:nvSpPr>
-          <p:cNvPr id="12" name="ZoneTexte 11"/>
+      <p:sp>
+        <p:nvSpPr>
+          <p:cNvPr id="7" name="ZoneTexte 6"/>
           <p:cNvSpPr txBox="1"/>
           <p:nvPr/>
         </p:nvSpPr>
         <p:spPr>
           <a:xfrm>
-            <a:off x="763324" y="5221952"/>
-            <a:ext cx="5907820" cy="923330"/>
+            <a:off x="3967700" y="1561530"/>
+            <a:ext cx="4866199" cy="461665"/>
           </a:xfrm>
           <a:prstGeom prst="rect">
             <a:avLst/>
@@ -4194,30 +4524,14 @@
           <a:lstStyle/>
           <a:p>
             <a:r>
-              <a:rPr lang="fr-FR" b="1" dirty="0" smtClean="0">
+              <a:rPr lang="fr-FR" sz="2400" dirty="0" smtClean="0">
                 <a:solidFill>
                   <a:schemeClr val="bg1"/>
                 </a:solidFill>
               </a:rPr>
-              <a:t>Pouvons-nous </a:t>
-            </a:r>
-            <a:r>
-              <a:rPr lang="fr-FR" b="1" dirty="0">
-                <a:solidFill>
-                  <a:schemeClr val="bg1"/>
-                </a:solidFill>
-              </a:rPr>
-              <a:t>détecter des cellules cancéreuses sur une coupe d’échantillon de tumeur afin de localiser précisément les zones cancéreuses et ainsi évaluer la gravité du cancer </a:t>
-            </a:r>
-            <a:r>
-              <a:rPr lang="fr-FR" b="1" dirty="0" smtClean="0">
-                <a:solidFill>
-                  <a:schemeClr val="bg1"/>
-                </a:solidFill>
-              </a:rPr>
-              <a:t>?</a:t>
-            </a:r>
-            <a:endParaRPr lang="fr-FR" b="1" dirty="0">
+              <a:t>DEFINITION DU PROBLEME</a:t>
+            </a:r>
+            <a:endParaRPr lang="fr-FR" sz="2400" dirty="0">
               <a:solidFill>
                 <a:schemeClr val="bg1"/>
               </a:solidFill>
@@ -4227,14 +4541,14 @@
       </p:sp>
       <p:sp>
         <p:nvSpPr>
-          <p:cNvPr id="13" name="ZoneTexte 12"/>
+          <p:cNvPr id="8" name="ZoneTexte 7"/>
           <p:cNvSpPr txBox="1"/>
           <p:nvPr/>
         </p:nvSpPr>
         <p:spPr>
           <a:xfrm>
-            <a:off x="2032369" y="1809502"/>
-            <a:ext cx="2865634" cy="646331"/>
+            <a:off x="4018017" y="2453401"/>
+            <a:ext cx="5674623" cy="461665"/>
           </a:xfrm>
           <a:prstGeom prst="rect">
             <a:avLst/>
@@ -4248,14 +4562,14 @@
           <a:lstStyle/>
           <a:p>
             <a:r>
-              <a:rPr lang="fr-FR" dirty="0" smtClean="0">
+              <a:rPr lang="fr-FR" sz="2400" dirty="0" smtClean="0">
                 <a:solidFill>
                   <a:schemeClr val="bg1"/>
                 </a:solidFill>
               </a:rPr>
-              <a:t>Base de données avec des images échantillons</a:t>
-            </a:r>
-            <a:endParaRPr lang="fr-FR" dirty="0">
+              <a:t>DESCRIPTION DE LA BASE DE DONNEES</a:t>
+            </a:r>
+            <a:endParaRPr lang="fr-FR" sz="2400" dirty="0">
               <a:solidFill>
                 <a:schemeClr val="bg1"/>
               </a:solidFill>
@@ -4265,14 +4579,14 @@
       </p:sp>
       <p:sp>
         <p:nvSpPr>
-          <p:cNvPr id="14" name="ZoneTexte 13"/>
+          <p:cNvPr id="9" name="ZoneTexte 8"/>
           <p:cNvSpPr txBox="1"/>
           <p:nvPr/>
         </p:nvSpPr>
         <p:spPr>
           <a:xfrm>
-            <a:off x="2058617" y="3019426"/>
-            <a:ext cx="2865634" cy="646331"/>
+            <a:off x="4018017" y="3424077"/>
+            <a:ext cx="5428133" cy="461665"/>
           </a:xfrm>
           <a:prstGeom prst="rect">
             <a:avLst/>
@@ -4286,14 +4600,14 @@
           <a:lstStyle/>
           <a:p>
             <a:r>
-              <a:rPr lang="fr-FR" dirty="0" smtClean="0">
+              <a:rPr lang="fr-FR" sz="2400" dirty="0" smtClean="0">
                 <a:solidFill>
                   <a:schemeClr val="bg1"/>
                 </a:solidFill>
               </a:rPr>
-              <a:t>Implémentation de machine Learning</a:t>
-            </a:r>
-            <a:endParaRPr lang="fr-FR" dirty="0">
+              <a:t>CHARGEMENT DE LA BASE DE DONNEES</a:t>
+            </a:r>
+            <a:endParaRPr lang="fr-FR" sz="2400" dirty="0">
               <a:solidFill>
                 <a:schemeClr val="bg1"/>
               </a:solidFill>
@@ -4303,14 +4617,14 @@
       </p:sp>
       <p:sp>
         <p:nvSpPr>
-          <p:cNvPr id="15" name="ZoneTexte 14"/>
+          <p:cNvPr id="10" name="ZoneTexte 9"/>
           <p:cNvSpPr txBox="1"/>
           <p:nvPr/>
         </p:nvSpPr>
         <p:spPr>
           <a:xfrm>
-            <a:off x="2032369" y="4012028"/>
-            <a:ext cx="2865634" cy="646331"/>
+            <a:off x="4018017" y="4263112"/>
+            <a:ext cx="4866199" cy="461665"/>
           </a:xfrm>
           <a:prstGeom prst="rect">
             <a:avLst/>
@@ -4324,14 +4638,14 @@
           <a:lstStyle/>
           <a:p>
             <a:r>
-              <a:rPr lang="fr-FR" dirty="0" smtClean="0">
+              <a:rPr lang="fr-FR" sz="2400" dirty="0" smtClean="0">
                 <a:solidFill>
                   <a:schemeClr val="bg1"/>
                 </a:solidFill>
               </a:rPr>
-              <a:t>Détection de cellules cancéreuses</a:t>
-            </a:r>
-            <a:endParaRPr lang="fr-FR" dirty="0">
+              <a:t>APPLICATIONS</a:t>
+            </a:r>
+            <a:endParaRPr lang="fr-FR" sz="2400" dirty="0">
               <a:solidFill>
                 <a:schemeClr val="bg1"/>
               </a:solidFill>
@@ -4339,23 +4653,54 @@
           </a:p>
         </p:txBody>
       </p:sp>
+      <p:sp>
+        <p:nvSpPr>
+          <p:cNvPr id="11" name="ZoneTexte 10"/>
+          <p:cNvSpPr txBox="1"/>
+          <p:nvPr/>
+        </p:nvSpPr>
+        <p:spPr>
+          <a:xfrm>
+            <a:off x="4018017" y="5229995"/>
+            <a:ext cx="4866199" cy="461665"/>
+          </a:xfrm>
+          <a:prstGeom prst="rect">
+            <a:avLst/>
+          </a:prstGeom>
+          <a:noFill/>
+        </p:spPr>
+        <p:txBody>
+          <a:bodyPr wrap="square" rtlCol="0">
+            <a:spAutoFit/>
+          </a:bodyPr>
+          <a:lstStyle/>
+          <a:p>
+            <a:r>
+              <a:rPr lang="fr-FR" sz="2400" dirty="0" smtClean="0">
+                <a:solidFill>
+                  <a:schemeClr val="bg1"/>
+                </a:solidFill>
+              </a:rPr>
+              <a:t>CONCLUSION</a:t>
+            </a:r>
+            <a:endParaRPr lang="fr-FR" sz="2400" dirty="0">
+              <a:solidFill>
+                <a:schemeClr val="bg1"/>
+              </a:solidFill>
+            </a:endParaRPr>
+          </a:p>
+        </p:txBody>
+      </p:sp>
     </p:spTree>
     <p:extLst>
       <p:ext uri="{BB962C8B-B14F-4D97-AF65-F5344CB8AC3E}">
-        <p14:creationId xmlns:p14="http://schemas.microsoft.com/office/powerpoint/2010/main" val="2466701796"/>
+        <p14:creationId xmlns:p14="http://schemas.microsoft.com/office/powerpoint/2010/main" val="3001638200"/>
       </p:ext>
     </p:extLst>
   </p:cSld>
   <p:clrMapOvr>
     <a:masterClrMapping/>
   </p:clrMapOvr>
-  <p:timing>
-    <p:tnLst>
-      <p:par>
-        <p:cTn id="1" dur="indefinite" restart="never" nodeType="tmRoot"/>
-      </p:par>
-    </p:tnLst>
-  </p:timing>
 </p:sld>
 </file>
 
@@ -4402,56 +4747,48 @@
       </p:pic>
       <p:sp>
         <p:nvSpPr>
-          <p:cNvPr id="7" name="Ellipse 6"/>
-          <p:cNvSpPr/>
-          <p:nvPr/>
-        </p:nvSpPr>
-        <p:spPr>
-          <a:xfrm>
-            <a:off x="5287617" y="586230"/>
-            <a:ext cx="6082748" cy="5760000"/>
-          </a:xfrm>
-          <a:prstGeom prst="ellipse">
-            <a:avLst/>
-          </a:prstGeom>
-          <a:solidFill>
-            <a:schemeClr val="bg1"/>
-          </a:solidFill>
-          <a:ln>
-            <a:solidFill>
-              <a:schemeClr val="bg1"/>
-            </a:solidFill>
-          </a:ln>
-        </p:spPr>
-        <p:style>
-          <a:lnRef idx="2">
-            <a:schemeClr val="accent1">
-              <a:shade val="50000"/>
-            </a:schemeClr>
-          </a:lnRef>
-          <a:fillRef idx="1">
-            <a:schemeClr val="accent1"/>
-          </a:fillRef>
-          <a:effectRef idx="0">
-            <a:schemeClr val="accent1"/>
-          </a:effectRef>
-          <a:fontRef idx="minor">
-            <a:schemeClr val="lt1"/>
-          </a:fontRef>
-        </p:style>
-        <p:txBody>
-          <a:bodyPr rtlCol="0" anchor="ctr"/>
-          <a:lstStyle/>
-          <a:p>
-            <a:pPr algn="ctr"/>
-            <a:endParaRPr lang="fr-FR"/>
+          <p:cNvPr id="4" name="ZoneTexte 3"/>
+          <p:cNvSpPr txBox="1"/>
+          <p:nvPr/>
+        </p:nvSpPr>
+        <p:spPr>
+          <a:xfrm>
+            <a:off x="492980" y="421419"/>
+            <a:ext cx="6949440" cy="584775"/>
+          </a:xfrm>
+          <a:prstGeom prst="rect">
+            <a:avLst/>
+          </a:prstGeom>
+          <a:noFill/>
+        </p:spPr>
+        <p:txBody>
+          <a:bodyPr wrap="square" rtlCol="0">
+            <a:spAutoFit/>
+          </a:bodyPr>
+          <a:lstStyle/>
+          <a:p>
+            <a:r>
+              <a:rPr lang="fr-FR" sz="3200" dirty="0" smtClean="0">
+                <a:solidFill>
+                  <a:schemeClr val="bg1"/>
+                </a:solidFill>
+              </a:rPr>
+              <a:t>IDENTIFIER ET DEFINIR LE PROBLEME</a:t>
+            </a:r>
+            <a:endParaRPr lang="fr-FR" sz="3200" dirty="0">
+              <a:solidFill>
+                <a:schemeClr val="bg1"/>
+              </a:solidFill>
+            </a:endParaRPr>
           </a:p>
         </p:txBody>
       </p:sp>
       <p:pic>
         <p:nvPicPr>
-          <p:cNvPr id="4" name="Image 3"/>
-          <p:cNvPicPr/>
+          <p:cNvPr id="8" name="Image 7"/>
+          <p:cNvPicPr>
+            <a:picLocks noChangeAspect="1"/>
+          </p:cNvPicPr>
           <p:nvPr/>
         </p:nvPicPr>
         <p:blipFill>
@@ -4462,24 +4799,48 @@
         </p:blipFill>
         <p:spPr>
           <a:xfrm>
-            <a:off x="5971431" y="1852654"/>
-            <a:ext cx="4683318" cy="3435826"/>
+            <a:off x="6432606" y="1188412"/>
+            <a:ext cx="5002488" cy="4774652"/>
           </a:xfrm>
           <a:prstGeom prst="rect">
             <a:avLst/>
           </a:prstGeom>
         </p:spPr>
       </p:pic>
-      <p:sp>
-        <p:nvSpPr>
-          <p:cNvPr id="5" name="ZoneTexte 4"/>
+      <p:pic>
+        <p:nvPicPr>
+          <p:cNvPr id="10" name="Image 9"/>
+          <p:cNvPicPr>
+            <a:picLocks noChangeAspect="1"/>
+          </p:cNvPicPr>
+          <p:nvPr/>
+        </p:nvPicPr>
+        <p:blipFill>
+          <a:blip r:embed="rId4"/>
+          <a:stretch>
+            <a:fillRect/>
+          </a:stretch>
+        </p:blipFill>
+        <p:spPr>
+          <a:xfrm>
+            <a:off x="1270220" y="1809502"/>
+            <a:ext cx="762149" cy="2953329"/>
+          </a:xfrm>
+          <a:prstGeom prst="rect">
+            <a:avLst/>
+          </a:prstGeom>
+        </p:spPr>
+      </p:pic>
+      <p:sp>
+        <p:nvSpPr>
+          <p:cNvPr id="12" name="ZoneTexte 11"/>
           <p:cNvSpPr txBox="1"/>
           <p:nvPr/>
         </p:nvSpPr>
         <p:spPr>
           <a:xfrm>
-            <a:off x="508884" y="302150"/>
-            <a:ext cx="6949440" cy="1077218"/>
+            <a:off x="763324" y="5221952"/>
+            <a:ext cx="5907820" cy="923330"/>
           </a:xfrm>
           <a:prstGeom prst="rect">
             <a:avLst/>
@@ -4493,24 +4854,30 @@
           <a:lstStyle/>
           <a:p>
             <a:r>
-              <a:rPr lang="fr-FR" sz="3200" dirty="0" smtClean="0">
+              <a:rPr lang="fr-FR" b="1" dirty="0" smtClean="0">
                 <a:solidFill>
                   <a:schemeClr val="bg1"/>
                 </a:solidFill>
               </a:rPr>
-              <a:t>DESCRIPTION DE LA BASE </a:t>
-            </a:r>
-          </a:p>
-          <a:p>
-            <a:r>
-              <a:rPr lang="fr-FR" sz="3200" dirty="0" smtClean="0">
+              <a:t>Pouvons-nous </a:t>
+            </a:r>
+            <a:r>
+              <a:rPr lang="fr-FR" b="1" dirty="0">
                 <a:solidFill>
                   <a:schemeClr val="bg1"/>
                 </a:solidFill>
               </a:rPr>
-              <a:t>DE DONNEES</a:t>
-            </a:r>
-            <a:endParaRPr lang="fr-FR" sz="3200" dirty="0">
+              <a:t>détecter des cellules cancéreuses sur une coupe d’échantillon de tumeur afin de localiser précisément les zones cancéreuses et ainsi évaluer la gravité du cancer </a:t>
+            </a:r>
+            <a:r>
+              <a:rPr lang="fr-FR" b="1" dirty="0" smtClean="0">
+                <a:solidFill>
+                  <a:schemeClr val="bg1"/>
+                </a:solidFill>
+              </a:rPr>
+              <a:t>?</a:t>
+            </a:r>
+            <a:endParaRPr lang="fr-FR" b="1" dirty="0">
               <a:solidFill>
                 <a:schemeClr val="bg1"/>
               </a:solidFill>
@@ -4518,99 +4885,16 @@
           </a:p>
         </p:txBody>
       </p:sp>
-      <p:cxnSp>
-        <p:nvCxnSpPr>
-          <p:cNvPr id="9" name="Connecteur droit 8"/>
-          <p:cNvCxnSpPr/>
-          <p:nvPr/>
-        </p:nvCxnSpPr>
-        <p:spPr>
-          <a:xfrm flipV="1">
-            <a:off x="508884" y="2154803"/>
-            <a:ext cx="3768918" cy="0"/>
-          </a:xfrm>
-          <a:prstGeom prst="line">
-            <a:avLst/>
-          </a:prstGeom>
-          <a:ln>
-            <a:solidFill>
-              <a:schemeClr val="bg1"/>
-            </a:solidFill>
-          </a:ln>
-        </p:spPr>
-        <p:style>
-          <a:lnRef idx="3">
-            <a:schemeClr val="dk1"/>
-          </a:lnRef>
-          <a:fillRef idx="0">
-            <a:schemeClr val="dk1"/>
-          </a:fillRef>
-          <a:effectRef idx="2">
-            <a:schemeClr val="dk1"/>
-          </a:effectRef>
-          <a:fontRef idx="minor">
-            <a:schemeClr val="tx1"/>
-          </a:fontRef>
-        </p:style>
-      </p:cxnSp>
-      <p:sp>
-        <p:nvSpPr>
-          <p:cNvPr id="2" name="Ellipse 1"/>
-          <p:cNvSpPr/>
-          <p:nvPr/>
-        </p:nvSpPr>
-        <p:spPr>
-          <a:xfrm>
-            <a:off x="1685676" y="3625794"/>
-            <a:ext cx="2196000" cy="2160000"/>
-          </a:xfrm>
-          <a:prstGeom prst="ellipse">
-            <a:avLst/>
-          </a:prstGeom>
-          <a:solidFill>
-            <a:schemeClr val="bg1"/>
-          </a:solidFill>
-          <a:ln>
-            <a:solidFill>
-              <a:schemeClr val="bg1"/>
-            </a:solidFill>
-          </a:ln>
-        </p:spPr>
-        <p:style>
-          <a:lnRef idx="2">
-            <a:schemeClr val="accent1">
-              <a:shade val="50000"/>
-            </a:schemeClr>
-          </a:lnRef>
-          <a:fillRef idx="1">
-            <a:schemeClr val="accent1"/>
-          </a:fillRef>
-          <a:effectRef idx="0">
-            <a:schemeClr val="accent1"/>
-          </a:effectRef>
-          <a:fontRef idx="minor">
-            <a:schemeClr val="lt1"/>
-          </a:fontRef>
-        </p:style>
-        <p:txBody>
-          <a:bodyPr rtlCol="0" anchor="ctr"/>
-          <a:lstStyle/>
-          <a:p>
-            <a:pPr algn="ctr"/>
-            <a:endParaRPr lang="fr-FR"/>
-          </a:p>
-        </p:txBody>
-      </p:sp>
-      <p:sp>
-        <p:nvSpPr>
-          <p:cNvPr id="3" name="ZoneTexte 2"/>
+      <p:sp>
+        <p:nvSpPr>
+          <p:cNvPr id="13" name="ZoneTexte 12"/>
           <p:cNvSpPr txBox="1"/>
           <p:nvPr/>
         </p:nvSpPr>
         <p:spPr>
           <a:xfrm>
-            <a:off x="1944813" y="4521128"/>
-            <a:ext cx="1677725" cy="369332"/>
+            <a:off x="2032369" y="1809502"/>
+            <a:ext cx="2865634" cy="646331"/>
           </a:xfrm>
           <a:prstGeom prst="rect">
             <a:avLst/>
@@ -4624,21 +4908,117 @@
           <a:lstStyle/>
           <a:p>
             <a:r>
-              <a:rPr lang="fr-FR" b="1" dirty="0"/>
-              <a:t>277 </a:t>
-            </a:r>
-            <a:r>
-              <a:rPr lang="fr-FR" b="1" dirty="0" smtClean="0"/>
-              <a:t>524 photos</a:t>
-            </a:r>
-            <a:endParaRPr lang="fr-FR" b="1" dirty="0"/>
+              <a:rPr lang="fr-FR" dirty="0" smtClean="0">
+                <a:solidFill>
+                  <a:schemeClr val="bg1"/>
+                </a:solidFill>
+              </a:rPr>
+              <a:t>Base de données avec des images échantillons</a:t>
+            </a:r>
+            <a:endParaRPr lang="fr-FR" dirty="0">
+              <a:solidFill>
+                <a:schemeClr val="bg1"/>
+              </a:solidFill>
+            </a:endParaRPr>
+          </a:p>
+        </p:txBody>
+      </p:sp>
+      <p:sp>
+        <p:nvSpPr>
+          <p:cNvPr id="14" name="ZoneTexte 13"/>
+          <p:cNvSpPr txBox="1"/>
+          <p:nvPr/>
+        </p:nvSpPr>
+        <p:spPr>
+          <a:xfrm>
+            <a:off x="2058617" y="3019426"/>
+            <a:ext cx="2865634" cy="646331"/>
+          </a:xfrm>
+          <a:prstGeom prst="rect">
+            <a:avLst/>
+          </a:prstGeom>
+          <a:noFill/>
+        </p:spPr>
+        <p:txBody>
+          <a:bodyPr wrap="square" rtlCol="0">
+            <a:spAutoFit/>
+          </a:bodyPr>
+          <a:lstStyle/>
+          <a:p>
+            <a:r>
+              <a:rPr lang="fr-FR" dirty="0" smtClean="0">
+                <a:solidFill>
+                  <a:schemeClr val="bg1"/>
+                </a:solidFill>
+              </a:rPr>
+              <a:t>Implémentation de </a:t>
+            </a:r>
+            <a:r>
+              <a:rPr lang="fr-FR" dirty="0" smtClean="0">
+                <a:solidFill>
+                  <a:schemeClr val="bg1"/>
+                </a:solidFill>
+              </a:rPr>
+              <a:t>Machine </a:t>
+            </a:r>
+            <a:r>
+              <a:rPr lang="fr-FR" dirty="0" smtClean="0">
+                <a:solidFill>
+                  <a:schemeClr val="bg1"/>
+                </a:solidFill>
+              </a:rPr>
+              <a:t>Learning</a:t>
+            </a:r>
+            <a:endParaRPr lang="fr-FR" dirty="0">
+              <a:solidFill>
+                <a:schemeClr val="bg1"/>
+              </a:solidFill>
+            </a:endParaRPr>
+          </a:p>
+        </p:txBody>
+      </p:sp>
+      <p:sp>
+        <p:nvSpPr>
+          <p:cNvPr id="15" name="ZoneTexte 14"/>
+          <p:cNvSpPr txBox="1"/>
+          <p:nvPr/>
+        </p:nvSpPr>
+        <p:spPr>
+          <a:xfrm>
+            <a:off x="2032369" y="4012028"/>
+            <a:ext cx="2865634" cy="646331"/>
+          </a:xfrm>
+          <a:prstGeom prst="rect">
+            <a:avLst/>
+          </a:prstGeom>
+          <a:noFill/>
+        </p:spPr>
+        <p:txBody>
+          <a:bodyPr wrap="square" rtlCol="0">
+            <a:spAutoFit/>
+          </a:bodyPr>
+          <a:lstStyle/>
+          <a:p>
+            <a:r>
+              <a:rPr lang="fr-FR" dirty="0" smtClean="0">
+                <a:solidFill>
+                  <a:schemeClr val="bg1"/>
+                </a:solidFill>
+              </a:rPr>
+              <a:t>Détection de cellules cancéreuses</a:t>
+            </a:r>
+            <a:endParaRPr lang="fr-FR" dirty="0">
+              <a:solidFill>
+                <a:schemeClr val="bg1"/>
+              </a:solidFill>
+            </a:endParaRPr>
           </a:p>
         </p:txBody>
       </p:sp>
     </p:spTree>
     <p:extLst>
       <p:ext uri="{BB962C8B-B14F-4D97-AF65-F5344CB8AC3E}">
-        <p14:creationId xmlns:p14="http://schemas.microsoft.com/office/powerpoint/2010/main" val="1128876710"/>
+        <p14:creationId xmlns:p14="http://schemas.microsoft.com/office/powerpoint/2010/main" val="2466701796"/>
       </p:ext>
     </p:extLst>
   </p:cSld>
@@ -4674,7 +5054,7 @@
       </p:grpSpPr>
       <p:pic>
         <p:nvPicPr>
-          <p:cNvPr id="5" name="Image 4"/>
+          <p:cNvPr id="6" name="Image 5"/>
           <p:cNvPicPr>
             <a:picLocks noChangeAspect="1"/>
           </p:cNvPicPr>
@@ -4698,14 +5078,84 @@
       </p:pic>
       <p:sp>
         <p:nvSpPr>
-          <p:cNvPr id="4" name="ZoneTexte 3"/>
+          <p:cNvPr id="7" name="Ellipse 6"/>
+          <p:cNvSpPr/>
+          <p:nvPr/>
+        </p:nvSpPr>
+        <p:spPr>
+          <a:xfrm>
+            <a:off x="5287617" y="586230"/>
+            <a:ext cx="6082748" cy="5760000"/>
+          </a:xfrm>
+          <a:prstGeom prst="ellipse">
+            <a:avLst/>
+          </a:prstGeom>
+          <a:solidFill>
+            <a:schemeClr val="bg1"/>
+          </a:solidFill>
+          <a:ln>
+            <a:solidFill>
+              <a:schemeClr val="bg1"/>
+            </a:solidFill>
+          </a:ln>
+        </p:spPr>
+        <p:style>
+          <a:lnRef idx="2">
+            <a:schemeClr val="accent1">
+              <a:shade val="50000"/>
+            </a:schemeClr>
+          </a:lnRef>
+          <a:fillRef idx="1">
+            <a:schemeClr val="accent1"/>
+          </a:fillRef>
+          <a:effectRef idx="0">
+            <a:schemeClr val="accent1"/>
+          </a:effectRef>
+          <a:fontRef idx="minor">
+            <a:schemeClr val="lt1"/>
+          </a:fontRef>
+        </p:style>
+        <p:txBody>
+          <a:bodyPr rtlCol="0" anchor="ctr"/>
+          <a:lstStyle/>
+          <a:p>
+            <a:pPr algn="ctr"/>
+            <a:endParaRPr lang="fr-FR"/>
+          </a:p>
+        </p:txBody>
+      </p:sp>
+      <p:pic>
+        <p:nvPicPr>
+          <p:cNvPr id="4" name="Image 3"/>
+          <p:cNvPicPr/>
+          <p:nvPr/>
+        </p:nvPicPr>
+        <p:blipFill>
+          <a:blip r:embed="rId3"/>
+          <a:stretch>
+            <a:fillRect/>
+          </a:stretch>
+        </p:blipFill>
+        <p:spPr>
+          <a:xfrm>
+            <a:off x="5971431" y="1852654"/>
+            <a:ext cx="4683318" cy="3435826"/>
+          </a:xfrm>
+          <a:prstGeom prst="rect">
+            <a:avLst/>
+          </a:prstGeom>
+        </p:spPr>
+      </p:pic>
+      <p:sp>
+        <p:nvSpPr>
+          <p:cNvPr id="5" name="ZoneTexte 4"/>
           <p:cNvSpPr txBox="1"/>
           <p:nvPr/>
         </p:nvSpPr>
         <p:spPr>
           <a:xfrm>
-            <a:off x="723568" y="588397"/>
-            <a:ext cx="10018643" cy="584775"/>
+            <a:off x="508884" y="302150"/>
+            <a:ext cx="6949440" cy="1077218"/>
           </a:xfrm>
           <a:prstGeom prst="rect">
             <a:avLst/>
@@ -4724,7 +5174,17 @@
                   <a:schemeClr val="bg1"/>
                 </a:solidFill>
               </a:rPr>
-              <a:t>CHARGER LA BASE DE DONNEES DANS UNE STRUCTURE</a:t>
+              <a:t>DESCRIPTION DE LA BASE </a:t>
+            </a:r>
+          </a:p>
+          <a:p>
+            <a:r>
+              <a:rPr lang="fr-FR" sz="3200" dirty="0" smtClean="0">
+                <a:solidFill>
+                  <a:schemeClr val="bg1"/>
+                </a:solidFill>
+              </a:rPr>
+              <a:t>DE DONNEES</a:t>
             </a:r>
             <a:endParaRPr lang="fr-FR" sz="3200" dirty="0">
               <a:solidFill>
@@ -4734,16 +5194,99 @@
           </a:p>
         </p:txBody>
       </p:sp>
-      <p:sp>
-        <p:nvSpPr>
-          <p:cNvPr id="6" name="ZoneTexte 5"/>
+      <p:cxnSp>
+        <p:nvCxnSpPr>
+          <p:cNvPr id="9" name="Connecteur droit 8"/>
+          <p:cNvCxnSpPr/>
+          <p:nvPr/>
+        </p:nvCxnSpPr>
+        <p:spPr>
+          <a:xfrm flipV="1">
+            <a:off x="508884" y="2154803"/>
+            <a:ext cx="3768918" cy="0"/>
+          </a:xfrm>
+          <a:prstGeom prst="line">
+            <a:avLst/>
+          </a:prstGeom>
+          <a:ln>
+            <a:solidFill>
+              <a:schemeClr val="bg1"/>
+            </a:solidFill>
+          </a:ln>
+        </p:spPr>
+        <p:style>
+          <a:lnRef idx="3">
+            <a:schemeClr val="dk1"/>
+          </a:lnRef>
+          <a:fillRef idx="0">
+            <a:schemeClr val="dk1"/>
+          </a:fillRef>
+          <a:effectRef idx="2">
+            <a:schemeClr val="dk1"/>
+          </a:effectRef>
+          <a:fontRef idx="minor">
+            <a:schemeClr val="tx1"/>
+          </a:fontRef>
+        </p:style>
+      </p:cxnSp>
+      <p:sp>
+        <p:nvSpPr>
+          <p:cNvPr id="2" name="Ellipse 1"/>
+          <p:cNvSpPr/>
+          <p:nvPr/>
+        </p:nvSpPr>
+        <p:spPr>
+          <a:xfrm>
+            <a:off x="1685675" y="3810460"/>
+            <a:ext cx="2196000" cy="2160000"/>
+          </a:xfrm>
+          <a:prstGeom prst="ellipse">
+            <a:avLst/>
+          </a:prstGeom>
+          <a:solidFill>
+            <a:schemeClr val="bg1"/>
+          </a:solidFill>
+          <a:ln>
+            <a:solidFill>
+              <a:schemeClr val="bg1"/>
+            </a:solidFill>
+          </a:ln>
+        </p:spPr>
+        <p:style>
+          <a:lnRef idx="2">
+            <a:schemeClr val="accent1">
+              <a:shade val="50000"/>
+            </a:schemeClr>
+          </a:lnRef>
+          <a:fillRef idx="1">
+            <a:schemeClr val="accent1"/>
+          </a:fillRef>
+          <a:effectRef idx="0">
+            <a:schemeClr val="accent1"/>
+          </a:effectRef>
+          <a:fontRef idx="minor">
+            <a:schemeClr val="lt1"/>
+          </a:fontRef>
+        </p:style>
+        <p:txBody>
+          <a:bodyPr rtlCol="0" anchor="ctr"/>
+          <a:lstStyle/>
+          <a:p>
+            <a:pPr algn="ctr"/>
+            <a:endParaRPr lang="fr-FR"/>
+          </a:p>
+        </p:txBody>
+      </p:sp>
+      <p:sp>
+        <p:nvSpPr>
+          <p:cNvPr id="3" name="ZoneTexte 2"/>
           <p:cNvSpPr txBox="1"/>
           <p:nvPr/>
         </p:nvSpPr>
         <p:spPr>
           <a:xfrm>
-            <a:off x="723569" y="1173172"/>
-            <a:ext cx="7545788" cy="400110"/>
+            <a:off x="1944812" y="4321736"/>
+            <a:ext cx="1677725" cy="369332"/>
           </a:xfrm>
           <a:prstGeom prst="rect">
             <a:avLst/>
@@ -4757,87 +5300,31 @@
           <a:lstStyle/>
           <a:p>
             <a:r>
-              <a:rPr lang="fr-FR" sz="2000" dirty="0" smtClean="0">
-                <a:solidFill>
-                  <a:schemeClr val="bg1"/>
-                </a:solidFill>
-              </a:rPr>
-              <a:t> 1 - Data frame</a:t>
-            </a:r>
-            <a:endParaRPr lang="fr-FR" sz="2000" dirty="0">
-              <a:solidFill>
-                <a:schemeClr val="bg1"/>
-              </a:solidFill>
-            </a:endParaRPr>
-          </a:p>
-        </p:txBody>
-      </p:sp>
-      <p:pic>
-        <p:nvPicPr>
-          <p:cNvPr id="7" name="Image 6"/>
-          <p:cNvPicPr/>
-          <p:nvPr/>
-        </p:nvPicPr>
-        <p:blipFill>
-          <a:blip r:embed="rId3">
-            <a:extLst>
-              <a:ext uri="{28A0092B-C50C-407E-A947-70E740481C1C}">
-                <a14:useLocalDpi xmlns:a14="http://schemas.microsoft.com/office/drawing/2010/main" val="0"/>
-              </a:ext>
-            </a:extLst>
-          </a:blip>
-          <a:stretch>
-            <a:fillRect/>
-          </a:stretch>
-        </p:blipFill>
-        <p:spPr>
-          <a:xfrm>
-            <a:off x="723568" y="2045498"/>
-            <a:ext cx="4958715" cy="3940175"/>
-          </a:xfrm>
-          <a:prstGeom prst="rect">
-            <a:avLst/>
-          </a:prstGeom>
-        </p:spPr>
-      </p:pic>
-      <p:pic>
-        <p:nvPicPr>
-          <p:cNvPr id="8" name="Image 7"/>
-          <p:cNvPicPr/>
-          <p:nvPr/>
-        </p:nvPicPr>
-        <p:blipFill>
-          <a:blip r:embed="rId4">
-            <a:extLst>
-              <a:ext uri="{28A0092B-C50C-407E-A947-70E740481C1C}">
-                <a14:useLocalDpi xmlns:a14="http://schemas.microsoft.com/office/drawing/2010/main" val="0"/>
-              </a:ext>
-            </a:extLst>
-          </a:blip>
-          <a:stretch>
-            <a:fillRect/>
-          </a:stretch>
-        </p:blipFill>
-        <p:spPr>
-          <a:xfrm>
-            <a:off x="6727796" y="2045498"/>
-            <a:ext cx="4841352" cy="3940175"/>
-          </a:xfrm>
-          <a:prstGeom prst="rect">
-            <a:avLst/>
-          </a:prstGeom>
-        </p:spPr>
-      </p:pic>
-      <p:sp>
-        <p:nvSpPr>
-          <p:cNvPr id="9" name="ZoneTexte 8"/>
+              <a:rPr lang="fr-FR" b="1" dirty="0"/>
+              <a:t>277 </a:t>
+            </a:r>
+            <a:r>
+              <a:rPr lang="fr-FR" b="1" dirty="0" smtClean="0"/>
+              <a:t>524 </a:t>
+            </a:r>
+            <a:r>
+              <a:rPr lang="fr-FR" b="1" dirty="0" smtClean="0"/>
+              <a:t>images</a:t>
+            </a:r>
+            <a:endParaRPr lang="fr-FR" b="1" dirty="0"/>
+          </a:p>
+        </p:txBody>
+      </p:sp>
+      <p:sp>
+        <p:nvSpPr>
+          <p:cNvPr id="10" name="ZoneTexte 9"/>
           <p:cNvSpPr txBox="1"/>
           <p:nvPr/>
         </p:nvSpPr>
         <p:spPr>
           <a:xfrm>
-            <a:off x="2665012" y="6057779"/>
-            <a:ext cx="889222" cy="400110"/>
+            <a:off x="1944812" y="5218373"/>
+            <a:ext cx="1677725" cy="369332"/>
           </a:xfrm>
           <a:prstGeom prst="rect">
             <a:avLst/>
@@ -4851,63 +5338,69 @@
           <a:lstStyle/>
           <a:p>
             <a:r>
-              <a:rPr lang="fr-FR" sz="2000" i="1" dirty="0" smtClean="0">
-                <a:solidFill>
-                  <a:schemeClr val="bg1"/>
-                </a:solidFill>
-              </a:rPr>
-              <a:t>Code</a:t>
-            </a:r>
-            <a:endParaRPr lang="fr-FR" sz="2000" i="1" dirty="0">
-              <a:solidFill>
-                <a:schemeClr val="bg1"/>
-              </a:solidFill>
-            </a:endParaRPr>
-          </a:p>
-        </p:txBody>
-      </p:sp>
-      <p:sp>
-        <p:nvSpPr>
-          <p:cNvPr id="10" name="ZoneTexte 9"/>
-          <p:cNvSpPr txBox="1"/>
-          <p:nvPr/>
-        </p:nvSpPr>
-        <p:spPr>
-          <a:xfrm>
-            <a:off x="8269357" y="6021726"/>
-            <a:ext cx="2307201" cy="400110"/>
-          </a:xfrm>
-          <a:prstGeom prst="rect">
-            <a:avLst/>
-          </a:prstGeom>
-          <a:noFill/>
-        </p:spPr>
-        <p:txBody>
-          <a:bodyPr wrap="square" rtlCol="0">
-            <a:spAutoFit/>
-          </a:bodyPr>
-          <a:lstStyle/>
-          <a:p>
-            <a:r>
-              <a:rPr lang="fr-FR" sz="2000" i="1" dirty="0" smtClean="0">
-                <a:solidFill>
-                  <a:schemeClr val="bg1"/>
-                </a:solidFill>
-              </a:rPr>
-              <a:t>Data frame résultat</a:t>
-            </a:r>
-            <a:endParaRPr lang="fr-FR" sz="2000" i="1" dirty="0">
-              <a:solidFill>
-                <a:schemeClr val="bg1"/>
-              </a:solidFill>
-            </a:endParaRPr>
+              <a:rPr lang="fr-FR" b="1" dirty="0" smtClean="0"/>
+              <a:t>275 246 </a:t>
+            </a:r>
+            <a:r>
+              <a:rPr lang="fr-FR" b="1" dirty="0" smtClean="0"/>
+              <a:t>images</a:t>
+            </a:r>
+            <a:endParaRPr lang="fr-FR" b="1" dirty="0"/>
+          </a:p>
+        </p:txBody>
+      </p:sp>
+      <p:sp>
+        <p:nvSpPr>
+          <p:cNvPr id="8" name="Flèche vers le bas 7"/>
+          <p:cNvSpPr/>
+          <p:nvPr/>
+        </p:nvSpPr>
+        <p:spPr>
+          <a:xfrm>
+            <a:off x="2616620" y="4710836"/>
+            <a:ext cx="334108" cy="455030"/>
+          </a:xfrm>
+          <a:prstGeom prst="downArrow">
+            <a:avLst/>
+          </a:prstGeom>
+          <a:solidFill>
+            <a:srgbClr val="CB1B4A"/>
+          </a:solidFill>
+          <a:ln>
+            <a:solidFill>
+              <a:srgbClr val="CB1B4A"/>
+            </a:solidFill>
+          </a:ln>
+        </p:spPr>
+        <p:style>
+          <a:lnRef idx="2">
+            <a:schemeClr val="accent1">
+              <a:shade val="50000"/>
+            </a:schemeClr>
+          </a:lnRef>
+          <a:fillRef idx="1">
+            <a:schemeClr val="accent1"/>
+          </a:fillRef>
+          <a:effectRef idx="0">
+            <a:schemeClr val="accent1"/>
+          </a:effectRef>
+          <a:fontRef idx="minor">
+            <a:schemeClr val="lt1"/>
+          </a:fontRef>
+        </p:style>
+        <p:txBody>
+          <a:bodyPr rtlCol="0" anchor="ctr"/>
+          <a:lstStyle/>
+          <a:p>
+            <a:pPr algn="ctr"/>
+            <a:endParaRPr lang="fr-FR"/>
           </a:p>
         </p:txBody>
       </p:sp>
     </p:spTree>
     <p:extLst>
       <p:ext uri="{BB962C8B-B14F-4D97-AF65-F5344CB8AC3E}">
-        <p14:creationId xmlns:p14="http://schemas.microsoft.com/office/powerpoint/2010/main" val="1220944275"/>
+        <p14:creationId xmlns:p14="http://schemas.microsoft.com/office/powerpoint/2010/main" val="1128876710"/>
       </p:ext>
     </p:extLst>
   </p:cSld>
@@ -4967,7 +5460,7 @@
       </p:pic>
       <p:sp>
         <p:nvSpPr>
-          <p:cNvPr id="6" name="ZoneTexte 5"/>
+          <p:cNvPr id="4" name="ZoneTexte 3"/>
           <p:cNvSpPr txBox="1"/>
           <p:nvPr/>
         </p:nvSpPr>
@@ -5005,7 +5498,7 @@
       </p:sp>
       <p:sp>
         <p:nvSpPr>
-          <p:cNvPr id="7" name="ZoneTexte 6"/>
+          <p:cNvPr id="6" name="ZoneTexte 5"/>
           <p:cNvSpPr txBox="1"/>
           <p:nvPr/>
         </p:nvSpPr>
@@ -5031,7 +5524,7 @@
                   <a:schemeClr val="bg1"/>
                 </a:solidFill>
               </a:rPr>
-              <a:t>2 - Tableau</a:t>
+              <a:t> 1 - Data frame</a:t>
             </a:r>
             <a:endParaRPr lang="fr-FR" sz="2000" dirty="0">
               <a:solidFill>
@@ -5043,74 +5536,12 @@
       </p:sp>
       <p:pic>
         <p:nvPicPr>
-          <p:cNvPr id="10" name="Image 9"/>
+          <p:cNvPr id="7" name="Image 6"/>
           <p:cNvPicPr/>
           <p:nvPr/>
         </p:nvPicPr>
         <p:blipFill>
-          <a:blip r:embed="rId3"/>
-          <a:stretch>
-            <a:fillRect/>
-          </a:stretch>
-        </p:blipFill>
-        <p:spPr>
-          <a:xfrm>
-            <a:off x="1934152" y="2038749"/>
-            <a:ext cx="6502181" cy="3807736"/>
-          </a:xfrm>
-          <a:prstGeom prst="rect">
-            <a:avLst/>
-          </a:prstGeom>
-        </p:spPr>
-      </p:pic>
-      <p:sp>
-        <p:nvSpPr>
-          <p:cNvPr id="2" name="ZoneTexte 1"/>
-          <p:cNvSpPr txBox="1"/>
-          <p:nvPr/>
-        </p:nvSpPr>
-        <p:spPr>
-          <a:xfrm>
-            <a:off x="9374588" y="5200154"/>
-            <a:ext cx="2305879" cy="646331"/>
-          </a:xfrm>
-          <a:prstGeom prst="rect">
-            <a:avLst/>
-          </a:prstGeom>
-          <a:noFill/>
-        </p:spPr>
-        <p:txBody>
-          <a:bodyPr wrap="square" rtlCol="0">
-            <a:spAutoFit/>
-          </a:bodyPr>
-          <a:lstStyle/>
-          <a:p>
-            <a:r>
-              <a:rPr lang="fr-FR" i="1" dirty="0" smtClean="0">
-                <a:solidFill>
-                  <a:schemeClr val="bg1"/>
-                </a:solidFill>
-              </a:rPr>
-              <a:t>Résultat : il n’y a plus les crochets []</a:t>
-            </a:r>
-            <a:endParaRPr lang="fr-FR" i="1" dirty="0">
-              <a:solidFill>
-                <a:schemeClr val="bg1"/>
-              </a:solidFill>
-            </a:endParaRPr>
-          </a:p>
-        </p:txBody>
-      </p:sp>
-      <p:pic>
-        <p:nvPicPr>
-          <p:cNvPr id="12" name="Image 11"/>
-          <p:cNvPicPr>
-            <a:picLocks noChangeAspect="1"/>
-          </p:cNvPicPr>
-          <p:nvPr/>
-        </p:nvPicPr>
-        <p:blipFill>
-          <a:blip r:embed="rId4" cstate="print">
+          <a:blip r:embed="rId3">
             <a:extLst>
               <a:ext uri="{28A0092B-C50C-407E-A947-70E740481C1C}">
                 <a14:useLocalDpi xmlns:a14="http://schemas.microsoft.com/office/drawing/2010/main" val="0"/>
@@ -5123,18 +5554,122 @@
         </p:blipFill>
         <p:spPr>
           <a:xfrm>
-            <a:off x="8450209" y="4996951"/>
-            <a:ext cx="924379" cy="759970"/>
+            <a:off x="723568" y="2045498"/>
+            <a:ext cx="4958715" cy="3940175"/>
           </a:xfrm>
           <a:prstGeom prst="rect">
             <a:avLst/>
           </a:prstGeom>
         </p:spPr>
       </p:pic>
+      <p:pic>
+        <p:nvPicPr>
+          <p:cNvPr id="8" name="Image 7"/>
+          <p:cNvPicPr/>
+          <p:nvPr/>
+        </p:nvPicPr>
+        <p:blipFill>
+          <a:blip r:embed="rId4">
+            <a:extLst>
+              <a:ext uri="{28A0092B-C50C-407E-A947-70E740481C1C}">
+                <a14:useLocalDpi xmlns:a14="http://schemas.microsoft.com/office/drawing/2010/main" val="0"/>
+              </a:ext>
+            </a:extLst>
+          </a:blip>
+          <a:stretch>
+            <a:fillRect/>
+          </a:stretch>
+        </p:blipFill>
+        <p:spPr>
+          <a:xfrm>
+            <a:off x="6727796" y="2045498"/>
+            <a:ext cx="4841352" cy="3940175"/>
+          </a:xfrm>
+          <a:prstGeom prst="rect">
+            <a:avLst/>
+          </a:prstGeom>
+        </p:spPr>
+      </p:pic>
+      <p:sp>
+        <p:nvSpPr>
+          <p:cNvPr id="9" name="ZoneTexte 8"/>
+          <p:cNvSpPr txBox="1"/>
+          <p:nvPr/>
+        </p:nvSpPr>
+        <p:spPr>
+          <a:xfrm>
+            <a:off x="2665012" y="6057779"/>
+            <a:ext cx="889222" cy="400110"/>
+          </a:xfrm>
+          <a:prstGeom prst="rect">
+            <a:avLst/>
+          </a:prstGeom>
+          <a:noFill/>
+        </p:spPr>
+        <p:txBody>
+          <a:bodyPr wrap="square" rtlCol="0">
+            <a:spAutoFit/>
+          </a:bodyPr>
+          <a:lstStyle/>
+          <a:p>
+            <a:r>
+              <a:rPr lang="fr-FR" sz="2000" i="1" dirty="0" smtClean="0">
+                <a:solidFill>
+                  <a:schemeClr val="bg1"/>
+                </a:solidFill>
+              </a:rPr>
+              <a:t>Code</a:t>
+            </a:r>
+            <a:endParaRPr lang="fr-FR" sz="2000" i="1" dirty="0">
+              <a:solidFill>
+                <a:schemeClr val="bg1"/>
+              </a:solidFill>
+            </a:endParaRPr>
+          </a:p>
+        </p:txBody>
+      </p:sp>
+      <p:sp>
+        <p:nvSpPr>
+          <p:cNvPr id="10" name="ZoneTexte 9"/>
+          <p:cNvSpPr txBox="1"/>
+          <p:nvPr/>
+        </p:nvSpPr>
+        <p:spPr>
+          <a:xfrm>
+            <a:off x="8269357" y="6021726"/>
+            <a:ext cx="2307201" cy="400110"/>
+          </a:xfrm>
+          <a:prstGeom prst="rect">
+            <a:avLst/>
+          </a:prstGeom>
+          <a:noFill/>
+        </p:spPr>
+        <p:txBody>
+          <a:bodyPr wrap="square" rtlCol="0">
+            <a:spAutoFit/>
+          </a:bodyPr>
+          <a:lstStyle/>
+          <a:p>
+            <a:r>
+              <a:rPr lang="fr-FR" sz="2000" i="1" dirty="0" smtClean="0">
+                <a:solidFill>
+                  <a:schemeClr val="bg1"/>
+                </a:solidFill>
+              </a:rPr>
+              <a:t>Data frame résultat</a:t>
+            </a:r>
+            <a:endParaRPr lang="fr-FR" sz="2000" i="1" dirty="0">
+              <a:solidFill>
+                <a:schemeClr val="bg1"/>
+              </a:solidFill>
+            </a:endParaRPr>
+          </a:p>
+        </p:txBody>
+      </p:sp>
     </p:spTree>
     <p:extLst>
       <p:ext uri="{BB962C8B-B14F-4D97-AF65-F5344CB8AC3E}">
-        <p14:creationId xmlns:p14="http://schemas.microsoft.com/office/powerpoint/2010/main" val="610501707"/>
+        <p14:creationId xmlns:p14="http://schemas.microsoft.com/office/powerpoint/2010/main" val="1220944275"/>
       </p:ext>
     </p:extLst>
   </p:cSld>
@@ -5170,7 +5705,7 @@
       </p:grpSpPr>
       <p:pic>
         <p:nvPicPr>
-          <p:cNvPr id="6" name="Image 5"/>
+          <p:cNvPr id="5" name="Image 4"/>
           <p:cNvPicPr>
             <a:picLocks noChangeAspect="1"/>
           </p:cNvPicPr>
@@ -5194,110 +5729,14 @@
       </p:pic>
       <p:sp>
         <p:nvSpPr>
-          <p:cNvPr id="12" name="Rectangle 11"/>
-          <p:cNvSpPr/>
-          <p:nvPr/>
-        </p:nvSpPr>
-        <p:spPr>
-          <a:xfrm>
-            <a:off x="7617350" y="2988900"/>
-            <a:ext cx="1980530" cy="958704"/>
-          </a:xfrm>
-          <a:prstGeom prst="rect">
-            <a:avLst/>
-          </a:prstGeom>
-          <a:solidFill>
-            <a:srgbClr val="CB1B4A"/>
-          </a:solidFill>
-          <a:ln>
-            <a:solidFill>
-              <a:srgbClr val="CB1B4A"/>
-            </a:solidFill>
-          </a:ln>
-        </p:spPr>
-        <p:style>
-          <a:lnRef idx="2">
-            <a:schemeClr val="accent1">
-              <a:shade val="50000"/>
-            </a:schemeClr>
-          </a:lnRef>
-          <a:fillRef idx="1">
-            <a:schemeClr val="accent1"/>
-          </a:fillRef>
-          <a:effectRef idx="0">
-            <a:schemeClr val="accent1"/>
-          </a:effectRef>
-          <a:fontRef idx="minor">
-            <a:schemeClr val="lt1"/>
-          </a:fontRef>
-        </p:style>
-        <p:txBody>
-          <a:bodyPr rtlCol="0" anchor="ctr"/>
-          <a:lstStyle/>
-          <a:p>
-            <a:pPr algn="ctr"/>
-            <a:endParaRPr lang="fr-FR"/>
-          </a:p>
-        </p:txBody>
-      </p:sp>
-      <p:sp>
-        <p:nvSpPr>
-          <p:cNvPr id="11" name="Rectangle 10"/>
-          <p:cNvSpPr/>
-          <p:nvPr/>
-        </p:nvSpPr>
-        <p:spPr>
-          <a:xfrm>
-            <a:off x="2750364" y="2988900"/>
-            <a:ext cx="4878885" cy="958704"/>
-          </a:xfrm>
-          <a:prstGeom prst="rect">
-            <a:avLst/>
-          </a:prstGeom>
-          <a:solidFill>
-            <a:srgbClr val="C2C923"/>
-          </a:solidFill>
-          <a:ln>
-            <a:solidFill>
-              <a:srgbClr val="C2C923"/>
-            </a:solidFill>
-          </a:ln>
-        </p:spPr>
-        <p:style>
-          <a:lnRef idx="2">
-            <a:schemeClr val="accent1">
-              <a:shade val="50000"/>
-            </a:schemeClr>
-          </a:lnRef>
-          <a:fillRef idx="1">
-            <a:schemeClr val="accent1"/>
-          </a:fillRef>
-          <a:effectRef idx="0">
-            <a:schemeClr val="accent1"/>
-          </a:effectRef>
-          <a:fontRef idx="minor">
-            <a:schemeClr val="lt1"/>
-          </a:fontRef>
-        </p:style>
-        <p:txBody>
-          <a:bodyPr rtlCol="0" anchor="ctr"/>
-          <a:lstStyle/>
-          <a:p>
-            <a:pPr algn="ctr"/>
-            <a:endParaRPr lang="fr-FR"/>
-          </a:p>
-        </p:txBody>
-      </p:sp>
-      <p:sp>
-        <p:nvSpPr>
-          <p:cNvPr id="4" name="ZoneTexte 3"/>
+          <p:cNvPr id="6" name="ZoneTexte 5"/>
           <p:cNvSpPr txBox="1"/>
           <p:nvPr/>
         </p:nvSpPr>
         <p:spPr>
           <a:xfrm>
-            <a:off x="723569" y="588397"/>
-            <a:ext cx="7545788" cy="584775"/>
+            <a:off x="723568" y="588397"/>
+            <a:ext cx="10018643" cy="584775"/>
           </a:xfrm>
           <a:prstGeom prst="rect">
             <a:avLst/>
@@ -5316,7 +5755,7 @@
                   <a:schemeClr val="bg1"/>
                 </a:solidFill>
               </a:rPr>
-              <a:t>PREPARATION A L’APPLICATION</a:t>
+              <a:t>CHARGER LA BASE DE DONNEES DANS UNE STRUCTURE</a:t>
             </a:r>
             <a:endParaRPr lang="fr-FR" sz="3200" dirty="0">
               <a:solidFill>
@@ -5328,218 +5767,35 @@
       </p:sp>
       <p:sp>
         <p:nvSpPr>
-          <p:cNvPr id="9" name="Sous-titre 2"/>
-          <p:cNvSpPr txBox="1">
-            <a:spLocks/>
-          </p:cNvSpPr>
-          <p:nvPr/>
-        </p:nvSpPr>
-        <p:spPr>
-          <a:xfrm>
-            <a:off x="7885778" y="3179703"/>
-            <a:ext cx="1711446" cy="659003"/>
-          </a:xfrm>
-          <a:prstGeom prst="rect">
-            <a:avLst/>
-          </a:prstGeom>
-        </p:spPr>
-        <p:txBody>
-          <a:bodyPr vert="horz" lIns="91440" tIns="45720" rIns="91440" bIns="45720" rtlCol="0">
-            <a:normAutofit/>
+          <p:cNvPr id="7" name="ZoneTexte 6"/>
+          <p:cNvSpPr txBox="1"/>
+          <p:nvPr/>
+        </p:nvSpPr>
+        <p:spPr>
+          <a:xfrm>
+            <a:off x="723569" y="1173172"/>
+            <a:ext cx="7545788" cy="400110"/>
+          </a:xfrm>
+          <a:prstGeom prst="rect">
+            <a:avLst/>
+          </a:prstGeom>
+          <a:noFill/>
+        </p:spPr>
+        <p:txBody>
+          <a:bodyPr wrap="square" rtlCol="0">
+            <a:spAutoFit/>
           </a:bodyPr>
-          <a:lstStyle>
-            <a:lvl1pPr marL="228600" indent="-228600" algn="l" defTabSz="914400" rtl="0" eaLnBrk="1" latinLnBrk="0" hangingPunct="1">
-              <a:lnSpc>
-                <a:spcPct val="90000"/>
-              </a:lnSpc>
-              <a:spcBef>
-                <a:spcPts val="1000"/>
-              </a:spcBef>
-              <a:buFont typeface="Arial" panose="020B0604020202020204" pitchFamily="34" charset="0"/>
-              <a:buChar char="•"/>
-              <a:defRPr sz="2800" kern="1200">
-                <a:solidFill>
-                  <a:schemeClr val="tx1"/>
-                </a:solidFill>
-                <a:latin typeface="+mn-lt"/>
-                <a:ea typeface="+mn-ea"/>
-                <a:cs typeface="+mn-cs"/>
-              </a:defRPr>
-            </a:lvl1pPr>
-            <a:lvl2pPr marL="685800" indent="-228600" algn="l" defTabSz="914400" rtl="0" eaLnBrk="1" latinLnBrk="0" hangingPunct="1">
-              <a:lnSpc>
-                <a:spcPct val="90000"/>
-              </a:lnSpc>
-              <a:spcBef>
-                <a:spcPts val="500"/>
-              </a:spcBef>
-              <a:buFont typeface="Arial" panose="020B0604020202020204" pitchFamily="34" charset="0"/>
-              <a:buChar char="•"/>
-              <a:defRPr sz="2400" kern="1200">
-                <a:solidFill>
-                  <a:schemeClr val="tx1"/>
-                </a:solidFill>
-                <a:latin typeface="+mn-lt"/>
-                <a:ea typeface="+mn-ea"/>
-                <a:cs typeface="+mn-cs"/>
-              </a:defRPr>
-            </a:lvl2pPr>
-            <a:lvl3pPr marL="1143000" indent="-228600" algn="l" defTabSz="914400" rtl="0" eaLnBrk="1" latinLnBrk="0" hangingPunct="1">
-              <a:lnSpc>
-                <a:spcPct val="90000"/>
-              </a:lnSpc>
-              <a:spcBef>
-                <a:spcPts val="500"/>
-              </a:spcBef>
-              <a:buFont typeface="Arial" panose="020B0604020202020204" pitchFamily="34" charset="0"/>
-              <a:buChar char="•"/>
-              <a:defRPr sz="2000" kern="1200">
-                <a:solidFill>
-                  <a:schemeClr val="tx1"/>
-                </a:solidFill>
-                <a:latin typeface="+mn-lt"/>
-                <a:ea typeface="+mn-ea"/>
-                <a:cs typeface="+mn-cs"/>
-              </a:defRPr>
-            </a:lvl3pPr>
-            <a:lvl4pPr marL="1600200" indent="-228600" algn="l" defTabSz="914400" rtl="0" eaLnBrk="1" latinLnBrk="0" hangingPunct="1">
-              <a:lnSpc>
-                <a:spcPct val="90000"/>
-              </a:lnSpc>
-              <a:spcBef>
-                <a:spcPts val="500"/>
-              </a:spcBef>
-              <a:buFont typeface="Arial" panose="020B0604020202020204" pitchFamily="34" charset="0"/>
-              <a:buChar char="•"/>
-              <a:defRPr sz="1800" kern="1200">
-                <a:solidFill>
-                  <a:schemeClr val="tx1"/>
-                </a:solidFill>
-                <a:latin typeface="+mn-lt"/>
-                <a:ea typeface="+mn-ea"/>
-                <a:cs typeface="+mn-cs"/>
-              </a:defRPr>
-            </a:lvl4pPr>
-            <a:lvl5pPr marL="2057400" indent="-228600" algn="l" defTabSz="914400" rtl="0" eaLnBrk="1" latinLnBrk="0" hangingPunct="1">
-              <a:lnSpc>
-                <a:spcPct val="90000"/>
-              </a:lnSpc>
-              <a:spcBef>
-                <a:spcPts val="500"/>
-              </a:spcBef>
-              <a:buFont typeface="Arial" panose="020B0604020202020204" pitchFamily="34" charset="0"/>
-              <a:buChar char="•"/>
-              <a:defRPr sz="1800" kern="1200">
-                <a:solidFill>
-                  <a:schemeClr val="tx1"/>
-                </a:solidFill>
-                <a:latin typeface="+mn-lt"/>
-                <a:ea typeface="+mn-ea"/>
-                <a:cs typeface="+mn-cs"/>
-              </a:defRPr>
-            </a:lvl5pPr>
-            <a:lvl6pPr marL="2514600" indent="-228600" algn="l" defTabSz="914400" rtl="0" eaLnBrk="1" latinLnBrk="0" hangingPunct="1">
-              <a:lnSpc>
-                <a:spcPct val="90000"/>
-              </a:lnSpc>
-              <a:spcBef>
-                <a:spcPts val="500"/>
-              </a:spcBef>
-              <a:buFont typeface="Arial" panose="020B0604020202020204" pitchFamily="34" charset="0"/>
-              <a:buChar char="•"/>
-              <a:defRPr sz="1800" kern="1200">
-                <a:solidFill>
-                  <a:schemeClr val="tx1"/>
-                </a:solidFill>
-                <a:latin typeface="+mn-lt"/>
-                <a:ea typeface="+mn-ea"/>
-                <a:cs typeface="+mn-cs"/>
-              </a:defRPr>
-            </a:lvl6pPr>
-            <a:lvl7pPr marL="2971800" indent="-228600" algn="l" defTabSz="914400" rtl="0" eaLnBrk="1" latinLnBrk="0" hangingPunct="1">
-              <a:lnSpc>
-                <a:spcPct val="90000"/>
-              </a:lnSpc>
-              <a:spcBef>
-                <a:spcPts val="500"/>
-              </a:spcBef>
-              <a:buFont typeface="Arial" panose="020B0604020202020204" pitchFamily="34" charset="0"/>
-              <a:buChar char="•"/>
-              <a:defRPr sz="1800" kern="1200">
-                <a:solidFill>
-                  <a:schemeClr val="tx1"/>
-                </a:solidFill>
-                <a:latin typeface="+mn-lt"/>
-                <a:ea typeface="+mn-ea"/>
-                <a:cs typeface="+mn-cs"/>
-              </a:defRPr>
-            </a:lvl7pPr>
-            <a:lvl8pPr marL="3429000" indent="-228600" algn="l" defTabSz="914400" rtl="0" eaLnBrk="1" latinLnBrk="0" hangingPunct="1">
-              <a:lnSpc>
-                <a:spcPct val="90000"/>
-              </a:lnSpc>
-              <a:spcBef>
-                <a:spcPts val="500"/>
-              </a:spcBef>
-              <a:buFont typeface="Arial" panose="020B0604020202020204" pitchFamily="34" charset="0"/>
-              <a:buChar char="•"/>
-              <a:defRPr sz="1800" kern="1200">
-                <a:solidFill>
-                  <a:schemeClr val="tx1"/>
-                </a:solidFill>
-                <a:latin typeface="+mn-lt"/>
-                <a:ea typeface="+mn-ea"/>
-                <a:cs typeface="+mn-cs"/>
-              </a:defRPr>
-            </a:lvl8pPr>
-            <a:lvl9pPr marL="3886200" indent="-228600" algn="l" defTabSz="914400" rtl="0" eaLnBrk="1" latinLnBrk="0" hangingPunct="1">
-              <a:lnSpc>
-                <a:spcPct val="90000"/>
-              </a:lnSpc>
-              <a:spcBef>
-                <a:spcPts val="500"/>
-              </a:spcBef>
-              <a:buFont typeface="Arial" panose="020B0604020202020204" pitchFamily="34" charset="0"/>
-              <a:buChar char="•"/>
-              <a:defRPr sz="1800" kern="1200">
-                <a:solidFill>
-                  <a:schemeClr val="tx1"/>
-                </a:solidFill>
-                <a:latin typeface="+mn-lt"/>
-                <a:ea typeface="+mn-ea"/>
-                <a:cs typeface="+mn-cs"/>
-              </a:defRPr>
-            </a:lvl9pPr>
-          </a:lstStyle>
-          <a:p>
-            <a:pPr marL="0" indent="0">
-              <a:buNone/>
-            </a:pPr>
-            <a:r>
-              <a:rPr lang="fr-FR" dirty="0" smtClean="0">
+          <a:lstStyle/>
+          <a:p>
+            <a:r>
+              <a:rPr lang="fr-FR" sz="2000" dirty="0" smtClean="0">
                 <a:solidFill>
                   <a:schemeClr val="bg1"/>
                 </a:solidFill>
               </a:rPr>
-              <a:t>T</a:t>
-            </a:r>
-            <a:r>
-              <a:rPr lang="fr-FR" dirty="0" smtClean="0">
-                <a:solidFill>
-                  <a:schemeClr val="bg1"/>
-                </a:solidFill>
-              </a:rPr>
-              <a:t>est </a:t>
-            </a:r>
-            <a:r>
-              <a:rPr lang="fr-FR" dirty="0" smtClean="0">
-                <a:solidFill>
-                  <a:schemeClr val="bg1"/>
-                </a:solidFill>
-              </a:rPr>
-              <a:t>25%</a:t>
-            </a:r>
-            <a:endParaRPr lang="fr-FR" dirty="0">
+              <a:t>2 - Tableau</a:t>
+            </a:r>
+            <a:endParaRPr lang="fr-FR" sz="2000" dirty="0">
               <a:solidFill>
                 <a:schemeClr val="bg1"/>
               </a:solidFill>
@@ -5547,220 +5803,59 @@
           </a:p>
         </p:txBody>
       </p:sp>
-      <p:sp>
-        <p:nvSpPr>
-          <p:cNvPr id="8" name="Sous-titre 2"/>
-          <p:cNvSpPr txBox="1">
-            <a:spLocks/>
-          </p:cNvSpPr>
-          <p:nvPr/>
-        </p:nvSpPr>
-        <p:spPr>
-          <a:xfrm>
-            <a:off x="4304701" y="3183220"/>
-            <a:ext cx="2459906" cy="490283"/>
-          </a:xfrm>
-          <a:prstGeom prst="rect">
-            <a:avLst/>
-          </a:prstGeom>
-        </p:spPr>
-        <p:txBody>
-          <a:bodyPr vert="horz" lIns="91440" tIns="45720" rIns="91440" bIns="45720" rtlCol="0">
-            <a:normAutofit/>
+      <p:pic>
+        <p:nvPicPr>
+          <p:cNvPr id="10" name="Image 9"/>
+          <p:cNvPicPr/>
+          <p:nvPr/>
+        </p:nvPicPr>
+        <p:blipFill>
+          <a:blip r:embed="rId3"/>
+          <a:stretch>
+            <a:fillRect/>
+          </a:stretch>
+        </p:blipFill>
+        <p:spPr>
+          <a:xfrm>
+            <a:off x="1934152" y="2038749"/>
+            <a:ext cx="6502181" cy="3807736"/>
+          </a:xfrm>
+          <a:prstGeom prst="rect">
+            <a:avLst/>
+          </a:prstGeom>
+        </p:spPr>
+      </p:pic>
+      <p:sp>
+        <p:nvSpPr>
+          <p:cNvPr id="2" name="ZoneTexte 1"/>
+          <p:cNvSpPr txBox="1"/>
+          <p:nvPr/>
+        </p:nvSpPr>
+        <p:spPr>
+          <a:xfrm>
+            <a:off x="9374588" y="5200154"/>
+            <a:ext cx="2305879" cy="646331"/>
+          </a:xfrm>
+          <a:prstGeom prst="rect">
+            <a:avLst/>
+          </a:prstGeom>
+          <a:noFill/>
+        </p:spPr>
+        <p:txBody>
+          <a:bodyPr wrap="square" rtlCol="0">
+            <a:spAutoFit/>
           </a:bodyPr>
-          <a:lstStyle>
-            <a:lvl1pPr marL="228600" indent="-228600" algn="l" defTabSz="914400" rtl="0" eaLnBrk="1" latinLnBrk="0" hangingPunct="1">
-              <a:lnSpc>
-                <a:spcPct val="90000"/>
-              </a:lnSpc>
-              <a:spcBef>
-                <a:spcPts val="1000"/>
-              </a:spcBef>
-              <a:buFont typeface="Arial" panose="020B0604020202020204" pitchFamily="34" charset="0"/>
-              <a:buChar char="•"/>
-              <a:defRPr sz="2800" kern="1200">
-                <a:solidFill>
-                  <a:schemeClr val="tx1"/>
-                </a:solidFill>
-                <a:latin typeface="+mn-lt"/>
-                <a:ea typeface="+mn-ea"/>
-                <a:cs typeface="+mn-cs"/>
-              </a:defRPr>
-            </a:lvl1pPr>
-            <a:lvl2pPr marL="685800" indent="-228600" algn="l" defTabSz="914400" rtl="0" eaLnBrk="1" latinLnBrk="0" hangingPunct="1">
-              <a:lnSpc>
-                <a:spcPct val="90000"/>
-              </a:lnSpc>
-              <a:spcBef>
-                <a:spcPts val="500"/>
-              </a:spcBef>
-              <a:buFont typeface="Arial" panose="020B0604020202020204" pitchFamily="34" charset="0"/>
-              <a:buChar char="•"/>
-              <a:defRPr sz="2400" kern="1200">
-                <a:solidFill>
-                  <a:schemeClr val="tx1"/>
-                </a:solidFill>
-                <a:latin typeface="+mn-lt"/>
-                <a:ea typeface="+mn-ea"/>
-                <a:cs typeface="+mn-cs"/>
-              </a:defRPr>
-            </a:lvl2pPr>
-            <a:lvl3pPr marL="1143000" indent="-228600" algn="l" defTabSz="914400" rtl="0" eaLnBrk="1" latinLnBrk="0" hangingPunct="1">
-              <a:lnSpc>
-                <a:spcPct val="90000"/>
-              </a:lnSpc>
-              <a:spcBef>
-                <a:spcPts val="500"/>
-              </a:spcBef>
-              <a:buFont typeface="Arial" panose="020B0604020202020204" pitchFamily="34" charset="0"/>
-              <a:buChar char="•"/>
-              <a:defRPr sz="2000" kern="1200">
-                <a:solidFill>
-                  <a:schemeClr val="tx1"/>
-                </a:solidFill>
-                <a:latin typeface="+mn-lt"/>
-                <a:ea typeface="+mn-ea"/>
-                <a:cs typeface="+mn-cs"/>
-              </a:defRPr>
-            </a:lvl3pPr>
-            <a:lvl4pPr marL="1600200" indent="-228600" algn="l" defTabSz="914400" rtl="0" eaLnBrk="1" latinLnBrk="0" hangingPunct="1">
-              <a:lnSpc>
-                <a:spcPct val="90000"/>
-              </a:lnSpc>
-              <a:spcBef>
-                <a:spcPts val="500"/>
-              </a:spcBef>
-              <a:buFont typeface="Arial" panose="020B0604020202020204" pitchFamily="34" charset="0"/>
-              <a:buChar char="•"/>
-              <a:defRPr sz="1800" kern="1200">
-                <a:solidFill>
-                  <a:schemeClr val="tx1"/>
-                </a:solidFill>
-                <a:latin typeface="+mn-lt"/>
-                <a:ea typeface="+mn-ea"/>
-                <a:cs typeface="+mn-cs"/>
-              </a:defRPr>
-            </a:lvl4pPr>
-            <a:lvl5pPr marL="2057400" indent="-228600" algn="l" defTabSz="914400" rtl="0" eaLnBrk="1" latinLnBrk="0" hangingPunct="1">
-              <a:lnSpc>
-                <a:spcPct val="90000"/>
-              </a:lnSpc>
-              <a:spcBef>
-                <a:spcPts val="500"/>
-              </a:spcBef>
-              <a:buFont typeface="Arial" panose="020B0604020202020204" pitchFamily="34" charset="0"/>
-              <a:buChar char="•"/>
-              <a:defRPr sz="1800" kern="1200">
-                <a:solidFill>
-                  <a:schemeClr val="tx1"/>
-                </a:solidFill>
-                <a:latin typeface="+mn-lt"/>
-                <a:ea typeface="+mn-ea"/>
-                <a:cs typeface="+mn-cs"/>
-              </a:defRPr>
-            </a:lvl5pPr>
-            <a:lvl6pPr marL="2514600" indent="-228600" algn="l" defTabSz="914400" rtl="0" eaLnBrk="1" latinLnBrk="0" hangingPunct="1">
-              <a:lnSpc>
-                <a:spcPct val="90000"/>
-              </a:lnSpc>
-              <a:spcBef>
-                <a:spcPts val="500"/>
-              </a:spcBef>
-              <a:buFont typeface="Arial" panose="020B0604020202020204" pitchFamily="34" charset="0"/>
-              <a:buChar char="•"/>
-              <a:defRPr sz="1800" kern="1200">
-                <a:solidFill>
-                  <a:schemeClr val="tx1"/>
-                </a:solidFill>
-                <a:latin typeface="+mn-lt"/>
-                <a:ea typeface="+mn-ea"/>
-                <a:cs typeface="+mn-cs"/>
-              </a:defRPr>
-            </a:lvl6pPr>
-            <a:lvl7pPr marL="2971800" indent="-228600" algn="l" defTabSz="914400" rtl="0" eaLnBrk="1" latinLnBrk="0" hangingPunct="1">
-              <a:lnSpc>
-                <a:spcPct val="90000"/>
-              </a:lnSpc>
-              <a:spcBef>
-                <a:spcPts val="500"/>
-              </a:spcBef>
-              <a:buFont typeface="Arial" panose="020B0604020202020204" pitchFamily="34" charset="0"/>
-              <a:buChar char="•"/>
-              <a:defRPr sz="1800" kern="1200">
-                <a:solidFill>
-                  <a:schemeClr val="tx1"/>
-                </a:solidFill>
-                <a:latin typeface="+mn-lt"/>
-                <a:ea typeface="+mn-ea"/>
-                <a:cs typeface="+mn-cs"/>
-              </a:defRPr>
-            </a:lvl7pPr>
-            <a:lvl8pPr marL="3429000" indent="-228600" algn="l" defTabSz="914400" rtl="0" eaLnBrk="1" latinLnBrk="0" hangingPunct="1">
-              <a:lnSpc>
-                <a:spcPct val="90000"/>
-              </a:lnSpc>
-              <a:spcBef>
-                <a:spcPts val="500"/>
-              </a:spcBef>
-              <a:buFont typeface="Arial" panose="020B0604020202020204" pitchFamily="34" charset="0"/>
-              <a:buChar char="•"/>
-              <a:defRPr sz="1800" kern="1200">
-                <a:solidFill>
-                  <a:schemeClr val="tx1"/>
-                </a:solidFill>
-                <a:latin typeface="+mn-lt"/>
-                <a:ea typeface="+mn-ea"/>
-                <a:cs typeface="+mn-cs"/>
-              </a:defRPr>
-            </a:lvl8pPr>
-            <a:lvl9pPr marL="3886200" indent="-228600" algn="l" defTabSz="914400" rtl="0" eaLnBrk="1" latinLnBrk="0" hangingPunct="1">
-              <a:lnSpc>
-                <a:spcPct val="90000"/>
-              </a:lnSpc>
-              <a:spcBef>
-                <a:spcPts val="500"/>
-              </a:spcBef>
-              <a:buFont typeface="Arial" panose="020B0604020202020204" pitchFamily="34" charset="0"/>
-              <a:buChar char="•"/>
-              <a:defRPr sz="1800" kern="1200">
-                <a:solidFill>
-                  <a:schemeClr val="tx1"/>
-                </a:solidFill>
-                <a:latin typeface="+mn-lt"/>
-                <a:ea typeface="+mn-ea"/>
-                <a:cs typeface="+mn-cs"/>
-              </a:defRPr>
-            </a:lvl9pPr>
-          </a:lstStyle>
-          <a:p>
-            <a:pPr marL="0" indent="0">
-              <a:buNone/>
-            </a:pPr>
-            <a:r>
-              <a:rPr lang="fr-FR" dirty="0" smtClean="0">
+          <a:lstStyle/>
+          <a:p>
+            <a:r>
+              <a:rPr lang="fr-FR" i="1" dirty="0" smtClean="0">
                 <a:solidFill>
                   <a:schemeClr val="bg1"/>
                 </a:solidFill>
               </a:rPr>
-              <a:t>T</a:t>
-            </a:r>
-            <a:r>
-              <a:rPr lang="fr-FR" dirty="0" smtClean="0">
-                <a:solidFill>
-                  <a:schemeClr val="bg1"/>
-                </a:solidFill>
-              </a:rPr>
-              <a:t>rain </a:t>
-            </a:r>
-            <a:r>
-              <a:rPr lang="fr-FR" dirty="0" smtClean="0">
-                <a:solidFill>
-                  <a:schemeClr val="bg1"/>
-                </a:solidFill>
-              </a:rPr>
-              <a:t>75%</a:t>
-            </a:r>
-            <a:endParaRPr lang="fr-FR" dirty="0">
+              <a:t>Résultat : il n’y a plus les crochets []</a:t>
+            </a:r>
+            <a:endParaRPr lang="fr-FR" i="1" dirty="0">
               <a:solidFill>
                 <a:schemeClr val="bg1"/>
               </a:solidFill>
@@ -5768,292 +5863,40 @@
           </a:p>
         </p:txBody>
       </p:sp>
-      <p:sp>
-        <p:nvSpPr>
-          <p:cNvPr id="3" name="Rectangle 2"/>
-          <p:cNvSpPr/>
-          <p:nvPr/>
-        </p:nvSpPr>
-        <p:spPr>
-          <a:xfrm>
-            <a:off x="2742072" y="1868558"/>
-            <a:ext cx="6867728" cy="958704"/>
-          </a:xfrm>
-          <a:prstGeom prst="rect">
-            <a:avLst/>
-          </a:prstGeom>
-          <a:solidFill>
-            <a:srgbClr val="42AFB6"/>
-          </a:solidFill>
-          <a:ln>
-            <a:solidFill>
-              <a:srgbClr val="42AFB6"/>
-            </a:solidFill>
-          </a:ln>
-        </p:spPr>
-        <p:style>
-          <a:lnRef idx="2">
-            <a:schemeClr val="accent1">
-              <a:shade val="50000"/>
-            </a:schemeClr>
-          </a:lnRef>
-          <a:fillRef idx="1">
-            <a:schemeClr val="accent1"/>
-          </a:fillRef>
-          <a:effectRef idx="0">
-            <a:schemeClr val="accent1"/>
-          </a:effectRef>
-          <a:fontRef idx="minor">
-            <a:schemeClr val="lt1"/>
-          </a:fontRef>
-        </p:style>
-        <p:txBody>
-          <a:bodyPr rtlCol="0" anchor="ctr"/>
-          <a:lstStyle/>
-          <a:p>
-            <a:pPr algn="ctr"/>
-            <a:endParaRPr lang="fr-FR"/>
-          </a:p>
-        </p:txBody>
-      </p:sp>
-      <p:sp>
-        <p:nvSpPr>
-          <p:cNvPr id="10" name="Sous-titre 2"/>
-          <p:cNvSpPr txBox="1">
-            <a:spLocks/>
-          </p:cNvSpPr>
-          <p:nvPr/>
-        </p:nvSpPr>
-        <p:spPr>
-          <a:xfrm>
-            <a:off x="4918627" y="2078099"/>
-            <a:ext cx="2503973" cy="619398"/>
-          </a:xfrm>
-          <a:prstGeom prst="rect">
-            <a:avLst/>
-          </a:prstGeom>
-        </p:spPr>
-        <p:txBody>
-          <a:bodyPr vert="horz" lIns="91440" tIns="45720" rIns="91440" bIns="45720" rtlCol="0">
-            <a:normAutofit fontScale="92500"/>
-          </a:bodyPr>
-          <a:lstStyle>
-            <a:lvl1pPr marL="228600" indent="-228600" algn="l" defTabSz="914400" rtl="0" eaLnBrk="1" latinLnBrk="0" hangingPunct="1">
-              <a:lnSpc>
-                <a:spcPct val="90000"/>
-              </a:lnSpc>
-              <a:spcBef>
-                <a:spcPts val="1000"/>
-              </a:spcBef>
-              <a:buFont typeface="Arial" panose="020B0604020202020204" pitchFamily="34" charset="0"/>
-              <a:buChar char="•"/>
-              <a:defRPr sz="2800" kern="1200">
-                <a:solidFill>
-                  <a:schemeClr val="tx1"/>
-                </a:solidFill>
-                <a:latin typeface="+mn-lt"/>
-                <a:ea typeface="+mn-ea"/>
-                <a:cs typeface="+mn-cs"/>
-              </a:defRPr>
-            </a:lvl1pPr>
-            <a:lvl2pPr marL="685800" indent="-228600" algn="l" defTabSz="914400" rtl="0" eaLnBrk="1" latinLnBrk="0" hangingPunct="1">
-              <a:lnSpc>
-                <a:spcPct val="90000"/>
-              </a:lnSpc>
-              <a:spcBef>
-                <a:spcPts val="500"/>
-              </a:spcBef>
-              <a:buFont typeface="Arial" panose="020B0604020202020204" pitchFamily="34" charset="0"/>
-              <a:buChar char="•"/>
-              <a:defRPr sz="2400" kern="1200">
-                <a:solidFill>
-                  <a:schemeClr val="tx1"/>
-                </a:solidFill>
-                <a:latin typeface="+mn-lt"/>
-                <a:ea typeface="+mn-ea"/>
-                <a:cs typeface="+mn-cs"/>
-              </a:defRPr>
-            </a:lvl2pPr>
-            <a:lvl3pPr marL="1143000" indent="-228600" algn="l" defTabSz="914400" rtl="0" eaLnBrk="1" latinLnBrk="0" hangingPunct="1">
-              <a:lnSpc>
-                <a:spcPct val="90000"/>
-              </a:lnSpc>
-              <a:spcBef>
-                <a:spcPts val="500"/>
-              </a:spcBef>
-              <a:buFont typeface="Arial" panose="020B0604020202020204" pitchFamily="34" charset="0"/>
-              <a:buChar char="•"/>
-              <a:defRPr sz="2000" kern="1200">
-                <a:solidFill>
-                  <a:schemeClr val="tx1"/>
-                </a:solidFill>
-                <a:latin typeface="+mn-lt"/>
-                <a:ea typeface="+mn-ea"/>
-                <a:cs typeface="+mn-cs"/>
-              </a:defRPr>
-            </a:lvl3pPr>
-            <a:lvl4pPr marL="1600200" indent="-228600" algn="l" defTabSz="914400" rtl="0" eaLnBrk="1" latinLnBrk="0" hangingPunct="1">
-              <a:lnSpc>
-                <a:spcPct val="90000"/>
-              </a:lnSpc>
-              <a:spcBef>
-                <a:spcPts val="500"/>
-              </a:spcBef>
-              <a:buFont typeface="Arial" panose="020B0604020202020204" pitchFamily="34" charset="0"/>
-              <a:buChar char="•"/>
-              <a:defRPr sz="1800" kern="1200">
-                <a:solidFill>
-                  <a:schemeClr val="tx1"/>
-                </a:solidFill>
-                <a:latin typeface="+mn-lt"/>
-                <a:ea typeface="+mn-ea"/>
-                <a:cs typeface="+mn-cs"/>
-              </a:defRPr>
-            </a:lvl4pPr>
-            <a:lvl5pPr marL="2057400" indent="-228600" algn="l" defTabSz="914400" rtl="0" eaLnBrk="1" latinLnBrk="0" hangingPunct="1">
-              <a:lnSpc>
-                <a:spcPct val="90000"/>
-              </a:lnSpc>
-              <a:spcBef>
-                <a:spcPts val="500"/>
-              </a:spcBef>
-              <a:buFont typeface="Arial" panose="020B0604020202020204" pitchFamily="34" charset="0"/>
-              <a:buChar char="•"/>
-              <a:defRPr sz="1800" kern="1200">
-                <a:solidFill>
-                  <a:schemeClr val="tx1"/>
-                </a:solidFill>
-                <a:latin typeface="+mn-lt"/>
-                <a:ea typeface="+mn-ea"/>
-                <a:cs typeface="+mn-cs"/>
-              </a:defRPr>
-            </a:lvl5pPr>
-            <a:lvl6pPr marL="2514600" indent="-228600" algn="l" defTabSz="914400" rtl="0" eaLnBrk="1" latinLnBrk="0" hangingPunct="1">
-              <a:lnSpc>
-                <a:spcPct val="90000"/>
-              </a:lnSpc>
-              <a:spcBef>
-                <a:spcPts val="500"/>
-              </a:spcBef>
-              <a:buFont typeface="Arial" panose="020B0604020202020204" pitchFamily="34" charset="0"/>
-              <a:buChar char="•"/>
-              <a:defRPr sz="1800" kern="1200">
-                <a:solidFill>
-                  <a:schemeClr val="tx1"/>
-                </a:solidFill>
-                <a:latin typeface="+mn-lt"/>
-                <a:ea typeface="+mn-ea"/>
-                <a:cs typeface="+mn-cs"/>
-              </a:defRPr>
-            </a:lvl6pPr>
-            <a:lvl7pPr marL="2971800" indent="-228600" algn="l" defTabSz="914400" rtl="0" eaLnBrk="1" latinLnBrk="0" hangingPunct="1">
-              <a:lnSpc>
-                <a:spcPct val="90000"/>
-              </a:lnSpc>
-              <a:spcBef>
-                <a:spcPts val="500"/>
-              </a:spcBef>
-              <a:buFont typeface="Arial" panose="020B0604020202020204" pitchFamily="34" charset="0"/>
-              <a:buChar char="•"/>
-              <a:defRPr sz="1800" kern="1200">
-                <a:solidFill>
-                  <a:schemeClr val="tx1"/>
-                </a:solidFill>
-                <a:latin typeface="+mn-lt"/>
-                <a:ea typeface="+mn-ea"/>
-                <a:cs typeface="+mn-cs"/>
-              </a:defRPr>
-            </a:lvl7pPr>
-            <a:lvl8pPr marL="3429000" indent="-228600" algn="l" defTabSz="914400" rtl="0" eaLnBrk="1" latinLnBrk="0" hangingPunct="1">
-              <a:lnSpc>
-                <a:spcPct val="90000"/>
-              </a:lnSpc>
-              <a:spcBef>
-                <a:spcPts val="500"/>
-              </a:spcBef>
-              <a:buFont typeface="Arial" panose="020B0604020202020204" pitchFamily="34" charset="0"/>
-              <a:buChar char="•"/>
-              <a:defRPr sz="1800" kern="1200">
-                <a:solidFill>
-                  <a:schemeClr val="tx1"/>
-                </a:solidFill>
-                <a:latin typeface="+mn-lt"/>
-                <a:ea typeface="+mn-ea"/>
-                <a:cs typeface="+mn-cs"/>
-              </a:defRPr>
-            </a:lvl8pPr>
-            <a:lvl9pPr marL="3886200" indent="-228600" algn="l" defTabSz="914400" rtl="0" eaLnBrk="1" latinLnBrk="0" hangingPunct="1">
-              <a:lnSpc>
-                <a:spcPct val="90000"/>
-              </a:lnSpc>
-              <a:spcBef>
-                <a:spcPts val="500"/>
-              </a:spcBef>
-              <a:buFont typeface="Arial" panose="020B0604020202020204" pitchFamily="34" charset="0"/>
-              <a:buChar char="•"/>
-              <a:defRPr sz="1800" kern="1200">
-                <a:solidFill>
-                  <a:schemeClr val="tx1"/>
-                </a:solidFill>
-                <a:latin typeface="+mn-lt"/>
-                <a:ea typeface="+mn-ea"/>
-                <a:cs typeface="+mn-cs"/>
-              </a:defRPr>
-            </a:lvl9pPr>
-          </a:lstStyle>
-          <a:p>
-            <a:pPr marL="0" indent="0">
-              <a:buNone/>
-            </a:pPr>
-            <a:r>
-              <a:rPr lang="fr-FR" dirty="0" smtClean="0">
-                <a:solidFill>
-                  <a:schemeClr val="bg1"/>
-                </a:solidFill>
-              </a:rPr>
-              <a:t>Base de données</a:t>
-            </a:r>
-            <a:endParaRPr lang="fr-FR" dirty="0">
-              <a:solidFill>
-                <a:schemeClr val="bg1"/>
-              </a:solidFill>
-            </a:endParaRPr>
-          </a:p>
-        </p:txBody>
-      </p:sp>
       <p:pic>
         <p:nvPicPr>
-          <p:cNvPr id="13" name="Image 12"/>
-          <p:cNvPicPr/>
+          <p:cNvPr id="12" name="Image 11"/>
+          <p:cNvPicPr>
+            <a:picLocks noChangeAspect="1"/>
+          </p:cNvPicPr>
           <p:nvPr/>
         </p:nvPicPr>
-        <p:blipFill rotWithShape="1">
-          <a:blip r:embed="rId3"/>
-          <a:srcRect b="61489"/>
-          <a:stretch/>
+        <p:blipFill>
+          <a:blip r:embed="rId4" cstate="print">
+            <a:extLst>
+              <a:ext uri="{28A0092B-C50C-407E-A947-70E740481C1C}">
+                <a14:useLocalDpi xmlns:a14="http://schemas.microsoft.com/office/drawing/2010/main" val="0"/>
+              </a:ext>
+            </a:extLst>
+          </a:blip>
+          <a:stretch>
+            <a:fillRect/>
+          </a:stretch>
         </p:blipFill>
-        <p:spPr bwMode="auto">
-          <a:xfrm>
-            <a:off x="2781928" y="4695820"/>
-            <a:ext cx="6827871" cy="1172244"/>
-          </a:xfrm>
-          <a:prstGeom prst="rect">
-            <a:avLst/>
-          </a:prstGeom>
-          <a:ln>
-            <a:noFill/>
-          </a:ln>
-          <a:extLst>
-            <a:ext uri="{53640926-AAD7-44D8-BBD7-CCE9431645EC}">
-              <a14:shadowObscured xmlns:a14="http://schemas.microsoft.com/office/drawing/2010/main"/>
-            </a:ext>
-          </a:extLst>
+        <p:spPr>
+          <a:xfrm>
+            <a:off x="8450209" y="4996951"/>
+            <a:ext cx="924379" cy="759970"/>
+          </a:xfrm>
+          <a:prstGeom prst="rect">
+            <a:avLst/>
+          </a:prstGeom>
         </p:spPr>
       </p:pic>
     </p:spTree>
     <p:extLst>
       <p:ext uri="{BB962C8B-B14F-4D97-AF65-F5344CB8AC3E}">
-        <p14:creationId xmlns:p14="http://schemas.microsoft.com/office/powerpoint/2010/main" val="2852168877"/>
+        <p14:creationId xmlns:p14="http://schemas.microsoft.com/office/powerpoint/2010/main" val="610501707"/>
       </p:ext>
     </p:extLst>
   </p:cSld>
@@ -6089,7 +5932,7 @@
       </p:grpSpPr>
       <p:pic>
         <p:nvPicPr>
-          <p:cNvPr id="7" name="Image 6"/>
+          <p:cNvPr id="6" name="Image 5"/>
           <p:cNvPicPr>
             <a:picLocks noChangeAspect="1"/>
           </p:cNvPicPr>
@@ -6113,212 +5956,24 @@
       </p:pic>
       <p:sp>
         <p:nvSpPr>
-          <p:cNvPr id="5" name="ZoneTexte 4"/>
-          <p:cNvSpPr txBox="1"/>
-          <p:nvPr/>
-        </p:nvSpPr>
-        <p:spPr>
-          <a:xfrm>
-            <a:off x="723569" y="588397"/>
-            <a:ext cx="7545788" cy="584775"/>
-          </a:xfrm>
-          <a:prstGeom prst="rect">
-            <a:avLst/>
-          </a:prstGeom>
-          <a:noFill/>
-        </p:spPr>
-        <p:txBody>
-          <a:bodyPr wrap="square" rtlCol="0">
-            <a:spAutoFit/>
-          </a:bodyPr>
-          <a:lstStyle/>
-          <a:p>
-            <a:r>
-              <a:rPr lang="fr-FR" sz="3200" dirty="0" smtClean="0">
-                <a:solidFill>
-                  <a:schemeClr val="bg1"/>
-                </a:solidFill>
-              </a:rPr>
-              <a:t>APLICATION DES MODELES AUX DONNEES</a:t>
-            </a:r>
-            <a:endParaRPr lang="fr-FR" sz="3200" dirty="0">
-              <a:solidFill>
-                <a:schemeClr val="bg1"/>
-              </a:solidFill>
-            </a:endParaRPr>
-          </a:p>
-        </p:txBody>
-      </p:sp>
-      <p:sp>
-        <p:nvSpPr>
-          <p:cNvPr id="6" name="ZoneTexte 5"/>
-          <p:cNvSpPr txBox="1"/>
-          <p:nvPr/>
-        </p:nvSpPr>
-        <p:spPr>
-          <a:xfrm>
-            <a:off x="723569" y="1173172"/>
-            <a:ext cx="7545788" cy="400110"/>
-          </a:xfrm>
-          <a:prstGeom prst="rect">
-            <a:avLst/>
-          </a:prstGeom>
-          <a:noFill/>
-        </p:spPr>
-        <p:txBody>
-          <a:bodyPr wrap="square" rtlCol="0">
-            <a:spAutoFit/>
-          </a:bodyPr>
-          <a:lstStyle/>
-          <a:p>
-            <a:r>
-              <a:rPr lang="fr-FR" sz="2000" dirty="0" smtClean="0">
-                <a:solidFill>
-                  <a:schemeClr val="bg1"/>
-                </a:solidFill>
-              </a:rPr>
-              <a:t>1 – Classification avec les plus proches voisins</a:t>
-            </a:r>
-            <a:endParaRPr lang="fr-FR" sz="2000" dirty="0">
-              <a:solidFill>
-                <a:schemeClr val="bg1"/>
-              </a:solidFill>
-            </a:endParaRPr>
-          </a:p>
-        </p:txBody>
-      </p:sp>
-      <p:pic>
-        <p:nvPicPr>
-          <p:cNvPr id="8" name="Image 7"/>
-          <p:cNvPicPr/>
-          <p:nvPr/>
-        </p:nvPicPr>
-        <p:blipFill rotWithShape="1">
-          <a:blip r:embed="rId3">
-            <a:extLst>
-              <a:ext uri="{28A0092B-C50C-407E-A947-70E740481C1C}">
-                <a14:useLocalDpi xmlns:a14="http://schemas.microsoft.com/office/drawing/2010/main" val="0"/>
-              </a:ext>
-            </a:extLst>
-          </a:blip>
-          <a:srcRect l="1047" t="5181" r="6348" b="3945"/>
-          <a:stretch/>
-        </p:blipFill>
-        <p:spPr bwMode="auto">
-          <a:xfrm>
-            <a:off x="723569" y="2689197"/>
-            <a:ext cx="6416702" cy="2073634"/>
-          </a:xfrm>
-          <a:prstGeom prst="rect">
-            <a:avLst/>
-          </a:prstGeom>
-          <a:noFill/>
-          <a:ln>
-            <a:noFill/>
-          </a:ln>
-          <a:extLst>
-            <a:ext uri="{53640926-AAD7-44D8-BBD7-CCE9431645EC}">
-              <a14:shadowObscured xmlns:a14="http://schemas.microsoft.com/office/drawing/2010/main"/>
-            </a:ext>
-          </a:extLst>
-        </p:spPr>
-      </p:pic>
-      <p:sp>
-        <p:nvSpPr>
-          <p:cNvPr id="9" name="ZoneTexte 8"/>
-          <p:cNvSpPr txBox="1"/>
-          <p:nvPr/>
-        </p:nvSpPr>
-        <p:spPr>
-          <a:xfrm>
-            <a:off x="7991061" y="3130518"/>
-            <a:ext cx="3625795" cy="400110"/>
-          </a:xfrm>
-          <a:prstGeom prst="rect">
-            <a:avLst/>
-          </a:prstGeom>
-          <a:noFill/>
-        </p:spPr>
-        <p:txBody>
-          <a:bodyPr wrap="square" rtlCol="0">
-            <a:spAutoFit/>
-          </a:bodyPr>
-          <a:lstStyle/>
-          <a:p>
-            <a:r>
-              <a:rPr lang="fr-FR" sz="2000" dirty="0" smtClean="0">
-                <a:solidFill>
-                  <a:schemeClr val="bg1"/>
-                </a:solidFill>
-              </a:rPr>
-              <a:t>Temps d’exécution = 8heures</a:t>
-            </a:r>
-            <a:endParaRPr lang="fr-FR" sz="2000" dirty="0">
-              <a:solidFill>
-                <a:schemeClr val="bg1"/>
-              </a:solidFill>
-            </a:endParaRPr>
-          </a:p>
-        </p:txBody>
-      </p:sp>
-      <p:sp>
-        <p:nvSpPr>
-          <p:cNvPr id="10" name="ZoneTexte 9"/>
-          <p:cNvSpPr txBox="1"/>
-          <p:nvPr/>
-        </p:nvSpPr>
-        <p:spPr>
-          <a:xfrm>
-            <a:off x="7991061" y="4103635"/>
-            <a:ext cx="3625795" cy="400110"/>
-          </a:xfrm>
-          <a:prstGeom prst="rect">
-            <a:avLst/>
-          </a:prstGeom>
-          <a:noFill/>
-        </p:spPr>
-        <p:txBody>
-          <a:bodyPr wrap="square" rtlCol="0">
-            <a:spAutoFit/>
-          </a:bodyPr>
-          <a:lstStyle/>
-          <a:p>
-            <a:r>
-              <a:rPr lang="fr-FR" sz="2000" dirty="0" smtClean="0">
-                <a:solidFill>
-                  <a:schemeClr val="bg1"/>
-                </a:solidFill>
-              </a:rPr>
-              <a:t>Précision = 79.5%</a:t>
-            </a:r>
-            <a:endParaRPr lang="fr-FR" sz="2000" dirty="0">
-              <a:solidFill>
-                <a:schemeClr val="bg1"/>
-              </a:solidFill>
-            </a:endParaRPr>
-          </a:p>
-        </p:txBody>
-      </p:sp>
-      <p:sp>
-        <p:nvSpPr>
-          <p:cNvPr id="11" name="Ellipse 10"/>
+          <p:cNvPr id="12" name="Rectangle 11"/>
           <p:cNvSpPr/>
           <p:nvPr/>
         </p:nvSpPr>
         <p:spPr>
           <a:xfrm>
-            <a:off x="7649155" y="3275937"/>
-            <a:ext cx="108000" cy="108000"/>
-          </a:xfrm>
-          <a:prstGeom prst="ellipse">
+            <a:off x="7617350" y="2988900"/>
+            <a:ext cx="1980530" cy="958704"/>
+          </a:xfrm>
+          <a:prstGeom prst="rect">
             <a:avLst/>
           </a:prstGeom>
           <a:solidFill>
-            <a:srgbClr val="C2C923"/>
+            <a:srgbClr val="CB1B4A"/>
           </a:solidFill>
           <a:ln>
             <a:solidFill>
-              <a:srgbClr val="C2C923"/>
+              <a:srgbClr val="CB1B4A"/>
             </a:solidFill>
           </a:ln>
         </p:spPr>
@@ -6349,24 +6004,24 @@
       </p:sp>
       <p:sp>
         <p:nvSpPr>
-          <p:cNvPr id="12" name="Ellipse 11"/>
+          <p:cNvPr id="11" name="Rectangle 10"/>
           <p:cNvSpPr/>
           <p:nvPr/>
         </p:nvSpPr>
         <p:spPr>
           <a:xfrm>
-            <a:off x="7649155" y="4249690"/>
-            <a:ext cx="108000" cy="108000"/>
-          </a:xfrm>
-          <a:prstGeom prst="ellipse">
+            <a:off x="2750364" y="2988900"/>
+            <a:ext cx="4878885" cy="958704"/>
+          </a:xfrm>
+          <a:prstGeom prst="rect">
             <a:avLst/>
           </a:prstGeom>
           <a:solidFill>
-            <a:srgbClr val="CB1B4A"/>
+            <a:srgbClr val="C2C923"/>
           </a:solidFill>
           <a:ln>
             <a:solidFill>
-              <a:srgbClr val="CB1B4A"/>
+              <a:srgbClr val="C2C923"/>
             </a:solidFill>
           </a:ln>
         </p:spPr>
@@ -6395,10 +6050,740 @@
           </a:p>
         </p:txBody>
       </p:sp>
+      <p:sp>
+        <p:nvSpPr>
+          <p:cNvPr id="4" name="ZoneTexte 3"/>
+          <p:cNvSpPr txBox="1"/>
+          <p:nvPr/>
+        </p:nvSpPr>
+        <p:spPr>
+          <a:xfrm>
+            <a:off x="723569" y="588397"/>
+            <a:ext cx="7545788" cy="584775"/>
+          </a:xfrm>
+          <a:prstGeom prst="rect">
+            <a:avLst/>
+          </a:prstGeom>
+          <a:noFill/>
+        </p:spPr>
+        <p:txBody>
+          <a:bodyPr wrap="square" rtlCol="0">
+            <a:spAutoFit/>
+          </a:bodyPr>
+          <a:lstStyle/>
+          <a:p>
+            <a:r>
+              <a:rPr lang="fr-FR" sz="3200" dirty="0" smtClean="0">
+                <a:solidFill>
+                  <a:schemeClr val="bg1"/>
+                </a:solidFill>
+              </a:rPr>
+              <a:t>PREPARATION A L’APPLICATION</a:t>
+            </a:r>
+            <a:endParaRPr lang="fr-FR" sz="3200" dirty="0">
+              <a:solidFill>
+                <a:schemeClr val="bg1"/>
+              </a:solidFill>
+            </a:endParaRPr>
+          </a:p>
+        </p:txBody>
+      </p:sp>
+      <p:sp>
+        <p:nvSpPr>
+          <p:cNvPr id="9" name="Sous-titre 2"/>
+          <p:cNvSpPr txBox="1">
+            <a:spLocks/>
+          </p:cNvSpPr>
+          <p:nvPr/>
+        </p:nvSpPr>
+        <p:spPr>
+          <a:xfrm>
+            <a:off x="7885778" y="3179703"/>
+            <a:ext cx="1711446" cy="659003"/>
+          </a:xfrm>
+          <a:prstGeom prst="rect">
+            <a:avLst/>
+          </a:prstGeom>
+        </p:spPr>
+        <p:txBody>
+          <a:bodyPr vert="horz" lIns="91440" tIns="45720" rIns="91440" bIns="45720" rtlCol="0">
+            <a:normAutofit/>
+          </a:bodyPr>
+          <a:lstStyle>
+            <a:lvl1pPr marL="228600" indent="-228600" algn="l" defTabSz="914400" rtl="0" eaLnBrk="1" latinLnBrk="0" hangingPunct="1">
+              <a:lnSpc>
+                <a:spcPct val="90000"/>
+              </a:lnSpc>
+              <a:spcBef>
+                <a:spcPts val="1000"/>
+              </a:spcBef>
+              <a:buFont typeface="Arial" panose="020B0604020202020204" pitchFamily="34" charset="0"/>
+              <a:buChar char="•"/>
+              <a:defRPr sz="2800" kern="1200">
+                <a:solidFill>
+                  <a:schemeClr val="tx1"/>
+                </a:solidFill>
+                <a:latin typeface="+mn-lt"/>
+                <a:ea typeface="+mn-ea"/>
+                <a:cs typeface="+mn-cs"/>
+              </a:defRPr>
+            </a:lvl1pPr>
+            <a:lvl2pPr marL="685800" indent="-228600" algn="l" defTabSz="914400" rtl="0" eaLnBrk="1" latinLnBrk="0" hangingPunct="1">
+              <a:lnSpc>
+                <a:spcPct val="90000"/>
+              </a:lnSpc>
+              <a:spcBef>
+                <a:spcPts val="500"/>
+              </a:spcBef>
+              <a:buFont typeface="Arial" panose="020B0604020202020204" pitchFamily="34" charset="0"/>
+              <a:buChar char="•"/>
+              <a:defRPr sz="2400" kern="1200">
+                <a:solidFill>
+                  <a:schemeClr val="tx1"/>
+                </a:solidFill>
+                <a:latin typeface="+mn-lt"/>
+                <a:ea typeface="+mn-ea"/>
+                <a:cs typeface="+mn-cs"/>
+              </a:defRPr>
+            </a:lvl2pPr>
+            <a:lvl3pPr marL="1143000" indent="-228600" algn="l" defTabSz="914400" rtl="0" eaLnBrk="1" latinLnBrk="0" hangingPunct="1">
+              <a:lnSpc>
+                <a:spcPct val="90000"/>
+              </a:lnSpc>
+              <a:spcBef>
+                <a:spcPts val="500"/>
+              </a:spcBef>
+              <a:buFont typeface="Arial" panose="020B0604020202020204" pitchFamily="34" charset="0"/>
+              <a:buChar char="•"/>
+              <a:defRPr sz="2000" kern="1200">
+                <a:solidFill>
+                  <a:schemeClr val="tx1"/>
+                </a:solidFill>
+                <a:latin typeface="+mn-lt"/>
+                <a:ea typeface="+mn-ea"/>
+                <a:cs typeface="+mn-cs"/>
+              </a:defRPr>
+            </a:lvl3pPr>
+            <a:lvl4pPr marL="1600200" indent="-228600" algn="l" defTabSz="914400" rtl="0" eaLnBrk="1" latinLnBrk="0" hangingPunct="1">
+              <a:lnSpc>
+                <a:spcPct val="90000"/>
+              </a:lnSpc>
+              <a:spcBef>
+                <a:spcPts val="500"/>
+              </a:spcBef>
+              <a:buFont typeface="Arial" panose="020B0604020202020204" pitchFamily="34" charset="0"/>
+              <a:buChar char="•"/>
+              <a:defRPr sz="1800" kern="1200">
+                <a:solidFill>
+                  <a:schemeClr val="tx1"/>
+                </a:solidFill>
+                <a:latin typeface="+mn-lt"/>
+                <a:ea typeface="+mn-ea"/>
+                <a:cs typeface="+mn-cs"/>
+              </a:defRPr>
+            </a:lvl4pPr>
+            <a:lvl5pPr marL="2057400" indent="-228600" algn="l" defTabSz="914400" rtl="0" eaLnBrk="1" latinLnBrk="0" hangingPunct="1">
+              <a:lnSpc>
+                <a:spcPct val="90000"/>
+              </a:lnSpc>
+              <a:spcBef>
+                <a:spcPts val="500"/>
+              </a:spcBef>
+              <a:buFont typeface="Arial" panose="020B0604020202020204" pitchFamily="34" charset="0"/>
+              <a:buChar char="•"/>
+              <a:defRPr sz="1800" kern="1200">
+                <a:solidFill>
+                  <a:schemeClr val="tx1"/>
+                </a:solidFill>
+                <a:latin typeface="+mn-lt"/>
+                <a:ea typeface="+mn-ea"/>
+                <a:cs typeface="+mn-cs"/>
+              </a:defRPr>
+            </a:lvl5pPr>
+            <a:lvl6pPr marL="2514600" indent="-228600" algn="l" defTabSz="914400" rtl="0" eaLnBrk="1" latinLnBrk="0" hangingPunct="1">
+              <a:lnSpc>
+                <a:spcPct val="90000"/>
+              </a:lnSpc>
+              <a:spcBef>
+                <a:spcPts val="500"/>
+              </a:spcBef>
+              <a:buFont typeface="Arial" panose="020B0604020202020204" pitchFamily="34" charset="0"/>
+              <a:buChar char="•"/>
+              <a:defRPr sz="1800" kern="1200">
+                <a:solidFill>
+                  <a:schemeClr val="tx1"/>
+                </a:solidFill>
+                <a:latin typeface="+mn-lt"/>
+                <a:ea typeface="+mn-ea"/>
+                <a:cs typeface="+mn-cs"/>
+              </a:defRPr>
+            </a:lvl6pPr>
+            <a:lvl7pPr marL="2971800" indent="-228600" algn="l" defTabSz="914400" rtl="0" eaLnBrk="1" latinLnBrk="0" hangingPunct="1">
+              <a:lnSpc>
+                <a:spcPct val="90000"/>
+              </a:lnSpc>
+              <a:spcBef>
+                <a:spcPts val="500"/>
+              </a:spcBef>
+              <a:buFont typeface="Arial" panose="020B0604020202020204" pitchFamily="34" charset="0"/>
+              <a:buChar char="•"/>
+              <a:defRPr sz="1800" kern="1200">
+                <a:solidFill>
+                  <a:schemeClr val="tx1"/>
+                </a:solidFill>
+                <a:latin typeface="+mn-lt"/>
+                <a:ea typeface="+mn-ea"/>
+                <a:cs typeface="+mn-cs"/>
+              </a:defRPr>
+            </a:lvl7pPr>
+            <a:lvl8pPr marL="3429000" indent="-228600" algn="l" defTabSz="914400" rtl="0" eaLnBrk="1" latinLnBrk="0" hangingPunct="1">
+              <a:lnSpc>
+                <a:spcPct val="90000"/>
+              </a:lnSpc>
+              <a:spcBef>
+                <a:spcPts val="500"/>
+              </a:spcBef>
+              <a:buFont typeface="Arial" panose="020B0604020202020204" pitchFamily="34" charset="0"/>
+              <a:buChar char="•"/>
+              <a:defRPr sz="1800" kern="1200">
+                <a:solidFill>
+                  <a:schemeClr val="tx1"/>
+                </a:solidFill>
+                <a:latin typeface="+mn-lt"/>
+                <a:ea typeface="+mn-ea"/>
+                <a:cs typeface="+mn-cs"/>
+              </a:defRPr>
+            </a:lvl8pPr>
+            <a:lvl9pPr marL="3886200" indent="-228600" algn="l" defTabSz="914400" rtl="0" eaLnBrk="1" latinLnBrk="0" hangingPunct="1">
+              <a:lnSpc>
+                <a:spcPct val="90000"/>
+              </a:lnSpc>
+              <a:spcBef>
+                <a:spcPts val="500"/>
+              </a:spcBef>
+              <a:buFont typeface="Arial" panose="020B0604020202020204" pitchFamily="34" charset="0"/>
+              <a:buChar char="•"/>
+              <a:defRPr sz="1800" kern="1200">
+                <a:solidFill>
+                  <a:schemeClr val="tx1"/>
+                </a:solidFill>
+                <a:latin typeface="+mn-lt"/>
+                <a:ea typeface="+mn-ea"/>
+                <a:cs typeface="+mn-cs"/>
+              </a:defRPr>
+            </a:lvl9pPr>
+          </a:lstStyle>
+          <a:p>
+            <a:pPr marL="0" indent="0">
+              <a:buNone/>
+            </a:pPr>
+            <a:r>
+              <a:rPr lang="fr-FR" dirty="0" smtClean="0">
+                <a:solidFill>
+                  <a:schemeClr val="bg1"/>
+                </a:solidFill>
+              </a:rPr>
+              <a:t>Test 25%</a:t>
+            </a:r>
+            <a:endParaRPr lang="fr-FR" dirty="0">
+              <a:solidFill>
+                <a:schemeClr val="bg1"/>
+              </a:solidFill>
+            </a:endParaRPr>
+          </a:p>
+        </p:txBody>
+      </p:sp>
+      <p:sp>
+        <p:nvSpPr>
+          <p:cNvPr id="8" name="Sous-titre 2"/>
+          <p:cNvSpPr txBox="1">
+            <a:spLocks/>
+          </p:cNvSpPr>
+          <p:nvPr/>
+        </p:nvSpPr>
+        <p:spPr>
+          <a:xfrm>
+            <a:off x="4304701" y="3183220"/>
+            <a:ext cx="2459906" cy="490283"/>
+          </a:xfrm>
+          <a:prstGeom prst="rect">
+            <a:avLst/>
+          </a:prstGeom>
+        </p:spPr>
+        <p:txBody>
+          <a:bodyPr vert="horz" lIns="91440" tIns="45720" rIns="91440" bIns="45720" rtlCol="0">
+            <a:normAutofit/>
+          </a:bodyPr>
+          <a:lstStyle>
+            <a:lvl1pPr marL="228600" indent="-228600" algn="l" defTabSz="914400" rtl="0" eaLnBrk="1" latinLnBrk="0" hangingPunct="1">
+              <a:lnSpc>
+                <a:spcPct val="90000"/>
+              </a:lnSpc>
+              <a:spcBef>
+                <a:spcPts val="1000"/>
+              </a:spcBef>
+              <a:buFont typeface="Arial" panose="020B0604020202020204" pitchFamily="34" charset="0"/>
+              <a:buChar char="•"/>
+              <a:defRPr sz="2800" kern="1200">
+                <a:solidFill>
+                  <a:schemeClr val="tx1"/>
+                </a:solidFill>
+                <a:latin typeface="+mn-lt"/>
+                <a:ea typeface="+mn-ea"/>
+                <a:cs typeface="+mn-cs"/>
+              </a:defRPr>
+            </a:lvl1pPr>
+            <a:lvl2pPr marL="685800" indent="-228600" algn="l" defTabSz="914400" rtl="0" eaLnBrk="1" latinLnBrk="0" hangingPunct="1">
+              <a:lnSpc>
+                <a:spcPct val="90000"/>
+              </a:lnSpc>
+              <a:spcBef>
+                <a:spcPts val="500"/>
+              </a:spcBef>
+              <a:buFont typeface="Arial" panose="020B0604020202020204" pitchFamily="34" charset="0"/>
+              <a:buChar char="•"/>
+              <a:defRPr sz="2400" kern="1200">
+                <a:solidFill>
+                  <a:schemeClr val="tx1"/>
+                </a:solidFill>
+                <a:latin typeface="+mn-lt"/>
+                <a:ea typeface="+mn-ea"/>
+                <a:cs typeface="+mn-cs"/>
+              </a:defRPr>
+            </a:lvl2pPr>
+            <a:lvl3pPr marL="1143000" indent="-228600" algn="l" defTabSz="914400" rtl="0" eaLnBrk="1" latinLnBrk="0" hangingPunct="1">
+              <a:lnSpc>
+                <a:spcPct val="90000"/>
+              </a:lnSpc>
+              <a:spcBef>
+                <a:spcPts val="500"/>
+              </a:spcBef>
+              <a:buFont typeface="Arial" panose="020B0604020202020204" pitchFamily="34" charset="0"/>
+              <a:buChar char="•"/>
+              <a:defRPr sz="2000" kern="1200">
+                <a:solidFill>
+                  <a:schemeClr val="tx1"/>
+                </a:solidFill>
+                <a:latin typeface="+mn-lt"/>
+                <a:ea typeface="+mn-ea"/>
+                <a:cs typeface="+mn-cs"/>
+              </a:defRPr>
+            </a:lvl3pPr>
+            <a:lvl4pPr marL="1600200" indent="-228600" algn="l" defTabSz="914400" rtl="0" eaLnBrk="1" latinLnBrk="0" hangingPunct="1">
+              <a:lnSpc>
+                <a:spcPct val="90000"/>
+              </a:lnSpc>
+              <a:spcBef>
+                <a:spcPts val="500"/>
+              </a:spcBef>
+              <a:buFont typeface="Arial" panose="020B0604020202020204" pitchFamily="34" charset="0"/>
+              <a:buChar char="•"/>
+              <a:defRPr sz="1800" kern="1200">
+                <a:solidFill>
+                  <a:schemeClr val="tx1"/>
+                </a:solidFill>
+                <a:latin typeface="+mn-lt"/>
+                <a:ea typeface="+mn-ea"/>
+                <a:cs typeface="+mn-cs"/>
+              </a:defRPr>
+            </a:lvl4pPr>
+            <a:lvl5pPr marL="2057400" indent="-228600" algn="l" defTabSz="914400" rtl="0" eaLnBrk="1" latinLnBrk="0" hangingPunct="1">
+              <a:lnSpc>
+                <a:spcPct val="90000"/>
+              </a:lnSpc>
+              <a:spcBef>
+                <a:spcPts val="500"/>
+              </a:spcBef>
+              <a:buFont typeface="Arial" panose="020B0604020202020204" pitchFamily="34" charset="0"/>
+              <a:buChar char="•"/>
+              <a:defRPr sz="1800" kern="1200">
+                <a:solidFill>
+                  <a:schemeClr val="tx1"/>
+                </a:solidFill>
+                <a:latin typeface="+mn-lt"/>
+                <a:ea typeface="+mn-ea"/>
+                <a:cs typeface="+mn-cs"/>
+              </a:defRPr>
+            </a:lvl5pPr>
+            <a:lvl6pPr marL="2514600" indent="-228600" algn="l" defTabSz="914400" rtl="0" eaLnBrk="1" latinLnBrk="0" hangingPunct="1">
+              <a:lnSpc>
+                <a:spcPct val="90000"/>
+              </a:lnSpc>
+              <a:spcBef>
+                <a:spcPts val="500"/>
+              </a:spcBef>
+              <a:buFont typeface="Arial" panose="020B0604020202020204" pitchFamily="34" charset="0"/>
+              <a:buChar char="•"/>
+              <a:defRPr sz="1800" kern="1200">
+                <a:solidFill>
+                  <a:schemeClr val="tx1"/>
+                </a:solidFill>
+                <a:latin typeface="+mn-lt"/>
+                <a:ea typeface="+mn-ea"/>
+                <a:cs typeface="+mn-cs"/>
+              </a:defRPr>
+            </a:lvl6pPr>
+            <a:lvl7pPr marL="2971800" indent="-228600" algn="l" defTabSz="914400" rtl="0" eaLnBrk="1" latinLnBrk="0" hangingPunct="1">
+              <a:lnSpc>
+                <a:spcPct val="90000"/>
+              </a:lnSpc>
+              <a:spcBef>
+                <a:spcPts val="500"/>
+              </a:spcBef>
+              <a:buFont typeface="Arial" panose="020B0604020202020204" pitchFamily="34" charset="0"/>
+              <a:buChar char="•"/>
+              <a:defRPr sz="1800" kern="1200">
+                <a:solidFill>
+                  <a:schemeClr val="tx1"/>
+                </a:solidFill>
+                <a:latin typeface="+mn-lt"/>
+                <a:ea typeface="+mn-ea"/>
+                <a:cs typeface="+mn-cs"/>
+              </a:defRPr>
+            </a:lvl7pPr>
+            <a:lvl8pPr marL="3429000" indent="-228600" algn="l" defTabSz="914400" rtl="0" eaLnBrk="1" latinLnBrk="0" hangingPunct="1">
+              <a:lnSpc>
+                <a:spcPct val="90000"/>
+              </a:lnSpc>
+              <a:spcBef>
+                <a:spcPts val="500"/>
+              </a:spcBef>
+              <a:buFont typeface="Arial" panose="020B0604020202020204" pitchFamily="34" charset="0"/>
+              <a:buChar char="•"/>
+              <a:defRPr sz="1800" kern="1200">
+                <a:solidFill>
+                  <a:schemeClr val="tx1"/>
+                </a:solidFill>
+                <a:latin typeface="+mn-lt"/>
+                <a:ea typeface="+mn-ea"/>
+                <a:cs typeface="+mn-cs"/>
+              </a:defRPr>
+            </a:lvl8pPr>
+            <a:lvl9pPr marL="3886200" indent="-228600" algn="l" defTabSz="914400" rtl="0" eaLnBrk="1" latinLnBrk="0" hangingPunct="1">
+              <a:lnSpc>
+                <a:spcPct val="90000"/>
+              </a:lnSpc>
+              <a:spcBef>
+                <a:spcPts val="500"/>
+              </a:spcBef>
+              <a:buFont typeface="Arial" panose="020B0604020202020204" pitchFamily="34" charset="0"/>
+              <a:buChar char="•"/>
+              <a:defRPr sz="1800" kern="1200">
+                <a:solidFill>
+                  <a:schemeClr val="tx1"/>
+                </a:solidFill>
+                <a:latin typeface="+mn-lt"/>
+                <a:ea typeface="+mn-ea"/>
+                <a:cs typeface="+mn-cs"/>
+              </a:defRPr>
+            </a:lvl9pPr>
+          </a:lstStyle>
+          <a:p>
+            <a:pPr marL="0" indent="0">
+              <a:buNone/>
+            </a:pPr>
+            <a:r>
+              <a:rPr lang="fr-FR" dirty="0" smtClean="0">
+                <a:solidFill>
+                  <a:schemeClr val="bg1"/>
+                </a:solidFill>
+              </a:rPr>
+              <a:t>Train 75%</a:t>
+            </a:r>
+            <a:endParaRPr lang="fr-FR" dirty="0">
+              <a:solidFill>
+                <a:schemeClr val="bg1"/>
+              </a:solidFill>
+            </a:endParaRPr>
+          </a:p>
+        </p:txBody>
+      </p:sp>
+      <p:sp>
+        <p:nvSpPr>
+          <p:cNvPr id="3" name="Rectangle 2"/>
+          <p:cNvSpPr/>
+          <p:nvPr/>
+        </p:nvSpPr>
+        <p:spPr>
+          <a:xfrm>
+            <a:off x="2742072" y="1868558"/>
+            <a:ext cx="6867728" cy="958704"/>
+          </a:xfrm>
+          <a:prstGeom prst="rect">
+            <a:avLst/>
+          </a:prstGeom>
+          <a:solidFill>
+            <a:srgbClr val="42AFB6"/>
+          </a:solidFill>
+          <a:ln>
+            <a:solidFill>
+              <a:srgbClr val="42AFB6"/>
+            </a:solidFill>
+          </a:ln>
+        </p:spPr>
+        <p:style>
+          <a:lnRef idx="2">
+            <a:schemeClr val="accent1">
+              <a:shade val="50000"/>
+            </a:schemeClr>
+          </a:lnRef>
+          <a:fillRef idx="1">
+            <a:schemeClr val="accent1"/>
+          </a:fillRef>
+          <a:effectRef idx="0">
+            <a:schemeClr val="accent1"/>
+          </a:effectRef>
+          <a:fontRef idx="minor">
+            <a:schemeClr val="lt1"/>
+          </a:fontRef>
+        </p:style>
+        <p:txBody>
+          <a:bodyPr rtlCol="0" anchor="ctr"/>
+          <a:lstStyle/>
+          <a:p>
+            <a:pPr algn="ctr"/>
+            <a:endParaRPr lang="fr-FR"/>
+          </a:p>
+        </p:txBody>
+      </p:sp>
+      <p:sp>
+        <p:nvSpPr>
+          <p:cNvPr id="10" name="Sous-titre 2"/>
+          <p:cNvSpPr txBox="1">
+            <a:spLocks/>
+          </p:cNvSpPr>
+          <p:nvPr/>
+        </p:nvSpPr>
+        <p:spPr>
+          <a:xfrm>
+            <a:off x="4918627" y="2078099"/>
+            <a:ext cx="2503973" cy="619398"/>
+          </a:xfrm>
+          <a:prstGeom prst="rect">
+            <a:avLst/>
+          </a:prstGeom>
+        </p:spPr>
+        <p:txBody>
+          <a:bodyPr vert="horz" lIns="91440" tIns="45720" rIns="91440" bIns="45720" rtlCol="0">
+            <a:normAutofit fontScale="92500"/>
+          </a:bodyPr>
+          <a:lstStyle>
+            <a:lvl1pPr marL="228600" indent="-228600" algn="l" defTabSz="914400" rtl="0" eaLnBrk="1" latinLnBrk="0" hangingPunct="1">
+              <a:lnSpc>
+                <a:spcPct val="90000"/>
+              </a:lnSpc>
+              <a:spcBef>
+                <a:spcPts val="1000"/>
+              </a:spcBef>
+              <a:buFont typeface="Arial" panose="020B0604020202020204" pitchFamily="34" charset="0"/>
+              <a:buChar char="•"/>
+              <a:defRPr sz="2800" kern="1200">
+                <a:solidFill>
+                  <a:schemeClr val="tx1"/>
+                </a:solidFill>
+                <a:latin typeface="+mn-lt"/>
+                <a:ea typeface="+mn-ea"/>
+                <a:cs typeface="+mn-cs"/>
+              </a:defRPr>
+            </a:lvl1pPr>
+            <a:lvl2pPr marL="685800" indent="-228600" algn="l" defTabSz="914400" rtl="0" eaLnBrk="1" latinLnBrk="0" hangingPunct="1">
+              <a:lnSpc>
+                <a:spcPct val="90000"/>
+              </a:lnSpc>
+              <a:spcBef>
+                <a:spcPts val="500"/>
+              </a:spcBef>
+              <a:buFont typeface="Arial" panose="020B0604020202020204" pitchFamily="34" charset="0"/>
+              <a:buChar char="•"/>
+              <a:defRPr sz="2400" kern="1200">
+                <a:solidFill>
+                  <a:schemeClr val="tx1"/>
+                </a:solidFill>
+                <a:latin typeface="+mn-lt"/>
+                <a:ea typeface="+mn-ea"/>
+                <a:cs typeface="+mn-cs"/>
+              </a:defRPr>
+            </a:lvl2pPr>
+            <a:lvl3pPr marL="1143000" indent="-228600" algn="l" defTabSz="914400" rtl="0" eaLnBrk="1" latinLnBrk="0" hangingPunct="1">
+              <a:lnSpc>
+                <a:spcPct val="90000"/>
+              </a:lnSpc>
+              <a:spcBef>
+                <a:spcPts val="500"/>
+              </a:spcBef>
+              <a:buFont typeface="Arial" panose="020B0604020202020204" pitchFamily="34" charset="0"/>
+              <a:buChar char="•"/>
+              <a:defRPr sz="2000" kern="1200">
+                <a:solidFill>
+                  <a:schemeClr val="tx1"/>
+                </a:solidFill>
+                <a:latin typeface="+mn-lt"/>
+                <a:ea typeface="+mn-ea"/>
+                <a:cs typeface="+mn-cs"/>
+              </a:defRPr>
+            </a:lvl3pPr>
+            <a:lvl4pPr marL="1600200" indent="-228600" algn="l" defTabSz="914400" rtl="0" eaLnBrk="1" latinLnBrk="0" hangingPunct="1">
+              <a:lnSpc>
+                <a:spcPct val="90000"/>
+              </a:lnSpc>
+              <a:spcBef>
+                <a:spcPts val="500"/>
+              </a:spcBef>
+              <a:buFont typeface="Arial" panose="020B0604020202020204" pitchFamily="34" charset="0"/>
+              <a:buChar char="•"/>
+              <a:defRPr sz="1800" kern="1200">
+                <a:solidFill>
+                  <a:schemeClr val="tx1"/>
+                </a:solidFill>
+                <a:latin typeface="+mn-lt"/>
+                <a:ea typeface="+mn-ea"/>
+                <a:cs typeface="+mn-cs"/>
+              </a:defRPr>
+            </a:lvl4pPr>
+            <a:lvl5pPr marL="2057400" indent="-228600" algn="l" defTabSz="914400" rtl="0" eaLnBrk="1" latinLnBrk="0" hangingPunct="1">
+              <a:lnSpc>
+                <a:spcPct val="90000"/>
+              </a:lnSpc>
+              <a:spcBef>
+                <a:spcPts val="500"/>
+              </a:spcBef>
+              <a:buFont typeface="Arial" panose="020B0604020202020204" pitchFamily="34" charset="0"/>
+              <a:buChar char="•"/>
+              <a:defRPr sz="1800" kern="1200">
+                <a:solidFill>
+                  <a:schemeClr val="tx1"/>
+                </a:solidFill>
+                <a:latin typeface="+mn-lt"/>
+                <a:ea typeface="+mn-ea"/>
+                <a:cs typeface="+mn-cs"/>
+              </a:defRPr>
+            </a:lvl5pPr>
+            <a:lvl6pPr marL="2514600" indent="-228600" algn="l" defTabSz="914400" rtl="0" eaLnBrk="1" latinLnBrk="0" hangingPunct="1">
+              <a:lnSpc>
+                <a:spcPct val="90000"/>
+              </a:lnSpc>
+              <a:spcBef>
+                <a:spcPts val="500"/>
+              </a:spcBef>
+              <a:buFont typeface="Arial" panose="020B0604020202020204" pitchFamily="34" charset="0"/>
+              <a:buChar char="•"/>
+              <a:defRPr sz="1800" kern="1200">
+                <a:solidFill>
+                  <a:schemeClr val="tx1"/>
+                </a:solidFill>
+                <a:latin typeface="+mn-lt"/>
+                <a:ea typeface="+mn-ea"/>
+                <a:cs typeface="+mn-cs"/>
+              </a:defRPr>
+            </a:lvl6pPr>
+            <a:lvl7pPr marL="2971800" indent="-228600" algn="l" defTabSz="914400" rtl="0" eaLnBrk="1" latinLnBrk="0" hangingPunct="1">
+              <a:lnSpc>
+                <a:spcPct val="90000"/>
+              </a:lnSpc>
+              <a:spcBef>
+                <a:spcPts val="500"/>
+              </a:spcBef>
+              <a:buFont typeface="Arial" panose="020B0604020202020204" pitchFamily="34" charset="0"/>
+              <a:buChar char="•"/>
+              <a:defRPr sz="1800" kern="1200">
+                <a:solidFill>
+                  <a:schemeClr val="tx1"/>
+                </a:solidFill>
+                <a:latin typeface="+mn-lt"/>
+                <a:ea typeface="+mn-ea"/>
+                <a:cs typeface="+mn-cs"/>
+              </a:defRPr>
+            </a:lvl7pPr>
+            <a:lvl8pPr marL="3429000" indent="-228600" algn="l" defTabSz="914400" rtl="0" eaLnBrk="1" latinLnBrk="0" hangingPunct="1">
+              <a:lnSpc>
+                <a:spcPct val="90000"/>
+              </a:lnSpc>
+              <a:spcBef>
+                <a:spcPts val="500"/>
+              </a:spcBef>
+              <a:buFont typeface="Arial" panose="020B0604020202020204" pitchFamily="34" charset="0"/>
+              <a:buChar char="•"/>
+              <a:defRPr sz="1800" kern="1200">
+                <a:solidFill>
+                  <a:schemeClr val="tx1"/>
+                </a:solidFill>
+                <a:latin typeface="+mn-lt"/>
+                <a:ea typeface="+mn-ea"/>
+                <a:cs typeface="+mn-cs"/>
+              </a:defRPr>
+            </a:lvl8pPr>
+            <a:lvl9pPr marL="3886200" indent="-228600" algn="l" defTabSz="914400" rtl="0" eaLnBrk="1" latinLnBrk="0" hangingPunct="1">
+              <a:lnSpc>
+                <a:spcPct val="90000"/>
+              </a:lnSpc>
+              <a:spcBef>
+                <a:spcPts val="500"/>
+              </a:spcBef>
+              <a:buFont typeface="Arial" panose="020B0604020202020204" pitchFamily="34" charset="0"/>
+              <a:buChar char="•"/>
+              <a:defRPr sz="1800" kern="1200">
+                <a:solidFill>
+                  <a:schemeClr val="tx1"/>
+                </a:solidFill>
+                <a:latin typeface="+mn-lt"/>
+                <a:ea typeface="+mn-ea"/>
+                <a:cs typeface="+mn-cs"/>
+              </a:defRPr>
+            </a:lvl9pPr>
+          </a:lstStyle>
+          <a:p>
+            <a:pPr marL="0" indent="0">
+              <a:buNone/>
+            </a:pPr>
+            <a:r>
+              <a:rPr lang="fr-FR" dirty="0" smtClean="0">
+                <a:solidFill>
+                  <a:schemeClr val="bg1"/>
+                </a:solidFill>
+              </a:rPr>
+              <a:t>Base de données</a:t>
+            </a:r>
+            <a:endParaRPr lang="fr-FR" dirty="0">
+              <a:solidFill>
+                <a:schemeClr val="bg1"/>
+              </a:solidFill>
+            </a:endParaRPr>
+          </a:p>
+        </p:txBody>
+      </p:sp>
+      <p:pic>
+        <p:nvPicPr>
+          <p:cNvPr id="13" name="Image 12"/>
+          <p:cNvPicPr/>
+          <p:nvPr/>
+        </p:nvPicPr>
+        <p:blipFill rotWithShape="1">
+          <a:blip r:embed="rId3"/>
+          <a:srcRect b="61489"/>
+          <a:stretch/>
+        </p:blipFill>
+        <p:spPr bwMode="auto">
+          <a:xfrm>
+            <a:off x="2781928" y="4695820"/>
+            <a:ext cx="6827871" cy="1172244"/>
+          </a:xfrm>
+          <a:prstGeom prst="rect">
+            <a:avLst/>
+          </a:prstGeom>
+          <a:ln>
+            <a:noFill/>
+          </a:ln>
+          <a:extLst>
+            <a:ext uri="{53640926-AAD7-44D8-BBD7-CCE9431645EC}">
+              <a14:shadowObscured xmlns:a14="http://schemas.microsoft.com/office/drawing/2010/main"/>
+            </a:ext>
+          </a:extLst>
+        </p:spPr>
+      </p:pic>
     </p:spTree>
     <p:extLst>
       <p:ext uri="{BB962C8B-B14F-4D97-AF65-F5344CB8AC3E}">
-        <p14:creationId xmlns:p14="http://schemas.microsoft.com/office/powerpoint/2010/main" val="1365599446"/>
+        <p14:creationId xmlns:p14="http://schemas.microsoft.com/office/powerpoint/2010/main" val="2852168877"/>
       </p:ext>
     </p:extLst>
   </p:cSld>
@@ -6434,7 +6819,7 @@
       </p:grpSpPr>
       <p:pic>
         <p:nvPicPr>
-          <p:cNvPr id="6" name="Image 5"/>
+          <p:cNvPr id="7" name="Image 6"/>
           <p:cNvPicPr>
             <a:picLocks noChangeAspect="1"/>
           </p:cNvPicPr>
@@ -6458,14 +6843,14 @@
       </p:pic>
       <p:sp>
         <p:nvSpPr>
-          <p:cNvPr id="4" name="ZoneTexte 3"/>
+          <p:cNvPr id="5" name="ZoneTexte 4"/>
           <p:cNvSpPr txBox="1"/>
           <p:nvPr/>
         </p:nvSpPr>
         <p:spPr>
           <a:xfrm>
-            <a:off x="723569" y="1173172"/>
-            <a:ext cx="7545788" cy="400110"/>
+            <a:off x="723569" y="588397"/>
+            <a:ext cx="7545788" cy="584775"/>
           </a:xfrm>
           <a:prstGeom prst="rect">
             <a:avLst/>
@@ -6479,20 +6864,50 @@
           <a:lstStyle/>
           <a:p>
             <a:r>
-              <a:rPr lang="fr-FR" sz="2000" dirty="0">
+              <a:rPr lang="fr-FR" sz="3200" dirty="0" smtClean="0">
                 <a:solidFill>
                   <a:schemeClr val="bg1"/>
                 </a:solidFill>
               </a:rPr>
-              <a:t>2</a:t>
-            </a:r>
+              <a:t>APLICATION DES MODELES AUX DONNEES</a:t>
+            </a:r>
+            <a:endParaRPr lang="fr-FR" sz="3200" dirty="0">
+              <a:solidFill>
+                <a:schemeClr val="bg1"/>
+              </a:solidFill>
+            </a:endParaRPr>
+          </a:p>
+        </p:txBody>
+      </p:sp>
+      <p:sp>
+        <p:nvSpPr>
+          <p:cNvPr id="6" name="ZoneTexte 5"/>
+          <p:cNvSpPr txBox="1"/>
+          <p:nvPr/>
+        </p:nvSpPr>
+        <p:spPr>
+          <a:xfrm>
+            <a:off x="723569" y="1173172"/>
+            <a:ext cx="7545788" cy="400110"/>
+          </a:xfrm>
+          <a:prstGeom prst="rect">
+            <a:avLst/>
+          </a:prstGeom>
+          <a:noFill/>
+        </p:spPr>
+        <p:txBody>
+          <a:bodyPr wrap="square" rtlCol="0">
+            <a:spAutoFit/>
+          </a:bodyPr>
+          <a:lstStyle/>
+          <a:p>
             <a:r>
               <a:rPr lang="fr-FR" sz="2000" dirty="0" smtClean="0">
                 <a:solidFill>
                   <a:schemeClr val="bg1"/>
                 </a:solidFill>
               </a:rPr>
-              <a:t> – Classification avec arbres de décision</a:t>
+              <a:t>1 – Classification avec les plus proches voisins</a:t>
             </a:r>
             <a:endParaRPr lang="fr-FR" sz="2000" dirty="0">
               <a:solidFill>
@@ -6502,47 +6917,9 @@
           </a:p>
         </p:txBody>
       </p:sp>
-      <p:sp>
-        <p:nvSpPr>
-          <p:cNvPr id="5" name="ZoneTexte 4"/>
-          <p:cNvSpPr txBox="1"/>
-          <p:nvPr/>
-        </p:nvSpPr>
-        <p:spPr>
-          <a:xfrm>
-            <a:off x="723569" y="588397"/>
-            <a:ext cx="7545788" cy="584775"/>
-          </a:xfrm>
-          <a:prstGeom prst="rect">
-            <a:avLst/>
-          </a:prstGeom>
-          <a:noFill/>
-        </p:spPr>
-        <p:txBody>
-          <a:bodyPr wrap="square" rtlCol="0">
-            <a:spAutoFit/>
-          </a:bodyPr>
-          <a:lstStyle/>
-          <a:p>
-            <a:r>
-              <a:rPr lang="fr-FR" sz="3200" dirty="0" smtClean="0">
-                <a:solidFill>
-                  <a:schemeClr val="bg1"/>
-                </a:solidFill>
-              </a:rPr>
-              <a:t>APLICATION DES MODELES AUX DONNEES</a:t>
-            </a:r>
-            <a:endParaRPr lang="fr-FR" sz="3200" dirty="0">
-              <a:solidFill>
-                <a:schemeClr val="bg1"/>
-              </a:solidFill>
-            </a:endParaRPr>
-          </a:p>
-        </p:txBody>
-      </p:sp>
       <p:pic>
         <p:nvPicPr>
-          <p:cNvPr id="7" name="Image 6"/>
+          <p:cNvPr id="8" name="Image 7"/>
           <p:cNvPicPr/>
           <p:nvPr/>
         </p:nvPicPr>
@@ -6554,13 +6931,13 @@
               </a:ext>
             </a:extLst>
           </a:blip>
-          <a:srcRect r="5258" b="4531"/>
+          <a:srcRect l="1047" t="5181" r="6348" b="3945"/>
           <a:stretch/>
         </p:blipFill>
         <p:spPr bwMode="auto">
           <a:xfrm>
-            <a:off x="447345" y="2286800"/>
-            <a:ext cx="6004422" cy="1505972"/>
+            <a:off x="723569" y="2689197"/>
+            <a:ext cx="6416702" cy="2073634"/>
           </a:xfrm>
           <a:prstGeom prst="rect">
             <a:avLst/>
@@ -6576,51 +6953,91 @@
           </a:extLst>
         </p:spPr>
       </p:pic>
-      <p:pic>
-        <p:nvPicPr>
-          <p:cNvPr id="8" name="Image 7"/>
-          <p:cNvPicPr/>
-          <p:nvPr/>
-        </p:nvPicPr>
-        <p:blipFill rotWithShape="1">
-          <a:blip r:embed="rId4">
-            <a:extLst>
-              <a:ext uri="{28A0092B-C50C-407E-A947-70E740481C1C}">
-                <a14:useLocalDpi xmlns:a14="http://schemas.microsoft.com/office/drawing/2010/main" val="0"/>
-              </a:ext>
-            </a:extLst>
-          </a:blip>
-          <a:srcRect l="16755" t="945" b="1"/>
-          <a:stretch/>
-        </p:blipFill>
-        <p:spPr bwMode="auto">
-          <a:xfrm>
-            <a:off x="7362908" y="2261994"/>
-            <a:ext cx="3917950" cy="3803650"/>
+      <p:sp>
+        <p:nvSpPr>
+          <p:cNvPr id="9" name="ZoneTexte 8"/>
+          <p:cNvSpPr txBox="1"/>
+          <p:nvPr/>
+        </p:nvSpPr>
+        <p:spPr>
+          <a:xfrm>
+            <a:off x="7991061" y="3130518"/>
+            <a:ext cx="3625795" cy="400110"/>
           </a:xfrm>
           <a:prstGeom prst="rect">
             <a:avLst/>
           </a:prstGeom>
           <a:noFill/>
-          <a:ln>
-            <a:noFill/>
-          </a:ln>
-          <a:extLst>
-            <a:ext uri="{53640926-AAD7-44D8-BBD7-CCE9431645EC}">
-              <a14:shadowObscured xmlns:a14="http://schemas.microsoft.com/office/drawing/2010/main"/>
-            </a:ext>
-          </a:extLst>
-        </p:spPr>
-      </p:pic>
-      <p:sp>
-        <p:nvSpPr>
-          <p:cNvPr id="9" name="Ellipse 8"/>
+        </p:spPr>
+        <p:txBody>
+          <a:bodyPr wrap="square" rtlCol="0">
+            <a:spAutoFit/>
+          </a:bodyPr>
+          <a:lstStyle/>
+          <a:p>
+            <a:r>
+              <a:rPr lang="fr-FR" sz="2000" dirty="0" smtClean="0">
+                <a:solidFill>
+                  <a:schemeClr val="bg1"/>
+                </a:solidFill>
+              </a:rPr>
+              <a:t>Temps d’exécution = 8heures</a:t>
+            </a:r>
+            <a:endParaRPr lang="fr-FR" sz="2000" dirty="0">
+              <a:solidFill>
+                <a:schemeClr val="bg1"/>
+              </a:solidFill>
+            </a:endParaRPr>
+          </a:p>
+        </p:txBody>
+      </p:sp>
+      <p:sp>
+        <p:nvSpPr>
+          <p:cNvPr id="10" name="ZoneTexte 9"/>
+          <p:cNvSpPr txBox="1"/>
+          <p:nvPr/>
+        </p:nvSpPr>
+        <p:spPr>
+          <a:xfrm>
+            <a:off x="7991061" y="4103635"/>
+            <a:ext cx="3625795" cy="400110"/>
+          </a:xfrm>
+          <a:prstGeom prst="rect">
+            <a:avLst/>
+          </a:prstGeom>
+          <a:noFill/>
+        </p:spPr>
+        <p:txBody>
+          <a:bodyPr wrap="square" rtlCol="0">
+            <a:spAutoFit/>
+          </a:bodyPr>
+          <a:lstStyle/>
+          <a:p>
+            <a:r>
+              <a:rPr lang="fr-FR" sz="2000" dirty="0" smtClean="0">
+                <a:solidFill>
+                  <a:schemeClr val="bg1"/>
+                </a:solidFill>
+              </a:rPr>
+              <a:t>Précision = 79.5%</a:t>
+            </a:r>
+            <a:endParaRPr lang="fr-FR" sz="2000" dirty="0">
+              <a:solidFill>
+                <a:schemeClr val="bg1"/>
+              </a:solidFill>
+            </a:endParaRPr>
+          </a:p>
+        </p:txBody>
+      </p:sp>
+      <p:sp>
+        <p:nvSpPr>
+          <p:cNvPr id="11" name="Ellipse 10"/>
           <p:cNvSpPr/>
           <p:nvPr/>
         </p:nvSpPr>
         <p:spPr>
           <a:xfrm>
-            <a:off x="890547" y="4595854"/>
+            <a:off x="7649155" y="3275937"/>
             <a:ext cx="108000" cy="108000"/>
           </a:xfrm>
           <a:prstGeom prst="ellipse">
@@ -6662,13 +7079,13 @@
       </p:sp>
       <p:sp>
         <p:nvSpPr>
-          <p:cNvPr id="10" name="Ellipse 9"/>
+          <p:cNvPr id="12" name="Ellipse 11"/>
           <p:cNvSpPr/>
           <p:nvPr/>
         </p:nvSpPr>
         <p:spPr>
           <a:xfrm>
-            <a:off x="891874" y="5408214"/>
+            <a:off x="7649155" y="4249690"/>
             <a:ext cx="108000" cy="108000"/>
           </a:xfrm>
           <a:prstGeom prst="ellipse">
@@ -6708,86 +7125,10 @@
           </a:p>
         </p:txBody>
       </p:sp>
-      <p:sp>
-        <p:nvSpPr>
-          <p:cNvPr id="11" name="ZoneTexte 10"/>
-          <p:cNvSpPr txBox="1"/>
-          <p:nvPr/>
-        </p:nvSpPr>
-        <p:spPr>
-          <a:xfrm>
-            <a:off x="1216550" y="4449799"/>
-            <a:ext cx="3625795" cy="400110"/>
-          </a:xfrm>
-          <a:prstGeom prst="rect">
-            <a:avLst/>
-          </a:prstGeom>
-          <a:noFill/>
-        </p:spPr>
-        <p:txBody>
-          <a:bodyPr wrap="square" rtlCol="0">
-            <a:spAutoFit/>
-          </a:bodyPr>
-          <a:lstStyle/>
-          <a:p>
-            <a:r>
-              <a:rPr lang="fr-FR" sz="2000" dirty="0" smtClean="0">
-                <a:solidFill>
-                  <a:schemeClr val="bg1"/>
-                </a:solidFill>
-              </a:rPr>
-              <a:t>Temps d’exécution = 11heures</a:t>
-            </a:r>
-            <a:endParaRPr lang="fr-FR" sz="2000" dirty="0">
-              <a:solidFill>
-                <a:schemeClr val="bg1"/>
-              </a:solidFill>
-            </a:endParaRPr>
-          </a:p>
-        </p:txBody>
-      </p:sp>
-      <p:sp>
-        <p:nvSpPr>
-          <p:cNvPr id="12" name="ZoneTexte 11"/>
-          <p:cNvSpPr txBox="1"/>
-          <p:nvPr/>
-        </p:nvSpPr>
-        <p:spPr>
-          <a:xfrm>
-            <a:off x="1216550" y="5262159"/>
-            <a:ext cx="3625795" cy="400110"/>
-          </a:xfrm>
-          <a:prstGeom prst="rect">
-            <a:avLst/>
-          </a:prstGeom>
-          <a:noFill/>
-        </p:spPr>
-        <p:txBody>
-          <a:bodyPr wrap="square" rtlCol="0">
-            <a:spAutoFit/>
-          </a:bodyPr>
-          <a:lstStyle/>
-          <a:p>
-            <a:r>
-              <a:rPr lang="fr-FR" sz="2000" dirty="0" smtClean="0">
-                <a:solidFill>
-                  <a:schemeClr val="bg1"/>
-                </a:solidFill>
-              </a:rPr>
-              <a:t>Précision = 80.6%</a:t>
-            </a:r>
-            <a:endParaRPr lang="fr-FR" sz="2000" dirty="0">
-              <a:solidFill>
-                <a:schemeClr val="bg1"/>
-              </a:solidFill>
-            </a:endParaRPr>
-          </a:p>
-        </p:txBody>
-      </p:sp>
     </p:spTree>
     <p:extLst>
       <p:ext uri="{BB962C8B-B14F-4D97-AF65-F5344CB8AC3E}">
-        <p14:creationId xmlns:p14="http://schemas.microsoft.com/office/powerpoint/2010/main" val="3694892852"/>
+        <p14:creationId xmlns:p14="http://schemas.microsoft.com/office/powerpoint/2010/main" val="1365599446"/>
       </p:ext>
     </p:extLst>
   </p:cSld>
@@ -6873,7 +7214,7 @@
                   <a:schemeClr val="bg1"/>
                 </a:solidFill>
               </a:rPr>
-              <a:t>3</a:t>
+              <a:t>2</a:t>
             </a:r>
             <a:r>
               <a:rPr lang="fr-FR" sz="2000" dirty="0" smtClean="0">
@@ -6881,7 +7222,7 @@
                   <a:schemeClr val="bg1"/>
                 </a:solidFill>
               </a:rPr>
-              <a:t> – Classification avec SVM</a:t>
+              <a:t> – Classification avec arbres de décision</a:t>
             </a:r>
             <a:endParaRPr lang="fr-FR" sz="2000" dirty="0">
               <a:solidFill>
@@ -6943,13 +7284,13 @@
               </a:ext>
             </a:extLst>
           </a:blip>
-          <a:srcRect r="15234"/>
+          <a:srcRect r="5258" b="4531"/>
           <a:stretch/>
         </p:blipFill>
         <p:spPr bwMode="auto">
           <a:xfrm>
-            <a:off x="723569" y="2776068"/>
-            <a:ext cx="6543923" cy="2463842"/>
+            <a:off x="447345" y="2286800"/>
+            <a:ext cx="6004422" cy="1505972"/>
           </a:xfrm>
           <a:prstGeom prst="rect">
             <a:avLst/>
@@ -6965,91 +7306,51 @@
           </a:extLst>
         </p:spPr>
       </p:pic>
-      <p:sp>
-        <p:nvSpPr>
-          <p:cNvPr id="8" name="ZoneTexte 7"/>
-          <p:cNvSpPr txBox="1"/>
-          <p:nvPr/>
-        </p:nvSpPr>
-        <p:spPr>
-          <a:xfrm>
-            <a:off x="7991061" y="3130518"/>
-            <a:ext cx="3625795" cy="400110"/>
+      <p:pic>
+        <p:nvPicPr>
+          <p:cNvPr id="8" name="Image 7"/>
+          <p:cNvPicPr/>
+          <p:nvPr/>
+        </p:nvPicPr>
+        <p:blipFill rotWithShape="1">
+          <a:blip r:embed="rId4">
+            <a:extLst>
+              <a:ext uri="{28A0092B-C50C-407E-A947-70E740481C1C}">
+                <a14:useLocalDpi xmlns:a14="http://schemas.microsoft.com/office/drawing/2010/main" val="0"/>
+              </a:ext>
+            </a:extLst>
+          </a:blip>
+          <a:srcRect l="16755" t="945" b="1"/>
+          <a:stretch/>
+        </p:blipFill>
+        <p:spPr bwMode="auto">
+          <a:xfrm>
+            <a:off x="7362908" y="2261994"/>
+            <a:ext cx="3917950" cy="3803650"/>
           </a:xfrm>
           <a:prstGeom prst="rect">
             <a:avLst/>
           </a:prstGeom>
           <a:noFill/>
-        </p:spPr>
-        <p:txBody>
-          <a:bodyPr wrap="square" rtlCol="0">
-            <a:spAutoFit/>
-          </a:bodyPr>
-          <a:lstStyle/>
-          <a:p>
-            <a:r>
-              <a:rPr lang="fr-FR" sz="2000" dirty="0" smtClean="0">
-                <a:solidFill>
-                  <a:schemeClr val="bg1"/>
-                </a:solidFill>
-              </a:rPr>
-              <a:t>Temps d’exécution = 11heures</a:t>
-            </a:r>
-            <a:endParaRPr lang="fr-FR" sz="2000" dirty="0">
-              <a:solidFill>
-                <a:schemeClr val="bg1"/>
-              </a:solidFill>
-            </a:endParaRPr>
-          </a:p>
-        </p:txBody>
-      </p:sp>
-      <p:sp>
-        <p:nvSpPr>
-          <p:cNvPr id="9" name="ZoneTexte 8"/>
-          <p:cNvSpPr txBox="1"/>
-          <p:nvPr/>
-        </p:nvSpPr>
-        <p:spPr>
-          <a:xfrm>
-            <a:off x="7991061" y="4103635"/>
-            <a:ext cx="3625795" cy="400110"/>
-          </a:xfrm>
-          <a:prstGeom prst="rect">
-            <a:avLst/>
-          </a:prstGeom>
-          <a:noFill/>
-        </p:spPr>
-        <p:txBody>
-          <a:bodyPr wrap="square" rtlCol="0">
-            <a:spAutoFit/>
-          </a:bodyPr>
-          <a:lstStyle/>
-          <a:p>
-            <a:r>
-              <a:rPr lang="fr-FR" sz="2000" dirty="0" smtClean="0">
-                <a:solidFill>
-                  <a:schemeClr val="bg1"/>
-                </a:solidFill>
-              </a:rPr>
-              <a:t>Précision = 86.4%</a:t>
-            </a:r>
-            <a:endParaRPr lang="fr-FR" sz="2000" dirty="0">
-              <a:solidFill>
-                <a:schemeClr val="bg1"/>
-              </a:solidFill>
-            </a:endParaRPr>
-          </a:p>
-        </p:txBody>
-      </p:sp>
-      <p:sp>
-        <p:nvSpPr>
-          <p:cNvPr id="2" name="Ellipse 1"/>
+          <a:ln>
+            <a:noFill/>
+          </a:ln>
+          <a:extLst>
+            <a:ext uri="{53640926-AAD7-44D8-BBD7-CCE9431645EC}">
+              <a14:shadowObscured xmlns:a14="http://schemas.microsoft.com/office/drawing/2010/main"/>
+            </a:ext>
+          </a:extLst>
+        </p:spPr>
+      </p:pic>
+      <p:sp>
+        <p:nvSpPr>
+          <p:cNvPr id="9" name="Ellipse 8"/>
           <p:cNvSpPr/>
           <p:nvPr/>
         </p:nvSpPr>
         <p:spPr>
           <a:xfrm>
-            <a:off x="7649155" y="3275937"/>
+            <a:off x="890547" y="4595854"/>
             <a:ext cx="108000" cy="108000"/>
           </a:xfrm>
           <a:prstGeom prst="ellipse">
@@ -7097,7 +7398,7 @@
         </p:nvSpPr>
         <p:spPr>
           <a:xfrm>
-            <a:off x="7649155" y="4249690"/>
+            <a:off x="891874" y="5408214"/>
             <a:ext cx="108000" cy="108000"/>
           </a:xfrm>
           <a:prstGeom prst="ellipse">
@@ -7137,10 +7438,86 @@
           </a:p>
         </p:txBody>
       </p:sp>
+      <p:sp>
+        <p:nvSpPr>
+          <p:cNvPr id="11" name="ZoneTexte 10"/>
+          <p:cNvSpPr txBox="1"/>
+          <p:nvPr/>
+        </p:nvSpPr>
+        <p:spPr>
+          <a:xfrm>
+            <a:off x="1216550" y="4449799"/>
+            <a:ext cx="3625795" cy="400110"/>
+          </a:xfrm>
+          <a:prstGeom prst="rect">
+            <a:avLst/>
+          </a:prstGeom>
+          <a:noFill/>
+        </p:spPr>
+        <p:txBody>
+          <a:bodyPr wrap="square" rtlCol="0">
+            <a:spAutoFit/>
+          </a:bodyPr>
+          <a:lstStyle/>
+          <a:p>
+            <a:r>
+              <a:rPr lang="fr-FR" sz="2000" dirty="0" smtClean="0">
+                <a:solidFill>
+                  <a:schemeClr val="bg1"/>
+                </a:solidFill>
+              </a:rPr>
+              <a:t>Temps d’exécution = 11heures</a:t>
+            </a:r>
+            <a:endParaRPr lang="fr-FR" sz="2000" dirty="0">
+              <a:solidFill>
+                <a:schemeClr val="bg1"/>
+              </a:solidFill>
+            </a:endParaRPr>
+          </a:p>
+        </p:txBody>
+      </p:sp>
+      <p:sp>
+        <p:nvSpPr>
+          <p:cNvPr id="12" name="ZoneTexte 11"/>
+          <p:cNvSpPr txBox="1"/>
+          <p:nvPr/>
+        </p:nvSpPr>
+        <p:spPr>
+          <a:xfrm>
+            <a:off x="1216550" y="5262159"/>
+            <a:ext cx="3625795" cy="400110"/>
+          </a:xfrm>
+          <a:prstGeom prst="rect">
+            <a:avLst/>
+          </a:prstGeom>
+          <a:noFill/>
+        </p:spPr>
+        <p:txBody>
+          <a:bodyPr wrap="square" rtlCol="0">
+            <a:spAutoFit/>
+          </a:bodyPr>
+          <a:lstStyle/>
+          <a:p>
+            <a:r>
+              <a:rPr lang="fr-FR" sz="2000" dirty="0" smtClean="0">
+                <a:solidFill>
+                  <a:schemeClr val="bg1"/>
+                </a:solidFill>
+              </a:rPr>
+              <a:t>Précision = 80.6%</a:t>
+            </a:r>
+            <a:endParaRPr lang="fr-FR" sz="2000" dirty="0">
+              <a:solidFill>
+                <a:schemeClr val="bg1"/>
+              </a:solidFill>
+            </a:endParaRPr>
+          </a:p>
+        </p:txBody>
+      </p:sp>
     </p:spTree>
     <p:extLst>
       <p:ext uri="{BB962C8B-B14F-4D97-AF65-F5344CB8AC3E}">
-        <p14:creationId xmlns:p14="http://schemas.microsoft.com/office/powerpoint/2010/main" val="1818521200"/>
+        <p14:creationId xmlns:p14="http://schemas.microsoft.com/office/powerpoint/2010/main" val="3694892852"/>
       </p:ext>
     </p:extLst>
   </p:cSld>

</xml_diff>

<commit_message>
texte soutenance + orthographe
</commit_message>
<xml_diff>
--- a/Presentation.pptx
+++ b/Presentation.pptx
@@ -164,10 +164,9 @@
           </a:lstStyle>
           <a:p>
             <a:r>
-              <a:rPr lang="fr-FR" smtClean="0"/>
+              <a:rPr lang="fr-FR"/>
               <a:t>Modifiez le style du titre</a:t>
             </a:r>
-            <a:endParaRPr lang="fr-FR"/>
           </a:p>
         </p:txBody>
       </p:sp>
@@ -229,10 +228,9 @@
           </a:lstStyle>
           <a:p>
             <a:r>
-              <a:rPr lang="fr-FR" smtClean="0"/>
+              <a:rPr lang="fr-FR"/>
               <a:t>Modifier le style des sous-titres du masque</a:t>
             </a:r>
-            <a:endParaRPr lang="fr-FR"/>
           </a:p>
         </p:txBody>
       </p:sp>
@@ -347,10 +345,9 @@
           <a:lstStyle/>
           <a:p>
             <a:r>
-              <a:rPr lang="fr-FR" smtClean="0"/>
+              <a:rPr lang="fr-FR"/>
               <a:t>Modifiez le style du titre</a:t>
             </a:r>
-            <a:endParaRPr lang="fr-FR"/>
           </a:p>
         </p:txBody>
       </p:sp>
@@ -371,38 +368,37 @@
           <a:p>
             <a:pPr lvl="0"/>
             <a:r>
-              <a:rPr lang="fr-FR" smtClean="0"/>
+              <a:rPr lang="fr-FR"/>
               <a:t>Modifier les styles du texte du masque</a:t>
             </a:r>
           </a:p>
           <a:p>
             <a:pPr lvl="1"/>
             <a:r>
-              <a:rPr lang="fr-FR" smtClean="0"/>
+              <a:rPr lang="fr-FR"/>
               <a:t>Deuxième niveau</a:t>
             </a:r>
           </a:p>
           <a:p>
             <a:pPr lvl="2"/>
             <a:r>
-              <a:rPr lang="fr-FR" smtClean="0"/>
+              <a:rPr lang="fr-FR"/>
               <a:t>Troisième niveau</a:t>
             </a:r>
           </a:p>
           <a:p>
             <a:pPr lvl="3"/>
             <a:r>
-              <a:rPr lang="fr-FR" smtClean="0"/>
+              <a:rPr lang="fr-FR"/>
               <a:t>Quatrième niveau</a:t>
             </a:r>
           </a:p>
           <a:p>
             <a:pPr lvl="4"/>
             <a:r>
-              <a:rPr lang="fr-FR" smtClean="0"/>
+              <a:rPr lang="fr-FR"/>
               <a:t>Cinquième niveau</a:t>
             </a:r>
-            <a:endParaRPr lang="fr-FR"/>
           </a:p>
         </p:txBody>
       </p:sp>
@@ -522,10 +518,9 @@
           <a:lstStyle/>
           <a:p>
             <a:r>
-              <a:rPr lang="fr-FR" smtClean="0"/>
+              <a:rPr lang="fr-FR"/>
               <a:t>Modifiez le style du titre</a:t>
             </a:r>
-            <a:endParaRPr lang="fr-FR"/>
           </a:p>
         </p:txBody>
       </p:sp>
@@ -551,38 +546,37 @@
           <a:p>
             <a:pPr lvl="0"/>
             <a:r>
-              <a:rPr lang="fr-FR" smtClean="0"/>
+              <a:rPr lang="fr-FR"/>
               <a:t>Modifier les styles du texte du masque</a:t>
             </a:r>
           </a:p>
           <a:p>
             <a:pPr lvl="1"/>
             <a:r>
-              <a:rPr lang="fr-FR" smtClean="0"/>
+              <a:rPr lang="fr-FR"/>
               <a:t>Deuxième niveau</a:t>
             </a:r>
           </a:p>
           <a:p>
             <a:pPr lvl="2"/>
             <a:r>
-              <a:rPr lang="fr-FR" smtClean="0"/>
+              <a:rPr lang="fr-FR"/>
               <a:t>Troisième niveau</a:t>
             </a:r>
           </a:p>
           <a:p>
             <a:pPr lvl="3"/>
             <a:r>
-              <a:rPr lang="fr-FR" smtClean="0"/>
+              <a:rPr lang="fr-FR"/>
               <a:t>Quatrième niveau</a:t>
             </a:r>
           </a:p>
           <a:p>
             <a:pPr lvl="4"/>
             <a:r>
-              <a:rPr lang="fr-FR" smtClean="0"/>
+              <a:rPr lang="fr-FR"/>
               <a:t>Cinquième niveau</a:t>
             </a:r>
-            <a:endParaRPr lang="fr-FR"/>
           </a:p>
         </p:txBody>
       </p:sp>
@@ -697,10 +691,9 @@
           <a:lstStyle/>
           <a:p>
             <a:r>
-              <a:rPr lang="fr-FR" smtClean="0"/>
+              <a:rPr lang="fr-FR"/>
               <a:t>Modifiez le style du titre</a:t>
             </a:r>
-            <a:endParaRPr lang="fr-FR"/>
           </a:p>
         </p:txBody>
       </p:sp>
@@ -721,38 +714,37 @@
           <a:p>
             <a:pPr lvl="0"/>
             <a:r>
-              <a:rPr lang="fr-FR" smtClean="0"/>
+              <a:rPr lang="fr-FR"/>
               <a:t>Modifier les styles du texte du masque</a:t>
             </a:r>
           </a:p>
           <a:p>
             <a:pPr lvl="1"/>
             <a:r>
-              <a:rPr lang="fr-FR" smtClean="0"/>
+              <a:rPr lang="fr-FR"/>
               <a:t>Deuxième niveau</a:t>
             </a:r>
           </a:p>
           <a:p>
             <a:pPr lvl="2"/>
             <a:r>
-              <a:rPr lang="fr-FR" smtClean="0"/>
+              <a:rPr lang="fr-FR"/>
               <a:t>Troisième niveau</a:t>
             </a:r>
           </a:p>
           <a:p>
             <a:pPr lvl="3"/>
             <a:r>
-              <a:rPr lang="fr-FR" smtClean="0"/>
+              <a:rPr lang="fr-FR"/>
               <a:t>Quatrième niveau</a:t>
             </a:r>
           </a:p>
           <a:p>
             <a:pPr lvl="4"/>
             <a:r>
-              <a:rPr lang="fr-FR" smtClean="0"/>
+              <a:rPr lang="fr-FR"/>
               <a:t>Cinquième niveau</a:t>
             </a:r>
-            <a:endParaRPr lang="fr-FR"/>
           </a:p>
         </p:txBody>
       </p:sp>
@@ -876,10 +868,9 @@
           </a:lstStyle>
           <a:p>
             <a:r>
-              <a:rPr lang="fr-FR" smtClean="0"/>
+              <a:rPr lang="fr-FR"/>
               <a:t>Modifiez le style du titre</a:t>
             </a:r>
-            <a:endParaRPr lang="fr-FR"/>
           </a:p>
         </p:txBody>
       </p:sp>
@@ -996,7 +987,7 @@
           <a:p>
             <a:pPr lvl="0"/>
             <a:r>
-              <a:rPr lang="fr-FR" smtClean="0"/>
+              <a:rPr lang="fr-FR"/>
               <a:t>Modifier les styles du texte du masque</a:t>
             </a:r>
           </a:p>
@@ -1113,10 +1104,9 @@
           <a:lstStyle/>
           <a:p>
             <a:r>
-              <a:rPr lang="fr-FR" smtClean="0"/>
+              <a:rPr lang="fr-FR"/>
               <a:t>Modifiez le style du titre</a:t>
             </a:r>
-            <a:endParaRPr lang="fr-FR"/>
           </a:p>
         </p:txBody>
       </p:sp>
@@ -1142,38 +1132,37 @@
           <a:p>
             <a:pPr lvl="0"/>
             <a:r>
-              <a:rPr lang="fr-FR" smtClean="0"/>
+              <a:rPr lang="fr-FR"/>
               <a:t>Modifier les styles du texte du masque</a:t>
             </a:r>
           </a:p>
           <a:p>
             <a:pPr lvl="1"/>
             <a:r>
-              <a:rPr lang="fr-FR" smtClean="0"/>
+              <a:rPr lang="fr-FR"/>
               <a:t>Deuxième niveau</a:t>
             </a:r>
           </a:p>
           <a:p>
             <a:pPr lvl="2"/>
             <a:r>
-              <a:rPr lang="fr-FR" smtClean="0"/>
+              <a:rPr lang="fr-FR"/>
               <a:t>Troisième niveau</a:t>
             </a:r>
           </a:p>
           <a:p>
             <a:pPr lvl="3"/>
             <a:r>
-              <a:rPr lang="fr-FR" smtClean="0"/>
+              <a:rPr lang="fr-FR"/>
               <a:t>Quatrième niveau</a:t>
             </a:r>
           </a:p>
           <a:p>
             <a:pPr lvl="4"/>
             <a:r>
-              <a:rPr lang="fr-FR" smtClean="0"/>
+              <a:rPr lang="fr-FR"/>
               <a:t>Cinquième niveau</a:t>
             </a:r>
-            <a:endParaRPr lang="fr-FR"/>
           </a:p>
         </p:txBody>
       </p:sp>
@@ -1199,38 +1188,37 @@
           <a:p>
             <a:pPr lvl="0"/>
             <a:r>
-              <a:rPr lang="fr-FR" smtClean="0"/>
+              <a:rPr lang="fr-FR"/>
               <a:t>Modifier les styles du texte du masque</a:t>
             </a:r>
           </a:p>
           <a:p>
             <a:pPr lvl="1"/>
             <a:r>
-              <a:rPr lang="fr-FR" smtClean="0"/>
+              <a:rPr lang="fr-FR"/>
               <a:t>Deuxième niveau</a:t>
             </a:r>
           </a:p>
           <a:p>
             <a:pPr lvl="2"/>
             <a:r>
-              <a:rPr lang="fr-FR" smtClean="0"/>
+              <a:rPr lang="fr-FR"/>
               <a:t>Troisième niveau</a:t>
             </a:r>
           </a:p>
           <a:p>
             <a:pPr lvl="3"/>
             <a:r>
-              <a:rPr lang="fr-FR" smtClean="0"/>
+              <a:rPr lang="fr-FR"/>
               <a:t>Quatrième niveau</a:t>
             </a:r>
           </a:p>
           <a:p>
             <a:pPr lvl="4"/>
             <a:r>
-              <a:rPr lang="fr-FR" smtClean="0"/>
+              <a:rPr lang="fr-FR"/>
               <a:t>Cinquième niveau</a:t>
             </a:r>
-            <a:endParaRPr lang="fr-FR"/>
           </a:p>
         </p:txBody>
       </p:sp>
@@ -1350,10 +1338,9 @@
           <a:lstStyle/>
           <a:p>
             <a:r>
-              <a:rPr lang="fr-FR" smtClean="0"/>
+              <a:rPr lang="fr-FR"/>
               <a:t>Modifiez le style du titre</a:t>
             </a:r>
-            <a:endParaRPr lang="fr-FR"/>
           </a:p>
         </p:txBody>
       </p:sp>
@@ -1416,7 +1403,7 @@
           <a:p>
             <a:pPr lvl="0"/>
             <a:r>
-              <a:rPr lang="fr-FR" smtClean="0"/>
+              <a:rPr lang="fr-FR"/>
               <a:t>Modifier les styles du texte du masque</a:t>
             </a:r>
           </a:p>
@@ -1444,38 +1431,37 @@
           <a:p>
             <a:pPr lvl="0"/>
             <a:r>
-              <a:rPr lang="fr-FR" smtClean="0"/>
+              <a:rPr lang="fr-FR"/>
               <a:t>Modifier les styles du texte du masque</a:t>
             </a:r>
           </a:p>
           <a:p>
             <a:pPr lvl="1"/>
             <a:r>
-              <a:rPr lang="fr-FR" smtClean="0"/>
+              <a:rPr lang="fr-FR"/>
               <a:t>Deuxième niveau</a:t>
             </a:r>
           </a:p>
           <a:p>
             <a:pPr lvl="2"/>
             <a:r>
-              <a:rPr lang="fr-FR" smtClean="0"/>
+              <a:rPr lang="fr-FR"/>
               <a:t>Troisième niveau</a:t>
             </a:r>
           </a:p>
           <a:p>
             <a:pPr lvl="3"/>
             <a:r>
-              <a:rPr lang="fr-FR" smtClean="0"/>
+              <a:rPr lang="fr-FR"/>
               <a:t>Quatrième niveau</a:t>
             </a:r>
           </a:p>
           <a:p>
             <a:pPr lvl="4"/>
             <a:r>
-              <a:rPr lang="fr-FR" smtClean="0"/>
+              <a:rPr lang="fr-FR"/>
               <a:t>Cinquième niveau</a:t>
             </a:r>
-            <a:endParaRPr lang="fr-FR"/>
           </a:p>
         </p:txBody>
       </p:sp>
@@ -1538,7 +1524,7 @@
           <a:p>
             <a:pPr lvl="0"/>
             <a:r>
-              <a:rPr lang="fr-FR" smtClean="0"/>
+              <a:rPr lang="fr-FR"/>
               <a:t>Modifier les styles du texte du masque</a:t>
             </a:r>
           </a:p>
@@ -1566,38 +1552,37 @@
           <a:p>
             <a:pPr lvl="0"/>
             <a:r>
-              <a:rPr lang="fr-FR" smtClean="0"/>
+              <a:rPr lang="fr-FR"/>
               <a:t>Modifier les styles du texte du masque</a:t>
             </a:r>
           </a:p>
           <a:p>
             <a:pPr lvl="1"/>
             <a:r>
-              <a:rPr lang="fr-FR" smtClean="0"/>
+              <a:rPr lang="fr-FR"/>
               <a:t>Deuxième niveau</a:t>
             </a:r>
           </a:p>
           <a:p>
             <a:pPr lvl="2"/>
             <a:r>
-              <a:rPr lang="fr-FR" smtClean="0"/>
+              <a:rPr lang="fr-FR"/>
               <a:t>Troisième niveau</a:t>
             </a:r>
           </a:p>
           <a:p>
             <a:pPr lvl="3"/>
             <a:r>
-              <a:rPr lang="fr-FR" smtClean="0"/>
+              <a:rPr lang="fr-FR"/>
               <a:t>Quatrième niveau</a:t>
             </a:r>
           </a:p>
           <a:p>
             <a:pPr lvl="4"/>
             <a:r>
-              <a:rPr lang="fr-FR" smtClean="0"/>
+              <a:rPr lang="fr-FR"/>
               <a:t>Cinquième niveau</a:t>
             </a:r>
-            <a:endParaRPr lang="fr-FR"/>
           </a:p>
         </p:txBody>
       </p:sp>
@@ -1712,10 +1697,9 @@
           <a:lstStyle/>
           <a:p>
             <a:r>
-              <a:rPr lang="fr-FR" smtClean="0"/>
+              <a:rPr lang="fr-FR"/>
               <a:t>Modifiez le style du titre</a:t>
             </a:r>
-            <a:endParaRPr lang="fr-FR"/>
           </a:p>
         </p:txBody>
       </p:sp>
@@ -1934,10 +1918,9 @@
           </a:lstStyle>
           <a:p>
             <a:r>
-              <a:rPr lang="fr-FR" smtClean="0"/>
+              <a:rPr lang="fr-FR"/>
               <a:t>Modifiez le style du titre</a:t>
             </a:r>
-            <a:endParaRPr lang="fr-FR"/>
           </a:p>
         </p:txBody>
       </p:sp>
@@ -1991,38 +1974,37 @@
           <a:p>
             <a:pPr lvl="0"/>
             <a:r>
-              <a:rPr lang="fr-FR" smtClean="0"/>
+              <a:rPr lang="fr-FR"/>
               <a:t>Modifier les styles du texte du masque</a:t>
             </a:r>
           </a:p>
           <a:p>
             <a:pPr lvl="1"/>
             <a:r>
-              <a:rPr lang="fr-FR" smtClean="0"/>
+              <a:rPr lang="fr-FR"/>
               <a:t>Deuxième niveau</a:t>
             </a:r>
           </a:p>
           <a:p>
             <a:pPr lvl="2"/>
             <a:r>
-              <a:rPr lang="fr-FR" smtClean="0"/>
+              <a:rPr lang="fr-FR"/>
               <a:t>Troisième niveau</a:t>
             </a:r>
           </a:p>
           <a:p>
             <a:pPr lvl="3"/>
             <a:r>
-              <a:rPr lang="fr-FR" smtClean="0"/>
+              <a:rPr lang="fr-FR"/>
               <a:t>Quatrième niveau</a:t>
             </a:r>
           </a:p>
           <a:p>
             <a:pPr lvl="4"/>
             <a:r>
-              <a:rPr lang="fr-FR" smtClean="0"/>
+              <a:rPr lang="fr-FR"/>
               <a:t>Cinquième niveau</a:t>
             </a:r>
-            <a:endParaRPr lang="fr-FR"/>
           </a:p>
         </p:txBody>
       </p:sp>
@@ -2085,7 +2067,7 @@
           <a:p>
             <a:pPr lvl="0"/>
             <a:r>
-              <a:rPr lang="fr-FR" smtClean="0"/>
+              <a:rPr lang="fr-FR"/>
               <a:t>Modifier les styles du texte du masque</a:t>
             </a:r>
           </a:p>
@@ -2211,10 +2193,9 @@
           </a:lstStyle>
           <a:p>
             <a:r>
-              <a:rPr lang="fr-FR" smtClean="0"/>
+              <a:rPr lang="fr-FR"/>
               <a:t>Modifiez le style du titre</a:t>
             </a:r>
-            <a:endParaRPr lang="fr-FR"/>
           </a:p>
         </p:txBody>
       </p:sp>
@@ -2338,7 +2319,7 @@
           <a:p>
             <a:pPr lvl="0"/>
             <a:r>
-              <a:rPr lang="fr-FR" smtClean="0"/>
+              <a:rPr lang="fr-FR"/>
               <a:t>Modifier les styles du texte du masque</a:t>
             </a:r>
           </a:p>
@@ -2470,10 +2451,9 @@
           <a:lstStyle/>
           <a:p>
             <a:r>
-              <a:rPr lang="fr-FR" smtClean="0"/>
+              <a:rPr lang="fr-FR"/>
               <a:t>Modifiez le style du titre</a:t>
             </a:r>
-            <a:endParaRPr lang="fr-FR"/>
           </a:p>
         </p:txBody>
       </p:sp>
@@ -2504,38 +2484,37 @@
           <a:p>
             <a:pPr lvl="0"/>
             <a:r>
-              <a:rPr lang="fr-FR" smtClean="0"/>
+              <a:rPr lang="fr-FR"/>
               <a:t>Modifier les styles du texte du masque</a:t>
             </a:r>
           </a:p>
           <a:p>
             <a:pPr lvl="1"/>
             <a:r>
-              <a:rPr lang="fr-FR" smtClean="0"/>
+              <a:rPr lang="fr-FR"/>
               <a:t>Deuxième niveau</a:t>
             </a:r>
           </a:p>
           <a:p>
             <a:pPr lvl="2"/>
             <a:r>
-              <a:rPr lang="fr-FR" smtClean="0"/>
+              <a:rPr lang="fr-FR"/>
               <a:t>Troisième niveau</a:t>
             </a:r>
           </a:p>
           <a:p>
             <a:pPr lvl="3"/>
             <a:r>
-              <a:rPr lang="fr-FR" smtClean="0"/>
+              <a:rPr lang="fr-FR"/>
               <a:t>Quatrième niveau</a:t>
             </a:r>
           </a:p>
           <a:p>
             <a:pPr lvl="4"/>
             <a:r>
-              <a:rPr lang="fr-FR" smtClean="0"/>
+              <a:rPr lang="fr-FR"/>
               <a:t>Cinquième niveau</a:t>
             </a:r>
-            <a:endParaRPr lang="fr-FR"/>
           </a:p>
         </p:txBody>
       </p:sp>
@@ -3024,18 +3003,13 @@
           <a:lstStyle/>
           <a:p>
             <a:r>
-              <a:rPr lang="fr-FR" b="1" dirty="0" smtClean="0">
+              <a:rPr lang="fr-FR" b="1" dirty="0">
                 <a:solidFill>
                   <a:schemeClr val="bg1"/>
                 </a:solidFill>
               </a:rPr>
               <a:t>PREDICTION CANCER DU SEIN</a:t>
             </a:r>
-            <a:endParaRPr lang="fr-FR" b="1" dirty="0">
-              <a:solidFill>
-                <a:schemeClr val="bg1"/>
-              </a:solidFill>
-            </a:endParaRPr>
           </a:p>
         </p:txBody>
       </p:sp>
@@ -3060,18 +3034,13 @@
           <a:lstStyle/>
           <a:p>
             <a:r>
-              <a:rPr lang="fr-FR" dirty="0" smtClean="0">
+              <a:rPr lang="fr-FR" dirty="0">
                 <a:solidFill>
                   <a:schemeClr val="bg1"/>
                 </a:solidFill>
               </a:rPr>
               <a:t>Clara PONCET et Lucile VELUT</a:t>
             </a:r>
-            <a:endParaRPr lang="fr-FR" dirty="0">
-              <a:solidFill>
-                <a:schemeClr val="bg1"/>
-              </a:solidFill>
-            </a:endParaRPr>
           </a:p>
         </p:txBody>
       </p:sp>
@@ -3260,13 +3229,6 @@
   <p:clrMapOvr>
     <a:masterClrMapping/>
   </p:clrMapOvr>
-  <p:timing>
-    <p:tnLst>
-      <p:par>
-        <p:cTn id="1" dur="indefinite" restart="never" nodeType="tmRoot"/>
-      </p:par>
-    </p:tnLst>
-  </p:timing>
 </p:sld>
 </file>
 
@@ -3339,21 +3301,8 @@
                   <a:schemeClr val="bg1"/>
                 </a:solidFill>
               </a:rPr>
-              <a:t>3</a:t>
-            </a:r>
-            <a:r>
-              <a:rPr lang="fr-FR" sz="2000" dirty="0" smtClean="0">
-                <a:solidFill>
-                  <a:schemeClr val="bg1"/>
-                </a:solidFill>
-              </a:rPr>
-              <a:t> – Classification avec SVM</a:t>
-            </a:r>
-            <a:endParaRPr lang="fr-FR" sz="2000" dirty="0">
-              <a:solidFill>
-                <a:schemeClr val="bg1"/>
-              </a:solidFill>
-            </a:endParaRPr>
+              <a:t>3 – Classification avec SVM</a:t>
+            </a:r>
           </a:p>
         </p:txBody>
       </p:sp>
@@ -3380,18 +3329,13 @@
           <a:lstStyle/>
           <a:p>
             <a:r>
-              <a:rPr lang="fr-FR" sz="3200" dirty="0" smtClean="0">
+              <a:rPr lang="fr-FR" sz="3200" dirty="0">
                 <a:solidFill>
                   <a:schemeClr val="bg1"/>
                 </a:solidFill>
               </a:rPr>
-              <a:t>APLICATION DES MODELES AUX DONNEES</a:t>
-            </a:r>
-            <a:endParaRPr lang="fr-FR" sz="3200" dirty="0">
-              <a:solidFill>
-                <a:schemeClr val="bg1"/>
-              </a:solidFill>
-            </a:endParaRPr>
+              <a:t>APPLICATION DES MODELES AUX DONNEES</a:t>
+            </a:r>
           </a:p>
         </p:txBody>
       </p:sp>
@@ -3454,18 +3398,13 @@
           <a:lstStyle/>
           <a:p>
             <a:r>
-              <a:rPr lang="fr-FR" sz="2000" dirty="0" smtClean="0">
+              <a:rPr lang="fr-FR" sz="2000" dirty="0">
                 <a:solidFill>
                   <a:schemeClr val="bg1"/>
                 </a:solidFill>
               </a:rPr>
-              <a:t>Temps d’exécution = 11heures</a:t>
-            </a:r>
-            <a:endParaRPr lang="fr-FR" sz="2000" dirty="0">
-              <a:solidFill>
-                <a:schemeClr val="bg1"/>
-              </a:solidFill>
-            </a:endParaRPr>
+              <a:t>Temps d’exécution = 11 heures</a:t>
+            </a:r>
           </a:p>
         </p:txBody>
       </p:sp>
@@ -3492,18 +3431,13 @@
           <a:lstStyle/>
           <a:p>
             <a:r>
-              <a:rPr lang="fr-FR" sz="2000" dirty="0" smtClean="0">
+              <a:rPr lang="fr-FR" sz="2000" dirty="0">
                 <a:solidFill>
                   <a:schemeClr val="bg1"/>
                 </a:solidFill>
               </a:rPr>
               <a:t>Précision = 86.4%</a:t>
             </a:r>
-            <a:endParaRPr lang="fr-FR" sz="2000" dirty="0">
-              <a:solidFill>
-                <a:schemeClr val="bg1"/>
-              </a:solidFill>
-            </a:endParaRPr>
           </a:p>
         </p:txBody>
       </p:sp>
@@ -3613,13 +3547,6 @@
   <p:clrMapOvr>
     <a:masterClrMapping/>
   </p:clrMapOvr>
-  <p:timing>
-    <p:tnLst>
-      <p:par>
-        <p:cTn id="1" dur="indefinite" restart="never" nodeType="tmRoot"/>
-      </p:par>
-    </p:tnLst>
-  </p:timing>
 </p:sld>
 </file>
 
@@ -3687,18 +3614,13 @@
           <a:lstStyle/>
           <a:p>
             <a:r>
-              <a:rPr lang="fr-FR" sz="3200" dirty="0" smtClean="0">
+              <a:rPr lang="fr-FR" sz="3200" dirty="0">
                 <a:solidFill>
                   <a:schemeClr val="bg1"/>
                 </a:solidFill>
               </a:rPr>
               <a:t>CONCLUSION</a:t>
             </a:r>
-            <a:endParaRPr lang="fr-FR" sz="3200" dirty="0">
-              <a:solidFill>
-                <a:schemeClr val="bg1"/>
-              </a:solidFill>
-            </a:endParaRPr>
           </a:p>
         </p:txBody>
       </p:sp>
@@ -3892,18 +3814,13 @@
               <a:buNone/>
             </a:pPr>
             <a:r>
-              <a:rPr lang="fr-FR" dirty="0" smtClean="0">
+              <a:rPr lang="fr-FR" dirty="0">
                 <a:solidFill>
                   <a:schemeClr val="bg1"/>
                 </a:solidFill>
               </a:rPr>
               <a:t>SVM</a:t>
             </a:r>
-            <a:endParaRPr lang="fr-FR" dirty="0">
-              <a:solidFill>
-                <a:schemeClr val="bg1"/>
-              </a:solidFill>
-            </a:endParaRPr>
           </a:p>
         </p:txBody>
       </p:sp>
@@ -4120,18 +4037,13 @@
               <a:buNone/>
             </a:pPr>
             <a:r>
-              <a:rPr lang="fr-FR" dirty="0" smtClean="0">
+              <a:rPr lang="fr-FR" dirty="0">
                 <a:solidFill>
                   <a:schemeClr val="bg1"/>
                 </a:solidFill>
               </a:rPr>
               <a:t>ARBRES DE DECISION</a:t>
             </a:r>
-            <a:endParaRPr lang="fr-FR" dirty="0">
-              <a:solidFill>
-                <a:schemeClr val="bg1"/>
-              </a:solidFill>
-            </a:endParaRPr>
           </a:p>
         </p:txBody>
       </p:sp>
@@ -4325,18 +4237,13 @@
               <a:buNone/>
             </a:pPr>
             <a:r>
-              <a:rPr lang="fr-FR" dirty="0" smtClean="0">
+              <a:rPr lang="fr-FR" dirty="0">
                 <a:solidFill>
                   <a:schemeClr val="bg1"/>
                 </a:solidFill>
               </a:rPr>
               <a:t>KNN</a:t>
             </a:r>
-            <a:endParaRPr lang="fr-FR" dirty="0">
-              <a:solidFill>
-                <a:schemeClr val="bg1"/>
-              </a:solidFill>
-            </a:endParaRPr>
           </a:p>
         </p:txBody>
       </p:sp>
@@ -4363,18 +4270,13 @@
           <a:lstStyle/>
           <a:p>
             <a:r>
-              <a:rPr lang="fr-FR" i="1" dirty="0" smtClean="0">
+              <a:rPr lang="fr-FR" i="1" dirty="0">
                 <a:solidFill>
                   <a:schemeClr val="bg1"/>
                 </a:solidFill>
               </a:rPr>
               <a:t>Classement des modèles en fonction de leur précision</a:t>
             </a:r>
-            <a:endParaRPr lang="fr-FR" i="1" dirty="0">
-              <a:solidFill>
-                <a:schemeClr val="bg1"/>
-              </a:solidFill>
-            </a:endParaRPr>
           </a:p>
         </p:txBody>
       </p:sp>
@@ -4388,13 +4290,6 @@
   <p:clrMapOvr>
     <a:masterClrMapping/>
   </p:clrMapOvr>
-  <p:timing>
-    <p:tnLst>
-      <p:par>
-        <p:cTn id="1" dur="indefinite" restart="never" nodeType="tmRoot"/>
-      </p:par>
-    </p:tnLst>
-  </p:timing>
 </p:sld>
 </file>
 
@@ -4462,18 +4357,13 @@
           <a:lstStyle/>
           <a:p>
             <a:r>
-              <a:rPr lang="fr-FR" sz="3200" dirty="0" smtClean="0">
+              <a:rPr lang="fr-FR" sz="3200" dirty="0">
                 <a:solidFill>
                   <a:schemeClr val="bg1"/>
                 </a:solidFill>
               </a:rPr>
               <a:t>SOMMAIRE</a:t>
             </a:r>
-            <a:endParaRPr lang="fr-FR" sz="3200" dirty="0">
-              <a:solidFill>
-                <a:schemeClr val="bg1"/>
-              </a:solidFill>
-            </a:endParaRPr>
           </a:p>
         </p:txBody>
       </p:sp>
@@ -4524,18 +4414,13 @@
           <a:lstStyle/>
           <a:p>
             <a:r>
-              <a:rPr lang="fr-FR" sz="2400" dirty="0" smtClean="0">
+              <a:rPr lang="fr-FR" sz="2400" dirty="0">
                 <a:solidFill>
                   <a:schemeClr val="bg1"/>
                 </a:solidFill>
               </a:rPr>
               <a:t>DEFINITION DU PROBLEME</a:t>
             </a:r>
-            <a:endParaRPr lang="fr-FR" sz="2400" dirty="0">
-              <a:solidFill>
-                <a:schemeClr val="bg1"/>
-              </a:solidFill>
-            </a:endParaRPr>
           </a:p>
         </p:txBody>
       </p:sp>
@@ -4562,18 +4447,13 @@
           <a:lstStyle/>
           <a:p>
             <a:r>
-              <a:rPr lang="fr-FR" sz="2400" dirty="0" smtClean="0">
+              <a:rPr lang="fr-FR" sz="2400" dirty="0">
                 <a:solidFill>
                   <a:schemeClr val="bg1"/>
                 </a:solidFill>
               </a:rPr>
               <a:t>DESCRIPTION DE LA BASE DE DONNEES</a:t>
             </a:r>
-            <a:endParaRPr lang="fr-FR" sz="2400" dirty="0">
-              <a:solidFill>
-                <a:schemeClr val="bg1"/>
-              </a:solidFill>
-            </a:endParaRPr>
           </a:p>
         </p:txBody>
       </p:sp>
@@ -4600,18 +4480,13 @@
           <a:lstStyle/>
           <a:p>
             <a:r>
-              <a:rPr lang="fr-FR" sz="2400" dirty="0" smtClean="0">
+              <a:rPr lang="fr-FR" sz="2400" dirty="0">
                 <a:solidFill>
                   <a:schemeClr val="bg1"/>
                 </a:solidFill>
               </a:rPr>
               <a:t>CHARGEMENT DE LA BASE DE DONNEES</a:t>
             </a:r>
-            <a:endParaRPr lang="fr-FR" sz="2400" dirty="0">
-              <a:solidFill>
-                <a:schemeClr val="bg1"/>
-              </a:solidFill>
-            </a:endParaRPr>
           </a:p>
         </p:txBody>
       </p:sp>
@@ -4638,18 +4513,13 @@
           <a:lstStyle/>
           <a:p>
             <a:r>
-              <a:rPr lang="fr-FR" sz="2400" dirty="0" smtClean="0">
+              <a:rPr lang="fr-FR" sz="2400" dirty="0">
                 <a:solidFill>
                   <a:schemeClr val="bg1"/>
                 </a:solidFill>
               </a:rPr>
               <a:t>APPLICATIONS</a:t>
             </a:r>
-            <a:endParaRPr lang="fr-FR" sz="2400" dirty="0">
-              <a:solidFill>
-                <a:schemeClr val="bg1"/>
-              </a:solidFill>
-            </a:endParaRPr>
           </a:p>
         </p:txBody>
       </p:sp>
@@ -4676,18 +4546,13 @@
           <a:lstStyle/>
           <a:p>
             <a:r>
-              <a:rPr lang="fr-FR" sz="2400" dirty="0" smtClean="0">
+              <a:rPr lang="fr-FR" sz="2400" dirty="0">
                 <a:solidFill>
                   <a:schemeClr val="bg1"/>
                 </a:solidFill>
               </a:rPr>
               <a:t>CONCLUSION</a:t>
             </a:r>
-            <a:endParaRPr lang="fr-FR" sz="2400" dirty="0">
-              <a:solidFill>
-                <a:schemeClr val="bg1"/>
-              </a:solidFill>
-            </a:endParaRPr>
           </a:p>
         </p:txBody>
       </p:sp>
@@ -4768,18 +4633,13 @@
           <a:lstStyle/>
           <a:p>
             <a:r>
-              <a:rPr lang="fr-FR" sz="3200" dirty="0" smtClean="0">
+              <a:rPr lang="fr-FR" sz="3200" dirty="0">
                 <a:solidFill>
                   <a:schemeClr val="bg1"/>
                 </a:solidFill>
               </a:rPr>
               <a:t>IDENTIFIER ET DEFINIR LE PROBLEME</a:t>
             </a:r>
-            <a:endParaRPr lang="fr-FR" sz="3200" dirty="0">
-              <a:solidFill>
-                <a:schemeClr val="bg1"/>
-              </a:solidFill>
-            </a:endParaRPr>
           </a:p>
         </p:txBody>
       </p:sp>
@@ -4854,34 +4714,13 @@
           <a:lstStyle/>
           <a:p>
             <a:r>
-              <a:rPr lang="fr-FR" b="1" dirty="0" smtClean="0">
+              <a:rPr lang="fr-FR" b="1" dirty="0">
                 <a:solidFill>
                   <a:schemeClr val="bg1"/>
                 </a:solidFill>
               </a:rPr>
-              <a:t>Pouvons-nous </a:t>
-            </a:r>
-            <a:r>
-              <a:rPr lang="fr-FR" b="1" dirty="0">
-                <a:solidFill>
-                  <a:schemeClr val="bg1"/>
-                </a:solidFill>
-              </a:rPr>
-              <a:t>détecter des cellules cancéreuses sur une coupe d’échantillon de tumeur afin de localiser précisément les zones cancéreuses et ainsi évaluer la gravité du cancer </a:t>
-            </a:r>
-            <a:r>
-              <a:rPr lang="fr-FR" b="1" dirty="0" smtClean="0">
-                <a:solidFill>
-                  <a:schemeClr val="bg1"/>
-                </a:solidFill>
-              </a:rPr>
-              <a:t>?</a:t>
-            </a:r>
-            <a:endParaRPr lang="fr-FR" b="1" dirty="0">
-              <a:solidFill>
-                <a:schemeClr val="bg1"/>
-              </a:solidFill>
-            </a:endParaRPr>
+              <a:t>Pouvons-nous détecter des cellules cancéreuses sur une coupe d’échantillon de tumeur afin de localiser précisément les zones cancéreuses et ainsi évaluer la gravité du cancer ?</a:t>
+            </a:r>
           </a:p>
         </p:txBody>
       </p:sp>
@@ -4908,18 +4747,13 @@
           <a:lstStyle/>
           <a:p>
             <a:r>
-              <a:rPr lang="fr-FR" dirty="0" smtClean="0">
+              <a:rPr lang="fr-FR" dirty="0">
                 <a:solidFill>
                   <a:schemeClr val="bg1"/>
                 </a:solidFill>
               </a:rPr>
               <a:t>Base de données avec des images échantillons</a:t>
             </a:r>
-            <a:endParaRPr lang="fr-FR" dirty="0">
-              <a:solidFill>
-                <a:schemeClr val="bg1"/>
-              </a:solidFill>
-            </a:endParaRPr>
           </a:p>
         </p:txBody>
       </p:sp>
@@ -4946,34 +4780,13 @@
           <a:lstStyle/>
           <a:p>
             <a:r>
-              <a:rPr lang="fr-FR" dirty="0" smtClean="0">
+              <a:rPr lang="fr-FR" dirty="0">
                 <a:solidFill>
                   <a:schemeClr val="bg1"/>
                 </a:solidFill>
               </a:rPr>
-              <a:t>Implémentation de </a:t>
-            </a:r>
-            <a:r>
-              <a:rPr lang="fr-FR" dirty="0" smtClean="0">
-                <a:solidFill>
-                  <a:schemeClr val="bg1"/>
-                </a:solidFill>
-              </a:rPr>
-              <a:t>Machine </a:t>
-            </a:r>
-            <a:r>
-              <a:rPr lang="fr-FR" dirty="0" smtClean="0">
-                <a:solidFill>
-                  <a:schemeClr val="bg1"/>
-                </a:solidFill>
-              </a:rPr>
-              <a:t>Learning</a:t>
-            </a:r>
-            <a:endParaRPr lang="fr-FR" dirty="0">
-              <a:solidFill>
-                <a:schemeClr val="bg1"/>
-              </a:solidFill>
-            </a:endParaRPr>
+              <a:t>Implémentation de Machine Learning</a:t>
+            </a:r>
           </a:p>
         </p:txBody>
       </p:sp>
@@ -5000,18 +4813,13 @@
           <a:lstStyle/>
           <a:p>
             <a:r>
-              <a:rPr lang="fr-FR" dirty="0" smtClean="0">
+              <a:rPr lang="fr-FR" dirty="0">
                 <a:solidFill>
                   <a:schemeClr val="bg1"/>
                 </a:solidFill>
               </a:rPr>
               <a:t>Détection de cellules cancéreuses</a:t>
             </a:r>
-            <a:endParaRPr lang="fr-FR" dirty="0">
-              <a:solidFill>
-                <a:schemeClr val="bg1"/>
-              </a:solidFill>
-            </a:endParaRPr>
           </a:p>
         </p:txBody>
       </p:sp>
@@ -5025,13 +4833,6 @@
   <p:clrMapOvr>
     <a:masterClrMapping/>
   </p:clrMapOvr>
-  <p:timing>
-    <p:tnLst>
-      <p:par>
-        <p:cTn id="1" dur="indefinite" restart="never" nodeType="tmRoot"/>
-      </p:par>
-    </p:tnLst>
-  </p:timing>
 </p:sld>
 </file>
 
@@ -5169,7 +4970,7 @@
           <a:lstStyle/>
           <a:p>
             <a:r>
-              <a:rPr lang="fr-FR" sz="3200" dirty="0" smtClean="0">
+              <a:rPr lang="fr-FR" sz="3200" dirty="0">
                 <a:solidFill>
                   <a:schemeClr val="bg1"/>
                 </a:solidFill>
@@ -5179,18 +4980,13 @@
           </a:p>
           <a:p>
             <a:r>
-              <a:rPr lang="fr-FR" sz="3200" dirty="0" smtClean="0">
+              <a:rPr lang="fr-FR" sz="3200" dirty="0">
                 <a:solidFill>
                   <a:schemeClr val="bg1"/>
                 </a:solidFill>
               </a:rPr>
               <a:t>DE DONNEES</a:t>
             </a:r>
-            <a:endParaRPr lang="fr-FR" sz="3200" dirty="0">
-              <a:solidFill>
-                <a:schemeClr val="bg1"/>
-              </a:solidFill>
-            </a:endParaRPr>
           </a:p>
         </p:txBody>
       </p:sp>
@@ -5301,17 +5097,8 @@
           <a:p>
             <a:r>
               <a:rPr lang="fr-FR" b="1" dirty="0"/>
-              <a:t>277 </a:t>
-            </a:r>
-            <a:r>
-              <a:rPr lang="fr-FR" b="1" dirty="0" smtClean="0"/>
-              <a:t>524 </a:t>
-            </a:r>
-            <a:r>
-              <a:rPr lang="fr-FR" b="1" dirty="0" smtClean="0"/>
-              <a:t>images</a:t>
-            </a:r>
-            <a:endParaRPr lang="fr-FR" b="1" dirty="0"/>
+              <a:t>277 524 images</a:t>
+            </a:r>
           </a:p>
         </p:txBody>
       </p:sp>
@@ -5338,14 +5125,9 @@
           <a:lstStyle/>
           <a:p>
             <a:r>
-              <a:rPr lang="fr-FR" b="1" dirty="0" smtClean="0"/>
-              <a:t>275 246 </a:t>
-            </a:r>
-            <a:r>
-              <a:rPr lang="fr-FR" b="1" dirty="0" smtClean="0"/>
-              <a:t>images</a:t>
-            </a:r>
-            <a:endParaRPr lang="fr-FR" b="1" dirty="0"/>
+              <a:rPr lang="fr-FR" b="1" dirty="0"/>
+              <a:t>275 246 images</a:t>
+            </a:r>
           </a:p>
         </p:txBody>
       </p:sp>
@@ -5407,13 +5189,6 @@
   <p:clrMapOvr>
     <a:masterClrMapping/>
   </p:clrMapOvr>
-  <p:timing>
-    <p:tnLst>
-      <p:par>
-        <p:cTn id="1" dur="indefinite" restart="never" nodeType="tmRoot"/>
-      </p:par>
-    </p:tnLst>
-  </p:timing>
 </p:sld>
 </file>
 
@@ -5481,18 +5256,13 @@
           <a:lstStyle/>
           <a:p>
             <a:r>
-              <a:rPr lang="fr-FR" sz="3200" dirty="0" smtClean="0">
+              <a:rPr lang="fr-FR" sz="3200" dirty="0">
                 <a:solidFill>
                   <a:schemeClr val="bg1"/>
                 </a:solidFill>
               </a:rPr>
               <a:t>CHARGER LA BASE DE DONNEES DANS UNE STRUCTURE</a:t>
             </a:r>
-            <a:endParaRPr lang="fr-FR" sz="3200" dirty="0">
-              <a:solidFill>
-                <a:schemeClr val="bg1"/>
-              </a:solidFill>
-            </a:endParaRPr>
           </a:p>
         </p:txBody>
       </p:sp>
@@ -5519,18 +5289,13 @@
           <a:lstStyle/>
           <a:p>
             <a:r>
-              <a:rPr lang="fr-FR" sz="2000" dirty="0" smtClean="0">
+              <a:rPr lang="fr-FR" sz="2000" dirty="0">
                 <a:solidFill>
                   <a:schemeClr val="bg1"/>
                 </a:solidFill>
               </a:rPr>
               <a:t> 1 - Data frame</a:t>
             </a:r>
-            <a:endParaRPr lang="fr-FR" sz="2000" dirty="0">
-              <a:solidFill>
-                <a:schemeClr val="bg1"/>
-              </a:solidFill>
-            </a:endParaRPr>
           </a:p>
         </p:txBody>
       </p:sp>
@@ -5613,18 +5378,13 @@
           <a:lstStyle/>
           <a:p>
             <a:r>
-              <a:rPr lang="fr-FR" sz="2000" i="1" dirty="0" smtClean="0">
+              <a:rPr lang="fr-FR" sz="2000" i="1" dirty="0">
                 <a:solidFill>
                   <a:schemeClr val="bg1"/>
                 </a:solidFill>
               </a:rPr>
               <a:t>Code</a:t>
             </a:r>
-            <a:endParaRPr lang="fr-FR" sz="2000" i="1" dirty="0">
-              <a:solidFill>
-                <a:schemeClr val="bg1"/>
-              </a:solidFill>
-            </a:endParaRPr>
           </a:p>
         </p:txBody>
       </p:sp>
@@ -5651,18 +5411,13 @@
           <a:lstStyle/>
           <a:p>
             <a:r>
-              <a:rPr lang="fr-FR" sz="2000" i="1" dirty="0" smtClean="0">
+              <a:rPr lang="fr-FR" sz="2000" i="1" dirty="0">
                 <a:solidFill>
                   <a:schemeClr val="bg1"/>
                 </a:solidFill>
               </a:rPr>
               <a:t>Data frame résultat</a:t>
             </a:r>
-            <a:endParaRPr lang="fr-FR" sz="2000" i="1" dirty="0">
-              <a:solidFill>
-                <a:schemeClr val="bg1"/>
-              </a:solidFill>
-            </a:endParaRPr>
           </a:p>
         </p:txBody>
       </p:sp>
@@ -5676,13 +5431,6 @@
   <p:clrMapOvr>
     <a:masterClrMapping/>
   </p:clrMapOvr>
-  <p:timing>
-    <p:tnLst>
-      <p:par>
-        <p:cTn id="1" dur="indefinite" restart="never" nodeType="tmRoot"/>
-      </p:par>
-    </p:tnLst>
-  </p:timing>
 </p:sld>
 </file>
 
@@ -5750,18 +5498,13 @@
           <a:lstStyle/>
           <a:p>
             <a:r>
-              <a:rPr lang="fr-FR" sz="3200" dirty="0" smtClean="0">
+              <a:rPr lang="fr-FR" sz="3200" dirty="0">
                 <a:solidFill>
                   <a:schemeClr val="bg1"/>
                 </a:solidFill>
               </a:rPr>
               <a:t>CHARGER LA BASE DE DONNEES DANS UNE STRUCTURE</a:t>
             </a:r>
-            <a:endParaRPr lang="fr-FR" sz="3200" dirty="0">
-              <a:solidFill>
-                <a:schemeClr val="bg1"/>
-              </a:solidFill>
-            </a:endParaRPr>
           </a:p>
         </p:txBody>
       </p:sp>
@@ -5788,18 +5531,13 @@
           <a:lstStyle/>
           <a:p>
             <a:r>
-              <a:rPr lang="fr-FR" sz="2000" dirty="0" smtClean="0">
+              <a:rPr lang="fr-FR" sz="2000" dirty="0">
                 <a:solidFill>
                   <a:schemeClr val="bg1"/>
                 </a:solidFill>
               </a:rPr>
               <a:t>2 - Tableau</a:t>
             </a:r>
-            <a:endParaRPr lang="fr-FR" sz="2000" dirty="0">
-              <a:solidFill>
-                <a:schemeClr val="bg1"/>
-              </a:solidFill>
-            </a:endParaRPr>
           </a:p>
         </p:txBody>
       </p:sp>
@@ -5848,18 +5586,13 @@
           <a:lstStyle/>
           <a:p>
             <a:r>
-              <a:rPr lang="fr-FR" i="1" dirty="0" smtClean="0">
+              <a:rPr lang="fr-FR" i="1" dirty="0">
                 <a:solidFill>
                   <a:schemeClr val="bg1"/>
                 </a:solidFill>
               </a:rPr>
               <a:t>Résultat : il n’y a plus les crochets []</a:t>
             </a:r>
-            <a:endParaRPr lang="fr-FR" i="1" dirty="0">
-              <a:solidFill>
-                <a:schemeClr val="bg1"/>
-              </a:solidFill>
-            </a:endParaRPr>
           </a:p>
         </p:txBody>
       </p:sp>
@@ -5903,13 +5636,6 @@
   <p:clrMapOvr>
     <a:masterClrMapping/>
   </p:clrMapOvr>
-  <p:timing>
-    <p:tnLst>
-      <p:par>
-        <p:cTn id="1" dur="indefinite" restart="never" nodeType="tmRoot"/>
-      </p:par>
-    </p:tnLst>
-  </p:timing>
 </p:sld>
 </file>
 
@@ -6073,18 +5799,13 @@
           <a:lstStyle/>
           <a:p>
             <a:r>
-              <a:rPr lang="fr-FR" sz="3200" dirty="0" smtClean="0">
+              <a:rPr lang="fr-FR" sz="3200" dirty="0">
                 <a:solidFill>
                   <a:schemeClr val="bg1"/>
                 </a:solidFill>
               </a:rPr>
               <a:t>PREPARATION A L’APPLICATION</a:t>
             </a:r>
-            <a:endParaRPr lang="fr-FR" sz="3200" dirty="0">
-              <a:solidFill>
-                <a:schemeClr val="bg1"/>
-              </a:solidFill>
-            </a:endParaRPr>
           </a:p>
         </p:txBody>
       </p:sp>
@@ -6278,18 +5999,13 @@
               <a:buNone/>
             </a:pPr>
             <a:r>
-              <a:rPr lang="fr-FR" dirty="0" smtClean="0">
+              <a:rPr lang="fr-FR" dirty="0">
                 <a:solidFill>
                   <a:schemeClr val="bg1"/>
                 </a:solidFill>
               </a:rPr>
               <a:t>Test 25%</a:t>
             </a:r>
-            <a:endParaRPr lang="fr-FR" dirty="0">
-              <a:solidFill>
-                <a:schemeClr val="bg1"/>
-              </a:solidFill>
-            </a:endParaRPr>
           </a:p>
         </p:txBody>
       </p:sp>
@@ -6483,18 +6199,13 @@
               <a:buNone/>
             </a:pPr>
             <a:r>
-              <a:rPr lang="fr-FR" dirty="0" smtClean="0">
+              <a:rPr lang="fr-FR" dirty="0">
                 <a:solidFill>
                   <a:schemeClr val="bg1"/>
                 </a:solidFill>
               </a:rPr>
               <a:t>Train 75%</a:t>
             </a:r>
-            <a:endParaRPr lang="fr-FR" dirty="0">
-              <a:solidFill>
-                <a:schemeClr val="bg1"/>
-              </a:solidFill>
-            </a:endParaRPr>
           </a:p>
         </p:txBody>
       </p:sp>
@@ -6736,18 +6447,13 @@
               <a:buNone/>
             </a:pPr>
             <a:r>
-              <a:rPr lang="fr-FR" dirty="0" smtClean="0">
+              <a:rPr lang="fr-FR" dirty="0">
                 <a:solidFill>
                   <a:schemeClr val="bg1"/>
                 </a:solidFill>
               </a:rPr>
               <a:t>Base de données</a:t>
             </a:r>
-            <a:endParaRPr lang="fr-FR" dirty="0">
-              <a:solidFill>
-                <a:schemeClr val="bg1"/>
-              </a:solidFill>
-            </a:endParaRPr>
           </a:p>
         </p:txBody>
       </p:sp>
@@ -6790,13 +6496,6 @@
   <p:clrMapOvr>
     <a:masterClrMapping/>
   </p:clrMapOvr>
-  <p:timing>
-    <p:tnLst>
-      <p:par>
-        <p:cTn id="1" dur="indefinite" restart="never" nodeType="tmRoot"/>
-      </p:par>
-    </p:tnLst>
-  </p:timing>
 </p:sld>
 </file>
 
@@ -6864,18 +6563,13 @@
           <a:lstStyle/>
           <a:p>
             <a:r>
-              <a:rPr lang="fr-FR" sz="3200" dirty="0" smtClean="0">
+              <a:rPr lang="fr-FR" sz="3200" dirty="0">
                 <a:solidFill>
                   <a:schemeClr val="bg1"/>
                 </a:solidFill>
               </a:rPr>
-              <a:t>APLICATION DES MODELES AUX DONNEES</a:t>
-            </a:r>
-            <a:endParaRPr lang="fr-FR" sz="3200" dirty="0">
-              <a:solidFill>
-                <a:schemeClr val="bg1"/>
-              </a:solidFill>
-            </a:endParaRPr>
+              <a:t>APPLICATION DES MODELES AUX DONNEES</a:t>
+            </a:r>
           </a:p>
         </p:txBody>
       </p:sp>
@@ -6902,18 +6596,13 @@
           <a:lstStyle/>
           <a:p>
             <a:r>
-              <a:rPr lang="fr-FR" sz="2000" dirty="0" smtClean="0">
+              <a:rPr lang="fr-FR" sz="2000" dirty="0">
                 <a:solidFill>
                   <a:schemeClr val="bg1"/>
                 </a:solidFill>
               </a:rPr>
               <a:t>1 – Classification avec les plus proches voisins</a:t>
             </a:r>
-            <a:endParaRPr lang="fr-FR" sz="2000" dirty="0">
-              <a:solidFill>
-                <a:schemeClr val="bg1"/>
-              </a:solidFill>
-            </a:endParaRPr>
           </a:p>
         </p:txBody>
       </p:sp>
@@ -6976,18 +6665,13 @@
           <a:lstStyle/>
           <a:p>
             <a:r>
-              <a:rPr lang="fr-FR" sz="2000" dirty="0" smtClean="0">
+              <a:rPr lang="fr-FR" sz="2000" dirty="0">
                 <a:solidFill>
                   <a:schemeClr val="bg1"/>
                 </a:solidFill>
               </a:rPr>
-              <a:t>Temps d’exécution = 8heures</a:t>
-            </a:r>
-            <a:endParaRPr lang="fr-FR" sz="2000" dirty="0">
-              <a:solidFill>
-                <a:schemeClr val="bg1"/>
-              </a:solidFill>
-            </a:endParaRPr>
+              <a:t>Temps d’exécution = 8 heures</a:t>
+            </a:r>
           </a:p>
         </p:txBody>
       </p:sp>
@@ -7014,18 +6698,13 @@
           <a:lstStyle/>
           <a:p>
             <a:r>
-              <a:rPr lang="fr-FR" sz="2000" dirty="0" smtClean="0">
+              <a:rPr lang="fr-FR" sz="2000" dirty="0">
                 <a:solidFill>
                   <a:schemeClr val="bg1"/>
                 </a:solidFill>
               </a:rPr>
               <a:t>Précision = 79.5%</a:t>
             </a:r>
-            <a:endParaRPr lang="fr-FR" sz="2000" dirty="0">
-              <a:solidFill>
-                <a:schemeClr val="bg1"/>
-              </a:solidFill>
-            </a:endParaRPr>
           </a:p>
         </p:txBody>
       </p:sp>
@@ -7135,13 +6814,6 @@
   <p:clrMapOvr>
     <a:masterClrMapping/>
   </p:clrMapOvr>
-  <p:timing>
-    <p:tnLst>
-      <p:par>
-        <p:cTn id="1" dur="indefinite" restart="never" nodeType="tmRoot"/>
-      </p:par>
-    </p:tnLst>
-  </p:timing>
 </p:sld>
 </file>
 
@@ -7214,21 +6886,8 @@
                   <a:schemeClr val="bg1"/>
                 </a:solidFill>
               </a:rPr>
-              <a:t>2</a:t>
-            </a:r>
-            <a:r>
-              <a:rPr lang="fr-FR" sz="2000" dirty="0" smtClean="0">
-                <a:solidFill>
-                  <a:schemeClr val="bg1"/>
-                </a:solidFill>
-              </a:rPr>
-              <a:t> – Classification avec arbres de décision</a:t>
-            </a:r>
-            <a:endParaRPr lang="fr-FR" sz="2000" dirty="0">
-              <a:solidFill>
-                <a:schemeClr val="bg1"/>
-              </a:solidFill>
-            </a:endParaRPr>
+              <a:t>2 – Classification avec arbres de décision</a:t>
+            </a:r>
           </a:p>
         </p:txBody>
       </p:sp>
@@ -7255,18 +6914,13 @@
           <a:lstStyle/>
           <a:p>
             <a:r>
-              <a:rPr lang="fr-FR" sz="3200" dirty="0" smtClean="0">
+              <a:rPr lang="fr-FR" sz="3200" dirty="0">
                 <a:solidFill>
                   <a:schemeClr val="bg1"/>
                 </a:solidFill>
               </a:rPr>
-              <a:t>APLICATION DES MODELES AUX DONNEES</a:t>
-            </a:r>
-            <a:endParaRPr lang="fr-FR" sz="3200" dirty="0">
-              <a:solidFill>
-                <a:schemeClr val="bg1"/>
-              </a:solidFill>
-            </a:endParaRPr>
+              <a:t>APPLICATION DES MODELES AUX DONNEES</a:t>
+            </a:r>
           </a:p>
         </p:txBody>
       </p:sp>
@@ -7461,18 +7115,13 @@
           <a:lstStyle/>
           <a:p>
             <a:r>
-              <a:rPr lang="fr-FR" sz="2000" dirty="0" smtClean="0">
+              <a:rPr lang="fr-FR" sz="2000" dirty="0">
                 <a:solidFill>
                   <a:schemeClr val="bg1"/>
                 </a:solidFill>
               </a:rPr>
-              <a:t>Temps d’exécution = 11heures</a:t>
-            </a:r>
-            <a:endParaRPr lang="fr-FR" sz="2000" dirty="0">
-              <a:solidFill>
-                <a:schemeClr val="bg1"/>
-              </a:solidFill>
-            </a:endParaRPr>
+              <a:t>Temps d’exécution = 20 minutes</a:t>
+            </a:r>
           </a:p>
         </p:txBody>
       </p:sp>
@@ -7499,18 +7148,13 @@
           <a:lstStyle/>
           <a:p>
             <a:r>
-              <a:rPr lang="fr-FR" sz="2000" dirty="0" smtClean="0">
+              <a:rPr lang="fr-FR" sz="2000" dirty="0">
                 <a:solidFill>
                   <a:schemeClr val="bg1"/>
                 </a:solidFill>
               </a:rPr>
               <a:t>Précision = 80.6%</a:t>
             </a:r>
-            <a:endParaRPr lang="fr-FR" sz="2000" dirty="0">
-              <a:solidFill>
-                <a:schemeClr val="bg1"/>
-              </a:solidFill>
-            </a:endParaRPr>
           </a:p>
         </p:txBody>
       </p:sp>
@@ -7524,13 +7168,6 @@
   <p:clrMapOvr>
     <a:masterClrMapping/>
   </p:clrMapOvr>
-  <p:timing>
-    <p:tnLst>
-      <p:par>
-        <p:cTn id="1" dur="indefinite" restart="never" nodeType="tmRoot"/>
-      </p:par>
-    </p:tnLst>
-  </p:timing>
 </p:sld>
 </file>
 

</xml_diff>